<commit_message>
Adding content to presentation
</commit_message>
<xml_diff>
--- a/Presentation/Team_3_Slides.pptx
+++ b/Presentation/Team_3_Slides.pptx
@@ -1,24 +1,24 @@
 
 <file path=ppt/presentation.xml><?xml version="1.0" encoding="utf-8"?>
-<p:presentation xmlns:a="http://schemas.openxmlformats.org/drawingml/2006/main" xmlns:r="http://schemas.openxmlformats.org/officeDocument/2006/relationships" xmlns:mc="http://schemas.openxmlformats.org/markup-compatibility/2006" xmlns:mv="urn:schemas-microsoft-com:mac:vml" xmlns:p="http://schemas.openxmlformats.org/presentationml/2006/main" xmlns:c="http://schemas.openxmlformats.org/drawingml/2006/chart" xmlns:dgm="http://schemas.openxmlformats.org/drawingml/2006/diagram" xmlns:o="urn:schemas-microsoft-com:office:office" xmlns:v="urn:schemas-microsoft-com:vml" xmlns:pvml="urn:schemas-microsoft-com:office:powerpoint" xmlns:com="http://schemas.openxmlformats.org/drawingml/2006/compatibility" xmlns:p14="http://schemas.microsoft.com/office/powerpoint/2010/main" xmlns:p15="http://schemas.microsoft.com/office/powerpoint/2012/main" xmlns:ahyp="http://schemas.microsoft.com/office/drawing/2018/hyperlinkcolor" autoCompressPictures="0" strictFirstAndLastChars="0" saveSubsetFonts="1">
+<p:presentation xmlns:a="http://schemas.openxmlformats.org/drawingml/2006/main" xmlns:r="http://schemas.openxmlformats.org/officeDocument/2006/relationships" xmlns:p="http://schemas.openxmlformats.org/presentationml/2006/main" strictFirstAndLastChars="0" saveSubsetFonts="1" autoCompressPictures="0">
   <p:sldMasterIdLst>
-    <p:sldMasterId id="2147483659" r:id="rId5"/>
+    <p:sldMasterId id="2147483659" r:id="rId1"/>
   </p:sldMasterIdLst>
   <p:notesMasterIdLst>
-    <p:notesMasterId r:id="rId6"/>
+    <p:notesMasterId r:id="rId8"/>
   </p:notesMasterIdLst>
   <p:sldIdLst>
-    <p:sldId id="256" r:id="rId7"/>
-    <p:sldId id="257" r:id="rId8"/>
-    <p:sldId id="258" r:id="rId9"/>
-    <p:sldId id="259" r:id="rId10"/>
-    <p:sldId id="260" r:id="rId11"/>
-    <p:sldId id="261" r:id="rId12"/>
+    <p:sldId id="256" r:id="rId2"/>
+    <p:sldId id="257" r:id="rId3"/>
+    <p:sldId id="258" r:id="rId4"/>
+    <p:sldId id="259" r:id="rId5"/>
+    <p:sldId id="260" r:id="rId6"/>
+    <p:sldId id="261" r:id="rId7"/>
   </p:sldIdLst>
-  <p:sldSz cy="5143500" cx="9144000"/>
+  <p:sldSz cx="9144000" cy="5143500" type="screen16x9"/>
   <p:notesSz cx="6858000" cy="9144000"/>
   <p:defaultTextStyle>
-    <a:defPPr lvl="0" marR="0" rtl="0" algn="l">
+    <a:defPPr marR="0" lvl="0" algn="l" rtl="0">
       <a:lnSpc>
         <a:spcPct val="100000"/>
       </a:lnSpc>
@@ -29,7 +29,7 @@
         <a:spcPts val="0"/>
       </a:spcAft>
     </a:defPPr>
-    <a:lvl1pPr lvl="0" marR="0" rtl="0" algn="l">
+    <a:lvl1pPr marR="0" lvl="0" algn="l" rtl="0">
       <a:lnSpc>
         <a:spcPct val="100000"/>
       </a:lnSpc>
@@ -43,7 +43,7 @@
         <a:srgbClr val="000000"/>
       </a:buClr>
       <a:buFont typeface="Arial"/>
-      <a:defRPr b="0" i="0" sz="1400" u="none" cap="none" strike="noStrike">
+      <a:defRPr sz="1400" b="0" i="0" u="none" strike="noStrike" cap="none">
         <a:solidFill>
           <a:srgbClr val="000000"/>
         </a:solidFill>
@@ -53,7 +53,7 @@
         <a:sym typeface="Arial"/>
       </a:defRPr>
     </a:lvl1pPr>
-    <a:lvl2pPr lvl="1" marR="0" rtl="0" algn="l">
+    <a:lvl2pPr marR="0" lvl="1" algn="l" rtl="0">
       <a:lnSpc>
         <a:spcPct val="100000"/>
       </a:lnSpc>
@@ -67,7 +67,7 @@
         <a:srgbClr val="000000"/>
       </a:buClr>
       <a:buFont typeface="Arial"/>
-      <a:defRPr b="0" i="0" sz="1400" u="none" cap="none" strike="noStrike">
+      <a:defRPr sz="1400" b="0" i="0" u="none" strike="noStrike" cap="none">
         <a:solidFill>
           <a:srgbClr val="000000"/>
         </a:solidFill>
@@ -77,7 +77,7 @@
         <a:sym typeface="Arial"/>
       </a:defRPr>
     </a:lvl2pPr>
-    <a:lvl3pPr lvl="2" marR="0" rtl="0" algn="l">
+    <a:lvl3pPr marR="0" lvl="2" algn="l" rtl="0">
       <a:lnSpc>
         <a:spcPct val="100000"/>
       </a:lnSpc>
@@ -91,7 +91,7 @@
         <a:srgbClr val="000000"/>
       </a:buClr>
       <a:buFont typeface="Arial"/>
-      <a:defRPr b="0" i="0" sz="1400" u="none" cap="none" strike="noStrike">
+      <a:defRPr sz="1400" b="0" i="0" u="none" strike="noStrike" cap="none">
         <a:solidFill>
           <a:srgbClr val="000000"/>
         </a:solidFill>
@@ -101,7 +101,7 @@
         <a:sym typeface="Arial"/>
       </a:defRPr>
     </a:lvl3pPr>
-    <a:lvl4pPr lvl="3" marR="0" rtl="0" algn="l">
+    <a:lvl4pPr marR="0" lvl="3" algn="l" rtl="0">
       <a:lnSpc>
         <a:spcPct val="100000"/>
       </a:lnSpc>
@@ -115,7 +115,7 @@
         <a:srgbClr val="000000"/>
       </a:buClr>
       <a:buFont typeface="Arial"/>
-      <a:defRPr b="0" i="0" sz="1400" u="none" cap="none" strike="noStrike">
+      <a:defRPr sz="1400" b="0" i="0" u="none" strike="noStrike" cap="none">
         <a:solidFill>
           <a:srgbClr val="000000"/>
         </a:solidFill>
@@ -125,7 +125,7 @@
         <a:sym typeface="Arial"/>
       </a:defRPr>
     </a:lvl4pPr>
-    <a:lvl5pPr lvl="4" marR="0" rtl="0" algn="l">
+    <a:lvl5pPr marR="0" lvl="4" algn="l" rtl="0">
       <a:lnSpc>
         <a:spcPct val="100000"/>
       </a:lnSpc>
@@ -139,7 +139,7 @@
         <a:srgbClr val="000000"/>
       </a:buClr>
       <a:buFont typeface="Arial"/>
-      <a:defRPr b="0" i="0" sz="1400" u="none" cap="none" strike="noStrike">
+      <a:defRPr sz="1400" b="0" i="0" u="none" strike="noStrike" cap="none">
         <a:solidFill>
           <a:srgbClr val="000000"/>
         </a:solidFill>
@@ -149,7 +149,7 @@
         <a:sym typeface="Arial"/>
       </a:defRPr>
     </a:lvl5pPr>
-    <a:lvl6pPr lvl="5" marR="0" rtl="0" algn="l">
+    <a:lvl6pPr marR="0" lvl="5" algn="l" rtl="0">
       <a:lnSpc>
         <a:spcPct val="100000"/>
       </a:lnSpc>
@@ -163,7 +163,7 @@
         <a:srgbClr val="000000"/>
       </a:buClr>
       <a:buFont typeface="Arial"/>
-      <a:defRPr b="0" i="0" sz="1400" u="none" cap="none" strike="noStrike">
+      <a:defRPr sz="1400" b="0" i="0" u="none" strike="noStrike" cap="none">
         <a:solidFill>
           <a:srgbClr val="000000"/>
         </a:solidFill>
@@ -173,7 +173,7 @@
         <a:sym typeface="Arial"/>
       </a:defRPr>
     </a:lvl6pPr>
-    <a:lvl7pPr lvl="6" marR="0" rtl="0" algn="l">
+    <a:lvl7pPr marR="0" lvl="6" algn="l" rtl="0">
       <a:lnSpc>
         <a:spcPct val="100000"/>
       </a:lnSpc>
@@ -187,7 +187,7 @@
         <a:srgbClr val="000000"/>
       </a:buClr>
       <a:buFont typeface="Arial"/>
-      <a:defRPr b="0" i="0" sz="1400" u="none" cap="none" strike="noStrike">
+      <a:defRPr sz="1400" b="0" i="0" u="none" strike="noStrike" cap="none">
         <a:solidFill>
           <a:srgbClr val="000000"/>
         </a:solidFill>
@@ -197,7 +197,7 @@
         <a:sym typeface="Arial"/>
       </a:defRPr>
     </a:lvl7pPr>
-    <a:lvl8pPr lvl="7" marR="0" rtl="0" algn="l">
+    <a:lvl8pPr marR="0" lvl="7" algn="l" rtl="0">
       <a:lnSpc>
         <a:spcPct val="100000"/>
       </a:lnSpc>
@@ -211,7 +211,7 @@
         <a:srgbClr val="000000"/>
       </a:buClr>
       <a:buFont typeface="Arial"/>
-      <a:defRPr b="0" i="0" sz="1400" u="none" cap="none" strike="noStrike">
+      <a:defRPr sz="1400" b="0" i="0" u="none" strike="noStrike" cap="none">
         <a:solidFill>
           <a:srgbClr val="000000"/>
         </a:solidFill>
@@ -221,7 +221,7 @@
         <a:sym typeface="Arial"/>
       </a:defRPr>
     </a:lvl8pPr>
-    <a:lvl9pPr lvl="8" marR="0" rtl="0" algn="l">
+    <a:lvl9pPr marR="0" lvl="8" algn="l" rtl="0">
       <a:lnSpc>
         <a:spcPct val="100000"/>
       </a:lnSpc>
@@ -235,7 +235,7 @@
         <a:srgbClr val="000000"/>
       </a:buClr>
       <a:buFont typeface="Arial"/>
-      <a:defRPr b="0" i="0" sz="1400" u="none" cap="none" strike="noStrike">
+      <a:defRPr sz="1400" b="0" i="0" u="none" strike="noStrike" cap="none">
         <a:solidFill>
           <a:srgbClr val="000000"/>
         </a:solidFill>
@@ -248,7 +248,7 @@
   </p:defaultTextStyle>
   <p:extLst>
     <p:ext uri="{EFAFB233-063F-42B5-8137-9DF3F51BA10A}">
-      <p15:sldGuideLst>
+      <p15:sldGuideLst xmlns:p15="http://schemas.microsoft.com/office/powerpoint/2012/main">
         <p15:guide id="1" orient="horz" pos="1620">
           <p15:clr>
             <a:srgbClr val="747775"/>
@@ -266,11 +266,16 @@
 </file>
 
 <file path=ppt/notesMasters/notesMaster1.xml><?xml version="1.0" encoding="utf-8"?>
-<p:notesMaster xmlns:a="http://schemas.openxmlformats.org/drawingml/2006/main" xmlns:r="http://schemas.openxmlformats.org/officeDocument/2006/relationships" xmlns:mc="http://schemas.openxmlformats.org/markup-compatibility/2006" xmlns:mv="urn:schemas-microsoft-com:mac:vml" xmlns:p="http://schemas.openxmlformats.org/presentationml/2006/main" xmlns:c="http://schemas.openxmlformats.org/drawingml/2006/chart" xmlns:dgm="http://schemas.openxmlformats.org/drawingml/2006/diagram" xmlns:o="urn:schemas-microsoft-com:office:office" xmlns:v="urn:schemas-microsoft-com:vml" xmlns:pvml="urn:schemas-microsoft-com:office:powerpoint" xmlns:com="http://schemas.openxmlformats.org/drawingml/2006/compatibility" xmlns:p14="http://schemas.microsoft.com/office/powerpoint/2010/main" xmlns:p15="http://schemas.microsoft.com/office/powerpoint/2012/main" xmlns:ahyp="http://schemas.microsoft.com/office/drawing/2018/hyperlinkcolor">
+<p:notesMaster xmlns:a="http://schemas.openxmlformats.org/drawingml/2006/main" xmlns:r="http://schemas.openxmlformats.org/officeDocument/2006/relationships" xmlns:p="http://schemas.openxmlformats.org/presentationml/2006/main">
   <p:cSld>
+    <p:bg>
+      <p:bgRef idx="1001">
+        <a:schemeClr val="bg1"/>
+      </p:bgRef>
+    </p:bg>
     <p:spTree>
       <p:nvGrpSpPr>
-        <p:cNvPr id="2" name="Shape 2"/>
+        <p:cNvPr id="1" name="Shape 2"/>
         <p:cNvGrpSpPr/>
         <p:nvPr/>
       </p:nvGrpSpPr>
@@ -285,9 +290,11 @@
       <p:sp>
         <p:nvSpPr>
           <p:cNvPr id="3" name="Google Shape;3;n"/>
-          <p:cNvSpPr/>
+          <p:cNvSpPr>
+            <a:spLocks noGrp="1" noRot="1" noChangeAspect="1"/>
+          </p:cNvSpPr>
           <p:nvPr>
-            <p:ph idx="2" type="sldImg"/>
+            <p:ph type="sldImg" idx="2"/>
           </p:nvPr>
         </p:nvSpPr>
         <p:spPr>
@@ -296,9 +303,13 @@
             <a:ext cx="6096075" cy="3429000"/>
           </a:xfrm>
           <a:custGeom>
-            <a:rect b="b" l="l" r="r" t="t"/>
+            <a:avLst/>
+            <a:gdLst/>
+            <a:ahLst/>
+            <a:cxnLst/>
+            <a:rect l="l" t="t" r="r" b="b"/>
             <a:pathLst>
-              <a:path extrusionOk="0" h="120000" w="120000">
+              <a:path w="120000" h="120000" extrusionOk="0">
                 <a:moveTo>
                   <a:pt x="0" y="0"/>
                 </a:moveTo>
@@ -316,23 +327,25 @@
             </a:pathLst>
           </a:custGeom>
           <a:noFill/>
-          <a:ln cap="flat" cmpd="sng" w="9525">
+          <a:ln w="9525" cap="flat" cmpd="sng">
             <a:solidFill>
               <a:srgbClr val="000000"/>
             </a:solidFill>
             <a:prstDash val="solid"/>
             <a:round/>
-            <a:headEnd len="sm" w="sm" type="none"/>
-            <a:tailEnd len="sm" w="sm" type="none"/>
+            <a:headEnd type="none" w="sm" len="sm"/>
+            <a:tailEnd type="none" w="sm" len="sm"/>
           </a:ln>
         </p:spPr>
       </p:sp>
       <p:sp>
         <p:nvSpPr>
           <p:cNvPr id="4" name="Google Shape;4;n"/>
-          <p:cNvSpPr txBox="1"/>
+          <p:cNvSpPr txBox="1">
+            <a:spLocks noGrp="1"/>
+          </p:cNvSpPr>
           <p:nvPr>
-            <p:ph idx="1" type="body"/>
+            <p:ph type="body" idx="1"/>
           </p:nvPr>
         </p:nvSpPr>
         <p:spPr>
@@ -349,11 +362,11 @@
           </a:ln>
         </p:spPr>
         <p:txBody>
-          <a:bodyPr anchorCtr="0" anchor="t" bIns="91425" lIns="91425" spcFirstLastPara="1" rIns="91425" wrap="square" tIns="91425">
+          <a:bodyPr spcFirstLastPara="1" wrap="square" lIns="91425" tIns="91425" rIns="91425" bIns="91425" anchor="t" anchorCtr="0">
             <a:noAutofit/>
           </a:bodyPr>
           <a:lstStyle>
-            <a:lvl1pPr indent="-298450" lvl="0" marL="457200">
+            <a:lvl1pPr marL="457200" lvl="0" indent="-298450">
               <a:spcBef>
                 <a:spcPts val="0"/>
               </a:spcBef>
@@ -364,7 +377,7 @@
               <a:buChar char="●"/>
               <a:defRPr sz="1100"/>
             </a:lvl1pPr>
-            <a:lvl2pPr indent="-298450" lvl="1" marL="914400">
+            <a:lvl2pPr marL="914400" lvl="1" indent="-298450">
               <a:spcBef>
                 <a:spcPts val="0"/>
               </a:spcBef>
@@ -375,7 +388,7 @@
               <a:buChar char="○"/>
               <a:defRPr sz="1100"/>
             </a:lvl2pPr>
-            <a:lvl3pPr indent="-298450" lvl="2" marL="1371600">
+            <a:lvl3pPr marL="1371600" lvl="2" indent="-298450">
               <a:spcBef>
                 <a:spcPts val="0"/>
               </a:spcBef>
@@ -386,7 +399,7 @@
               <a:buChar char="■"/>
               <a:defRPr sz="1100"/>
             </a:lvl3pPr>
-            <a:lvl4pPr indent="-298450" lvl="3" marL="1828800">
+            <a:lvl4pPr marL="1828800" lvl="3" indent="-298450">
               <a:spcBef>
                 <a:spcPts val="0"/>
               </a:spcBef>
@@ -397,7 +410,7 @@
               <a:buChar char="●"/>
               <a:defRPr sz="1100"/>
             </a:lvl4pPr>
-            <a:lvl5pPr indent="-298450" lvl="4" marL="2286000">
+            <a:lvl5pPr marL="2286000" lvl="4" indent="-298450">
               <a:spcBef>
                 <a:spcPts val="0"/>
               </a:spcBef>
@@ -408,7 +421,7 @@
               <a:buChar char="○"/>
               <a:defRPr sz="1100"/>
             </a:lvl5pPr>
-            <a:lvl6pPr indent="-298450" lvl="5" marL="2743200">
+            <a:lvl6pPr marL="2743200" lvl="5" indent="-298450">
               <a:spcBef>
                 <a:spcPts val="0"/>
               </a:spcBef>
@@ -419,7 +432,7 @@
               <a:buChar char="■"/>
               <a:defRPr sz="1100"/>
             </a:lvl6pPr>
-            <a:lvl7pPr indent="-298450" lvl="6" marL="3200400">
+            <a:lvl7pPr marL="3200400" lvl="6" indent="-298450">
               <a:spcBef>
                 <a:spcPts val="0"/>
               </a:spcBef>
@@ -430,7 +443,7 @@
               <a:buChar char="●"/>
               <a:defRPr sz="1100"/>
             </a:lvl7pPr>
-            <a:lvl8pPr indent="-298450" lvl="7" marL="3657600">
+            <a:lvl8pPr marL="3657600" lvl="7" indent="-298450">
               <a:spcBef>
                 <a:spcPts val="0"/>
               </a:spcBef>
@@ -441,7 +454,7 @@
               <a:buChar char="○"/>
               <a:defRPr sz="1100"/>
             </a:lvl8pPr>
-            <a:lvl9pPr indent="-298450" lvl="8" marL="4114800">
+            <a:lvl9pPr marL="4114800" lvl="8" indent="-298450">
               <a:spcBef>
                 <a:spcPts val="0"/>
               </a:spcBef>
@@ -453,14 +466,16 @@
               <a:defRPr sz="1100"/>
             </a:lvl9pPr>
           </a:lstStyle>
-          <a:p/>
+          <a:p>
+            <a:endParaRPr/>
+          </a:p>
         </p:txBody>
       </p:sp>
     </p:spTree>
   </p:cSld>
-  <p:clrMap accent1="accent1" accent2="accent2" accent3="accent3" accent4="accent4" accent5="accent5" accent6="accent6" bg1="lt1" bg2="dk2" tx1="dk1" tx2="lt2" folHlink="folHlink" hlink="hlink"/>
+  <p:clrMap bg1="lt1" tx1="dk1" bg2="dk2" tx2="lt2" accent1="accent1" accent2="accent2" accent3="accent3" accent4="accent4" accent5="accent5" accent6="accent6" hlink="hlink" folHlink="folHlink"/>
   <p:notesStyle>
-    <a:defPPr lvl="0" marR="0" rtl="0" algn="l">
+    <a:defPPr marR="0" lvl="0" algn="l" rtl="0">
       <a:lnSpc>
         <a:spcPct val="100000"/>
       </a:lnSpc>
@@ -471,7 +486,7 @@
         <a:spcPts val="0"/>
       </a:spcAft>
     </a:defPPr>
-    <a:lvl1pPr lvl="0" marR="0" rtl="0" algn="l">
+    <a:lvl1pPr marR="0" lvl="0" algn="l" rtl="0">
       <a:lnSpc>
         <a:spcPct val="100000"/>
       </a:lnSpc>
@@ -485,7 +500,7 @@
         <a:srgbClr val="000000"/>
       </a:buClr>
       <a:buFont typeface="Arial"/>
-      <a:defRPr b="0" i="0" sz="1400" u="none" cap="none" strike="noStrike">
+      <a:defRPr sz="1400" b="0" i="0" u="none" strike="noStrike" cap="none">
         <a:solidFill>
           <a:srgbClr val="000000"/>
         </a:solidFill>
@@ -495,7 +510,7 @@
         <a:sym typeface="Arial"/>
       </a:defRPr>
     </a:lvl1pPr>
-    <a:lvl2pPr lvl="1" marR="0" rtl="0" algn="l">
+    <a:lvl2pPr marR="0" lvl="1" algn="l" rtl="0">
       <a:lnSpc>
         <a:spcPct val="100000"/>
       </a:lnSpc>
@@ -509,7 +524,7 @@
         <a:srgbClr val="000000"/>
       </a:buClr>
       <a:buFont typeface="Arial"/>
-      <a:defRPr b="0" i="0" sz="1400" u="none" cap="none" strike="noStrike">
+      <a:defRPr sz="1400" b="0" i="0" u="none" strike="noStrike" cap="none">
         <a:solidFill>
           <a:srgbClr val="000000"/>
         </a:solidFill>
@@ -519,7 +534,7 @@
         <a:sym typeface="Arial"/>
       </a:defRPr>
     </a:lvl2pPr>
-    <a:lvl3pPr lvl="2" marR="0" rtl="0" algn="l">
+    <a:lvl3pPr marR="0" lvl="2" algn="l" rtl="0">
       <a:lnSpc>
         <a:spcPct val="100000"/>
       </a:lnSpc>
@@ -533,7 +548,7 @@
         <a:srgbClr val="000000"/>
       </a:buClr>
       <a:buFont typeface="Arial"/>
-      <a:defRPr b="0" i="0" sz="1400" u="none" cap="none" strike="noStrike">
+      <a:defRPr sz="1400" b="0" i="0" u="none" strike="noStrike" cap="none">
         <a:solidFill>
           <a:srgbClr val="000000"/>
         </a:solidFill>
@@ -543,7 +558,7 @@
         <a:sym typeface="Arial"/>
       </a:defRPr>
     </a:lvl3pPr>
-    <a:lvl4pPr lvl="3" marR="0" rtl="0" algn="l">
+    <a:lvl4pPr marR="0" lvl="3" algn="l" rtl="0">
       <a:lnSpc>
         <a:spcPct val="100000"/>
       </a:lnSpc>
@@ -557,7 +572,7 @@
         <a:srgbClr val="000000"/>
       </a:buClr>
       <a:buFont typeface="Arial"/>
-      <a:defRPr b="0" i="0" sz="1400" u="none" cap="none" strike="noStrike">
+      <a:defRPr sz="1400" b="0" i="0" u="none" strike="noStrike" cap="none">
         <a:solidFill>
           <a:srgbClr val="000000"/>
         </a:solidFill>
@@ -567,7 +582,7 @@
         <a:sym typeface="Arial"/>
       </a:defRPr>
     </a:lvl4pPr>
-    <a:lvl5pPr lvl="4" marR="0" rtl="0" algn="l">
+    <a:lvl5pPr marR="0" lvl="4" algn="l" rtl="0">
       <a:lnSpc>
         <a:spcPct val="100000"/>
       </a:lnSpc>
@@ -581,7 +596,7 @@
         <a:srgbClr val="000000"/>
       </a:buClr>
       <a:buFont typeface="Arial"/>
-      <a:defRPr b="0" i="0" sz="1400" u="none" cap="none" strike="noStrike">
+      <a:defRPr sz="1400" b="0" i="0" u="none" strike="noStrike" cap="none">
         <a:solidFill>
           <a:srgbClr val="000000"/>
         </a:solidFill>
@@ -591,7 +606,7 @@
         <a:sym typeface="Arial"/>
       </a:defRPr>
     </a:lvl5pPr>
-    <a:lvl6pPr lvl="5" marR="0" rtl="0" algn="l">
+    <a:lvl6pPr marR="0" lvl="5" algn="l" rtl="0">
       <a:lnSpc>
         <a:spcPct val="100000"/>
       </a:lnSpc>
@@ -605,7 +620,7 @@
         <a:srgbClr val="000000"/>
       </a:buClr>
       <a:buFont typeface="Arial"/>
-      <a:defRPr b="0" i="0" sz="1400" u="none" cap="none" strike="noStrike">
+      <a:defRPr sz="1400" b="0" i="0" u="none" strike="noStrike" cap="none">
         <a:solidFill>
           <a:srgbClr val="000000"/>
         </a:solidFill>
@@ -615,7 +630,7 @@
         <a:sym typeface="Arial"/>
       </a:defRPr>
     </a:lvl6pPr>
-    <a:lvl7pPr lvl="6" marR="0" rtl="0" algn="l">
+    <a:lvl7pPr marR="0" lvl="6" algn="l" rtl="0">
       <a:lnSpc>
         <a:spcPct val="100000"/>
       </a:lnSpc>
@@ -629,7 +644,7 @@
         <a:srgbClr val="000000"/>
       </a:buClr>
       <a:buFont typeface="Arial"/>
-      <a:defRPr b="0" i="0" sz="1400" u="none" cap="none" strike="noStrike">
+      <a:defRPr sz="1400" b="0" i="0" u="none" strike="noStrike" cap="none">
         <a:solidFill>
           <a:srgbClr val="000000"/>
         </a:solidFill>
@@ -639,7 +654,7 @@
         <a:sym typeface="Arial"/>
       </a:defRPr>
     </a:lvl7pPr>
-    <a:lvl8pPr lvl="7" marR="0" rtl="0" algn="l">
+    <a:lvl8pPr marR="0" lvl="7" algn="l" rtl="0">
       <a:lnSpc>
         <a:spcPct val="100000"/>
       </a:lnSpc>
@@ -653,7 +668,7 @@
         <a:srgbClr val="000000"/>
       </a:buClr>
       <a:buFont typeface="Arial"/>
-      <a:defRPr b="0" i="0" sz="1400" u="none" cap="none" strike="noStrike">
+      <a:defRPr sz="1400" b="0" i="0" u="none" strike="noStrike" cap="none">
         <a:solidFill>
           <a:srgbClr val="000000"/>
         </a:solidFill>
@@ -663,7 +678,7 @@
         <a:sym typeface="Arial"/>
       </a:defRPr>
     </a:lvl8pPr>
-    <a:lvl9pPr lvl="8" marR="0" rtl="0" algn="l">
+    <a:lvl9pPr marR="0" lvl="8" algn="l" rtl="0">
       <a:lnSpc>
         <a:spcPct val="100000"/>
       </a:lnSpc>
@@ -677,7 +692,7 @@
         <a:srgbClr val="000000"/>
       </a:buClr>
       <a:buFont typeface="Arial"/>
-      <a:defRPr b="0" i="0" sz="1400" u="none" cap="none" strike="noStrike">
+      <a:defRPr sz="1400" b="0" i="0" u="none" strike="noStrike" cap="none">
         <a:solidFill>
           <a:srgbClr val="000000"/>
         </a:solidFill>
@@ -692,11 +707,11 @@
 </file>
 
 <file path=ppt/notesSlides/notesSlide1.xml><?xml version="1.0" encoding="utf-8"?>
-<p:notes xmlns:a="http://schemas.openxmlformats.org/drawingml/2006/main" xmlns:r="http://schemas.openxmlformats.org/officeDocument/2006/relationships" xmlns:mc="http://schemas.openxmlformats.org/markup-compatibility/2006" xmlns:mv="urn:schemas-microsoft-com:mac:vml" xmlns:p="http://schemas.openxmlformats.org/presentationml/2006/main" xmlns:c="http://schemas.openxmlformats.org/drawingml/2006/chart" xmlns:dgm="http://schemas.openxmlformats.org/drawingml/2006/diagram" xmlns:o="urn:schemas-microsoft-com:office:office" xmlns:v="urn:schemas-microsoft-com:vml" xmlns:pvml="urn:schemas-microsoft-com:office:powerpoint" xmlns:com="http://schemas.openxmlformats.org/drawingml/2006/compatibility" xmlns:p14="http://schemas.microsoft.com/office/powerpoint/2010/main" xmlns:p15="http://schemas.microsoft.com/office/powerpoint/2012/main" xmlns:ahyp="http://schemas.microsoft.com/office/drawing/2018/hyperlinkcolor" showMasterPhAnim="0" showMasterSp="0">
+<p:notes xmlns:a="http://schemas.openxmlformats.org/drawingml/2006/main" xmlns:r="http://schemas.openxmlformats.org/officeDocument/2006/relationships" xmlns:p="http://schemas.openxmlformats.org/presentationml/2006/main" showMasterSp="0" showMasterPhAnim="0">
   <p:cSld>
     <p:spTree>
       <p:nvGrpSpPr>
-        <p:cNvPr id="50" name="Shape 50"/>
+        <p:cNvPr id="1" name="Shape 50"/>
         <p:cNvGrpSpPr/>
         <p:nvPr/>
       </p:nvGrpSpPr>
@@ -711,9 +726,11 @@
       <p:sp>
         <p:nvSpPr>
           <p:cNvPr id="51" name="Google Shape;51;p:notes"/>
-          <p:cNvSpPr/>
+          <p:cNvSpPr>
+            <a:spLocks noGrp="1" noRot="1" noChangeAspect="1"/>
+          </p:cNvSpPr>
           <p:nvPr>
-            <p:ph idx="2" type="sldImg"/>
+            <p:ph type="sldImg" idx="2"/>
           </p:nvPr>
         </p:nvSpPr>
         <p:spPr>
@@ -722,9 +739,13 @@
             <a:ext cx="6096075" cy="3429000"/>
           </a:xfrm>
           <a:custGeom>
-            <a:rect b="b" l="l" r="r" t="t"/>
+            <a:avLst/>
+            <a:gdLst/>
+            <a:ahLst/>
+            <a:cxnLst/>
+            <a:rect l="l" t="t" r="r" b="b"/>
             <a:pathLst>
-              <a:path extrusionOk="0" h="120000" w="120000">
+              <a:path w="120000" h="120000" extrusionOk="0">
                 <a:moveTo>
                   <a:pt x="0" y="0"/>
                 </a:moveTo>
@@ -746,9 +767,11 @@
       <p:sp>
         <p:nvSpPr>
           <p:cNvPr id="52" name="Google Shape;52;p:notes"/>
-          <p:cNvSpPr txBox="1"/>
+          <p:cNvSpPr txBox="1">
+            <a:spLocks noGrp="1"/>
+          </p:cNvSpPr>
           <p:nvPr>
-            <p:ph idx="1" type="body"/>
+            <p:ph type="body" idx="1"/>
           </p:nvPr>
         </p:nvSpPr>
         <p:spPr>
@@ -761,12 +784,12 @@
           </a:prstGeom>
         </p:spPr>
         <p:txBody>
-          <a:bodyPr anchorCtr="0" anchor="t" bIns="91425" lIns="91425" spcFirstLastPara="1" rIns="91425" wrap="square" tIns="91425">
+          <a:bodyPr spcFirstLastPara="1" wrap="square" lIns="91425" tIns="91425" rIns="91425" bIns="91425" anchor="t" anchorCtr="0">
             <a:noAutofit/>
           </a:bodyPr>
           <a:lstStyle/>
           <a:p>
-            <a:pPr indent="0" lvl="0" marL="0" rtl="0" algn="l">
+            <a:pPr marL="0" lvl="0" indent="0" algn="l" rtl="0">
               <a:spcBef>
                 <a:spcPts val="0"/>
               </a:spcBef>
@@ -775,9 +798,6 @@
               </a:spcAft>
               <a:buNone/>
             </a:pPr>
-            <a:r>
-              <a:t/>
-            </a:r>
             <a:endParaRPr/>
           </a:p>
         </p:txBody>
@@ -791,11 +811,11 @@
 </file>
 
 <file path=ppt/notesSlides/notesSlide2.xml><?xml version="1.0" encoding="utf-8"?>
-<p:notes xmlns:a="http://schemas.openxmlformats.org/drawingml/2006/main" xmlns:r="http://schemas.openxmlformats.org/officeDocument/2006/relationships" xmlns:mc="http://schemas.openxmlformats.org/markup-compatibility/2006" xmlns:mv="urn:schemas-microsoft-com:mac:vml" xmlns:p="http://schemas.openxmlformats.org/presentationml/2006/main" xmlns:c="http://schemas.openxmlformats.org/drawingml/2006/chart" xmlns:dgm="http://schemas.openxmlformats.org/drawingml/2006/diagram" xmlns:o="urn:schemas-microsoft-com:office:office" xmlns:v="urn:schemas-microsoft-com:vml" xmlns:pvml="urn:schemas-microsoft-com:office:powerpoint" xmlns:com="http://schemas.openxmlformats.org/drawingml/2006/compatibility" xmlns:p14="http://schemas.microsoft.com/office/powerpoint/2010/main" xmlns:p15="http://schemas.microsoft.com/office/powerpoint/2012/main" xmlns:ahyp="http://schemas.microsoft.com/office/drawing/2018/hyperlinkcolor" showMasterPhAnim="0" showMasterSp="0">
+<p:notes xmlns:a="http://schemas.openxmlformats.org/drawingml/2006/main" xmlns:r="http://schemas.openxmlformats.org/officeDocument/2006/relationships" xmlns:p="http://schemas.openxmlformats.org/presentationml/2006/main" showMasterSp="0" showMasterPhAnim="0">
   <p:cSld>
     <p:spTree>
       <p:nvGrpSpPr>
-        <p:cNvPr id="56" name="Shape 56"/>
+        <p:cNvPr id="1" name="Shape 56"/>
         <p:cNvGrpSpPr/>
         <p:nvPr/>
       </p:nvGrpSpPr>
@@ -810,9 +830,11 @@
       <p:sp>
         <p:nvSpPr>
           <p:cNvPr id="57" name="Google Shape;57;g324aa4e752f_0_10:notes"/>
-          <p:cNvSpPr/>
+          <p:cNvSpPr>
+            <a:spLocks noGrp="1" noRot="1" noChangeAspect="1"/>
+          </p:cNvSpPr>
           <p:nvPr>
-            <p:ph idx="2" type="sldImg"/>
+            <p:ph type="sldImg" idx="2"/>
           </p:nvPr>
         </p:nvSpPr>
         <p:spPr>
@@ -821,9 +843,13 @@
             <a:ext cx="6096000" cy="3429000"/>
           </a:xfrm>
           <a:custGeom>
-            <a:rect b="b" l="l" r="r" t="t"/>
+            <a:avLst/>
+            <a:gdLst/>
+            <a:ahLst/>
+            <a:cxnLst/>
+            <a:rect l="l" t="t" r="r" b="b"/>
             <a:pathLst>
-              <a:path extrusionOk="0" h="120000" w="120000">
+              <a:path w="120000" h="120000" extrusionOk="0">
                 <a:moveTo>
                   <a:pt x="0" y="0"/>
                 </a:moveTo>
@@ -845,9 +871,11 @@
       <p:sp>
         <p:nvSpPr>
           <p:cNvPr id="58" name="Google Shape;58;g324aa4e752f_0_10:notes"/>
-          <p:cNvSpPr txBox="1"/>
+          <p:cNvSpPr txBox="1">
+            <a:spLocks noGrp="1"/>
+          </p:cNvSpPr>
           <p:nvPr>
-            <p:ph idx="1" type="body"/>
+            <p:ph type="body" idx="1"/>
           </p:nvPr>
         </p:nvSpPr>
         <p:spPr>
@@ -860,12 +888,12 @@
           </a:prstGeom>
         </p:spPr>
         <p:txBody>
-          <a:bodyPr anchorCtr="0" anchor="t" bIns="91425" lIns="91425" spcFirstLastPara="1" rIns="91425" wrap="square" tIns="91425">
+          <a:bodyPr spcFirstLastPara="1" wrap="square" lIns="91425" tIns="91425" rIns="91425" bIns="91425" anchor="t" anchorCtr="0">
             <a:noAutofit/>
           </a:bodyPr>
           <a:lstStyle/>
           <a:p>
-            <a:pPr indent="0" lvl="0" marL="0" rtl="0" algn="l">
+            <a:pPr marL="0" lvl="0" indent="0" algn="l" rtl="0">
               <a:spcBef>
                 <a:spcPts val="0"/>
               </a:spcBef>
@@ -874,9 +902,6 @@
               </a:spcAft>
               <a:buNone/>
             </a:pPr>
-            <a:r>
-              <a:t/>
-            </a:r>
             <a:endParaRPr/>
           </a:p>
         </p:txBody>
@@ -890,11 +915,11 @@
 </file>
 
 <file path=ppt/notesSlides/notesSlide3.xml><?xml version="1.0" encoding="utf-8"?>
-<p:notes xmlns:a="http://schemas.openxmlformats.org/drawingml/2006/main" xmlns:r="http://schemas.openxmlformats.org/officeDocument/2006/relationships" xmlns:mc="http://schemas.openxmlformats.org/markup-compatibility/2006" xmlns:mv="urn:schemas-microsoft-com:mac:vml" xmlns:p="http://schemas.openxmlformats.org/presentationml/2006/main" xmlns:c="http://schemas.openxmlformats.org/drawingml/2006/chart" xmlns:dgm="http://schemas.openxmlformats.org/drawingml/2006/diagram" xmlns:o="urn:schemas-microsoft-com:office:office" xmlns:v="urn:schemas-microsoft-com:vml" xmlns:pvml="urn:schemas-microsoft-com:office:powerpoint" xmlns:com="http://schemas.openxmlformats.org/drawingml/2006/compatibility" xmlns:p14="http://schemas.microsoft.com/office/powerpoint/2010/main" xmlns:p15="http://schemas.microsoft.com/office/powerpoint/2012/main" xmlns:ahyp="http://schemas.microsoft.com/office/drawing/2018/hyperlinkcolor" showMasterPhAnim="0" showMasterSp="0">
+<p:notes xmlns:a="http://schemas.openxmlformats.org/drawingml/2006/main" xmlns:r="http://schemas.openxmlformats.org/officeDocument/2006/relationships" xmlns:p="http://schemas.openxmlformats.org/presentationml/2006/main" showMasterSp="0" showMasterPhAnim="0">
   <p:cSld>
     <p:spTree>
       <p:nvGrpSpPr>
-        <p:cNvPr id="62" name="Shape 62"/>
+        <p:cNvPr id="1" name="Shape 62"/>
         <p:cNvGrpSpPr/>
         <p:nvPr/>
       </p:nvGrpSpPr>
@@ -909,20 +934,26 @@
       <p:sp>
         <p:nvSpPr>
           <p:cNvPr id="63" name="Google Shape;63;g324aa4e752f_6_0:notes"/>
-          <p:cNvSpPr/>
+          <p:cNvSpPr>
+            <a:spLocks noGrp="1" noRot="1" noChangeAspect="1"/>
+          </p:cNvSpPr>
           <p:nvPr>
-            <p:ph idx="2" type="sldImg"/>
+            <p:ph type="sldImg" idx="2"/>
           </p:nvPr>
         </p:nvSpPr>
         <p:spPr>
           <a:xfrm>
-            <a:off x="381300" y="685800"/>
+            <a:off x="381000" y="685800"/>
             <a:ext cx="6096000" cy="3429000"/>
           </a:xfrm>
           <a:custGeom>
-            <a:rect b="b" l="l" r="r" t="t"/>
+            <a:avLst/>
+            <a:gdLst/>
+            <a:ahLst/>
+            <a:cxnLst/>
+            <a:rect l="l" t="t" r="r" b="b"/>
             <a:pathLst>
-              <a:path extrusionOk="0" h="120000" w="120000">
+              <a:path w="120000" h="120000" extrusionOk="0">
                 <a:moveTo>
                   <a:pt x="0" y="0"/>
                 </a:moveTo>
@@ -944,9 +975,11 @@
       <p:sp>
         <p:nvSpPr>
           <p:cNvPr id="64" name="Google Shape;64;g324aa4e752f_6_0:notes"/>
-          <p:cNvSpPr txBox="1"/>
+          <p:cNvSpPr txBox="1">
+            <a:spLocks noGrp="1"/>
+          </p:cNvSpPr>
           <p:nvPr>
-            <p:ph idx="1" type="body"/>
+            <p:ph type="body" idx="1"/>
           </p:nvPr>
         </p:nvSpPr>
         <p:spPr>
@@ -959,12 +992,12 @@
           </a:prstGeom>
         </p:spPr>
         <p:txBody>
-          <a:bodyPr anchorCtr="0" anchor="t" bIns="91425" lIns="91425" spcFirstLastPara="1" rIns="91425" wrap="square" tIns="91425">
+          <a:bodyPr spcFirstLastPara="1" wrap="square" lIns="91425" tIns="91425" rIns="91425" bIns="91425" anchor="t" anchorCtr="0">
             <a:noAutofit/>
           </a:bodyPr>
           <a:lstStyle/>
           <a:p>
-            <a:pPr indent="0" lvl="0" marL="0" rtl="0" algn="l">
+            <a:pPr marL="0" lvl="0" indent="0" algn="l" rtl="0">
               <a:spcBef>
                 <a:spcPts val="0"/>
               </a:spcBef>
@@ -973,9 +1006,6 @@
               </a:spcAft>
               <a:buNone/>
             </a:pPr>
-            <a:r>
-              <a:t/>
-            </a:r>
             <a:endParaRPr/>
           </a:p>
         </p:txBody>
@@ -989,11 +1019,11 @@
 </file>
 
 <file path=ppt/notesSlides/notesSlide4.xml><?xml version="1.0" encoding="utf-8"?>
-<p:notes xmlns:a="http://schemas.openxmlformats.org/drawingml/2006/main" xmlns:r="http://schemas.openxmlformats.org/officeDocument/2006/relationships" xmlns:mc="http://schemas.openxmlformats.org/markup-compatibility/2006" xmlns:mv="urn:schemas-microsoft-com:mac:vml" xmlns:p="http://schemas.openxmlformats.org/presentationml/2006/main" xmlns:c="http://schemas.openxmlformats.org/drawingml/2006/chart" xmlns:dgm="http://schemas.openxmlformats.org/drawingml/2006/diagram" xmlns:o="urn:schemas-microsoft-com:office:office" xmlns:v="urn:schemas-microsoft-com:vml" xmlns:pvml="urn:schemas-microsoft-com:office:powerpoint" xmlns:com="http://schemas.openxmlformats.org/drawingml/2006/compatibility" xmlns:p14="http://schemas.microsoft.com/office/powerpoint/2010/main" xmlns:p15="http://schemas.microsoft.com/office/powerpoint/2012/main" xmlns:ahyp="http://schemas.microsoft.com/office/drawing/2018/hyperlinkcolor" showMasterPhAnim="0" showMasterSp="0">
+<p:notes xmlns:a="http://schemas.openxmlformats.org/drawingml/2006/main" xmlns:r="http://schemas.openxmlformats.org/officeDocument/2006/relationships" xmlns:p="http://schemas.openxmlformats.org/presentationml/2006/main" showMasterSp="0" showMasterPhAnim="0">
   <p:cSld>
     <p:spTree>
       <p:nvGrpSpPr>
-        <p:cNvPr id="68" name="Shape 68"/>
+        <p:cNvPr id="1" name="Shape 68"/>
         <p:cNvGrpSpPr/>
         <p:nvPr/>
       </p:nvGrpSpPr>
@@ -1008,9 +1038,11 @@
       <p:sp>
         <p:nvSpPr>
           <p:cNvPr id="69" name="Google Shape;69;g324aa4e752f_0_15:notes"/>
-          <p:cNvSpPr/>
+          <p:cNvSpPr>
+            <a:spLocks noGrp="1" noRot="1" noChangeAspect="1"/>
+          </p:cNvSpPr>
           <p:nvPr>
-            <p:ph idx="2" type="sldImg"/>
+            <p:ph type="sldImg" idx="2"/>
           </p:nvPr>
         </p:nvSpPr>
         <p:spPr>
@@ -1019,9 +1051,13 @@
             <a:ext cx="6096000" cy="3429000"/>
           </a:xfrm>
           <a:custGeom>
-            <a:rect b="b" l="l" r="r" t="t"/>
+            <a:avLst/>
+            <a:gdLst/>
+            <a:ahLst/>
+            <a:cxnLst/>
+            <a:rect l="l" t="t" r="r" b="b"/>
             <a:pathLst>
-              <a:path extrusionOk="0" h="120000" w="120000">
+              <a:path w="120000" h="120000" extrusionOk="0">
                 <a:moveTo>
                   <a:pt x="0" y="0"/>
                 </a:moveTo>
@@ -1043,9 +1079,11 @@
       <p:sp>
         <p:nvSpPr>
           <p:cNvPr id="70" name="Google Shape;70;g324aa4e752f_0_15:notes"/>
-          <p:cNvSpPr txBox="1"/>
+          <p:cNvSpPr txBox="1">
+            <a:spLocks noGrp="1"/>
+          </p:cNvSpPr>
           <p:nvPr>
-            <p:ph idx="1" type="body"/>
+            <p:ph type="body" idx="1"/>
           </p:nvPr>
         </p:nvSpPr>
         <p:spPr>
@@ -1058,12 +1096,12 @@
           </a:prstGeom>
         </p:spPr>
         <p:txBody>
-          <a:bodyPr anchorCtr="0" anchor="t" bIns="91425" lIns="91425" spcFirstLastPara="1" rIns="91425" wrap="square" tIns="91425">
+          <a:bodyPr spcFirstLastPara="1" wrap="square" lIns="91425" tIns="91425" rIns="91425" bIns="91425" anchor="t" anchorCtr="0">
             <a:noAutofit/>
           </a:bodyPr>
           <a:lstStyle/>
           <a:p>
-            <a:pPr indent="0" lvl="0" marL="0" rtl="0" algn="l">
+            <a:pPr marL="0" lvl="0" indent="0" algn="l" rtl="0">
               <a:spcBef>
                 <a:spcPts val="0"/>
               </a:spcBef>
@@ -1072,9 +1110,6 @@
               </a:spcAft>
               <a:buNone/>
             </a:pPr>
-            <a:r>
-              <a:t/>
-            </a:r>
             <a:endParaRPr/>
           </a:p>
         </p:txBody>
@@ -1088,11 +1123,11 @@
 </file>
 
 <file path=ppt/notesSlides/notesSlide5.xml><?xml version="1.0" encoding="utf-8"?>
-<p:notes xmlns:a="http://schemas.openxmlformats.org/drawingml/2006/main" xmlns:r="http://schemas.openxmlformats.org/officeDocument/2006/relationships" xmlns:mc="http://schemas.openxmlformats.org/markup-compatibility/2006" xmlns:mv="urn:schemas-microsoft-com:mac:vml" xmlns:p="http://schemas.openxmlformats.org/presentationml/2006/main" xmlns:c="http://schemas.openxmlformats.org/drawingml/2006/chart" xmlns:dgm="http://schemas.openxmlformats.org/drawingml/2006/diagram" xmlns:o="urn:schemas-microsoft-com:office:office" xmlns:v="urn:schemas-microsoft-com:vml" xmlns:pvml="urn:schemas-microsoft-com:office:powerpoint" xmlns:com="http://schemas.openxmlformats.org/drawingml/2006/compatibility" xmlns:p14="http://schemas.microsoft.com/office/powerpoint/2010/main" xmlns:p15="http://schemas.microsoft.com/office/powerpoint/2012/main" xmlns:ahyp="http://schemas.microsoft.com/office/drawing/2018/hyperlinkcolor" showMasterPhAnim="0" showMasterSp="0">
+<p:notes xmlns:a="http://schemas.openxmlformats.org/drawingml/2006/main" xmlns:r="http://schemas.openxmlformats.org/officeDocument/2006/relationships" xmlns:p="http://schemas.openxmlformats.org/presentationml/2006/main" showMasterSp="0" showMasterPhAnim="0">
   <p:cSld>
     <p:spTree>
       <p:nvGrpSpPr>
-        <p:cNvPr id="74" name="Shape 74"/>
+        <p:cNvPr id="1" name="Shape 74"/>
         <p:cNvGrpSpPr/>
         <p:nvPr/>
       </p:nvGrpSpPr>
@@ -1107,9 +1142,11 @@
       <p:sp>
         <p:nvSpPr>
           <p:cNvPr id="75" name="Google Shape;75;g324aa4e752f_6_6:notes"/>
-          <p:cNvSpPr/>
+          <p:cNvSpPr>
+            <a:spLocks noGrp="1" noRot="1" noChangeAspect="1"/>
+          </p:cNvSpPr>
           <p:nvPr>
-            <p:ph idx="2" type="sldImg"/>
+            <p:ph type="sldImg" idx="2"/>
           </p:nvPr>
         </p:nvSpPr>
         <p:spPr>
@@ -1118,9 +1155,13 @@
             <a:ext cx="6096000" cy="3429000"/>
           </a:xfrm>
           <a:custGeom>
-            <a:rect b="b" l="l" r="r" t="t"/>
+            <a:avLst/>
+            <a:gdLst/>
+            <a:ahLst/>
+            <a:cxnLst/>
+            <a:rect l="l" t="t" r="r" b="b"/>
             <a:pathLst>
-              <a:path extrusionOk="0" h="120000" w="120000">
+              <a:path w="120000" h="120000" extrusionOk="0">
                 <a:moveTo>
                   <a:pt x="0" y="0"/>
                 </a:moveTo>
@@ -1142,9 +1183,11 @@
       <p:sp>
         <p:nvSpPr>
           <p:cNvPr id="76" name="Google Shape;76;g324aa4e752f_6_6:notes"/>
-          <p:cNvSpPr txBox="1"/>
+          <p:cNvSpPr txBox="1">
+            <a:spLocks noGrp="1"/>
+          </p:cNvSpPr>
           <p:nvPr>
-            <p:ph idx="1" type="body"/>
+            <p:ph type="body" idx="1"/>
           </p:nvPr>
         </p:nvSpPr>
         <p:spPr>
@@ -1157,12 +1200,12 @@
           </a:prstGeom>
         </p:spPr>
         <p:txBody>
-          <a:bodyPr anchorCtr="0" anchor="t" bIns="91425" lIns="91425" spcFirstLastPara="1" rIns="91425" wrap="square" tIns="91425">
+          <a:bodyPr spcFirstLastPara="1" wrap="square" lIns="91425" tIns="91425" rIns="91425" bIns="91425" anchor="t" anchorCtr="0">
             <a:noAutofit/>
           </a:bodyPr>
           <a:lstStyle/>
           <a:p>
-            <a:pPr indent="0" lvl="0" marL="0" rtl="0" algn="l">
+            <a:pPr marL="0" lvl="0" indent="0" algn="l" rtl="0">
               <a:spcBef>
                 <a:spcPts val="0"/>
               </a:spcBef>
@@ -1171,9 +1214,6 @@
               </a:spcAft>
               <a:buNone/>
             </a:pPr>
-            <a:r>
-              <a:t/>
-            </a:r>
             <a:endParaRPr/>
           </a:p>
         </p:txBody>
@@ -1187,11 +1227,11 @@
 </file>
 
 <file path=ppt/notesSlides/notesSlide6.xml><?xml version="1.0" encoding="utf-8"?>
-<p:notes xmlns:a="http://schemas.openxmlformats.org/drawingml/2006/main" xmlns:r="http://schemas.openxmlformats.org/officeDocument/2006/relationships" xmlns:mc="http://schemas.openxmlformats.org/markup-compatibility/2006" xmlns:mv="urn:schemas-microsoft-com:mac:vml" xmlns:p="http://schemas.openxmlformats.org/presentationml/2006/main" xmlns:c="http://schemas.openxmlformats.org/drawingml/2006/chart" xmlns:dgm="http://schemas.openxmlformats.org/drawingml/2006/diagram" xmlns:o="urn:schemas-microsoft-com:office:office" xmlns:v="urn:schemas-microsoft-com:vml" xmlns:pvml="urn:schemas-microsoft-com:office:powerpoint" xmlns:com="http://schemas.openxmlformats.org/drawingml/2006/compatibility" xmlns:p14="http://schemas.microsoft.com/office/powerpoint/2010/main" xmlns:p15="http://schemas.microsoft.com/office/powerpoint/2012/main" xmlns:ahyp="http://schemas.microsoft.com/office/drawing/2018/hyperlinkcolor" showMasterPhAnim="0" showMasterSp="0">
+<p:notes xmlns:a="http://schemas.openxmlformats.org/drawingml/2006/main" xmlns:r="http://schemas.openxmlformats.org/officeDocument/2006/relationships" xmlns:p="http://schemas.openxmlformats.org/presentationml/2006/main" showMasterSp="0" showMasterPhAnim="0">
   <p:cSld>
     <p:spTree>
       <p:nvGrpSpPr>
-        <p:cNvPr id="80" name="Shape 80"/>
+        <p:cNvPr id="1" name="Shape 80"/>
         <p:cNvGrpSpPr/>
         <p:nvPr/>
       </p:nvGrpSpPr>
@@ -1206,9 +1246,11 @@
       <p:sp>
         <p:nvSpPr>
           <p:cNvPr id="81" name="Google Shape;81;g324aa4e752f_0_20:notes"/>
-          <p:cNvSpPr/>
+          <p:cNvSpPr>
+            <a:spLocks noGrp="1" noRot="1" noChangeAspect="1"/>
+          </p:cNvSpPr>
           <p:nvPr>
-            <p:ph idx="2" type="sldImg"/>
+            <p:ph type="sldImg" idx="2"/>
           </p:nvPr>
         </p:nvSpPr>
         <p:spPr>
@@ -1217,9 +1259,13 @@
             <a:ext cx="6096000" cy="3429000"/>
           </a:xfrm>
           <a:custGeom>
-            <a:rect b="b" l="l" r="r" t="t"/>
+            <a:avLst/>
+            <a:gdLst/>
+            <a:ahLst/>
+            <a:cxnLst/>
+            <a:rect l="l" t="t" r="r" b="b"/>
             <a:pathLst>
-              <a:path extrusionOk="0" h="120000" w="120000">
+              <a:path w="120000" h="120000" extrusionOk="0">
                 <a:moveTo>
                   <a:pt x="0" y="0"/>
                 </a:moveTo>
@@ -1241,9 +1287,11 @@
       <p:sp>
         <p:nvSpPr>
           <p:cNvPr id="82" name="Google Shape;82;g324aa4e752f_0_20:notes"/>
-          <p:cNvSpPr txBox="1"/>
+          <p:cNvSpPr txBox="1">
+            <a:spLocks noGrp="1"/>
+          </p:cNvSpPr>
           <p:nvPr>
-            <p:ph idx="1" type="body"/>
+            <p:ph type="body" idx="1"/>
           </p:nvPr>
         </p:nvSpPr>
         <p:spPr>
@@ -1256,12 +1304,12 @@
           </a:prstGeom>
         </p:spPr>
         <p:txBody>
-          <a:bodyPr anchorCtr="0" anchor="t" bIns="91425" lIns="91425" spcFirstLastPara="1" rIns="91425" wrap="square" tIns="91425">
+          <a:bodyPr spcFirstLastPara="1" wrap="square" lIns="91425" tIns="91425" rIns="91425" bIns="91425" anchor="t" anchorCtr="0">
             <a:noAutofit/>
           </a:bodyPr>
           <a:lstStyle/>
           <a:p>
-            <a:pPr indent="0" lvl="0" marL="0" rtl="0" algn="l">
+            <a:pPr marL="0" lvl="0" indent="0" algn="l" rtl="0">
               <a:spcBef>
                 <a:spcPts val="0"/>
               </a:spcBef>
@@ -1270,9 +1318,6 @@
               </a:spcAft>
               <a:buNone/>
             </a:pPr>
-            <a:r>
-              <a:t/>
-            </a:r>
             <a:endParaRPr/>
           </a:p>
         </p:txBody>
@@ -1286,11 +1331,11 @@
 </file>
 
 <file path=ppt/slideLayouts/slideLayout1.xml><?xml version="1.0" encoding="utf-8"?>
-<p:sldLayout xmlns:a="http://schemas.openxmlformats.org/drawingml/2006/main" xmlns:r="http://schemas.openxmlformats.org/officeDocument/2006/relationships" xmlns:mc="http://schemas.openxmlformats.org/markup-compatibility/2006" xmlns:mv="urn:schemas-microsoft-com:mac:vml" xmlns:p="http://schemas.openxmlformats.org/presentationml/2006/main" xmlns:c="http://schemas.openxmlformats.org/drawingml/2006/chart" xmlns:dgm="http://schemas.openxmlformats.org/drawingml/2006/diagram" xmlns:o="urn:schemas-microsoft-com:office:office" xmlns:v="urn:schemas-microsoft-com:vml" xmlns:pvml="urn:schemas-microsoft-com:office:powerpoint" xmlns:com="http://schemas.openxmlformats.org/drawingml/2006/compatibility" xmlns:p14="http://schemas.microsoft.com/office/powerpoint/2010/main" xmlns:p15="http://schemas.microsoft.com/office/powerpoint/2012/main" xmlns:ahyp="http://schemas.microsoft.com/office/drawing/2018/hyperlinkcolor" matchingName="Title slide" type="title">
+<p:sldLayout xmlns:a="http://schemas.openxmlformats.org/drawingml/2006/main" xmlns:r="http://schemas.openxmlformats.org/officeDocument/2006/relationships" xmlns:p="http://schemas.openxmlformats.org/presentationml/2006/main" matchingName="Title slide" type="title">
   <p:cSld name="TITLE">
     <p:spTree>
       <p:nvGrpSpPr>
-        <p:cNvPr id="9" name="Shape 9"/>
+        <p:cNvPr id="1" name="Shape 9"/>
         <p:cNvGrpSpPr/>
         <p:nvPr/>
       </p:nvGrpSpPr>
@@ -1305,7 +1350,9 @@
       <p:sp>
         <p:nvSpPr>
           <p:cNvPr id="10" name="Google Shape;10;p2"/>
-          <p:cNvSpPr txBox="1"/>
+          <p:cNvSpPr txBox="1">
+            <a:spLocks noGrp="1"/>
+          </p:cNvSpPr>
           <p:nvPr>
             <p:ph type="ctrTitle"/>
           </p:nvPr>
@@ -1320,7 +1367,7 @@
           </a:prstGeom>
         </p:spPr>
         <p:txBody>
-          <a:bodyPr anchorCtr="0" anchor="b" bIns="91425" lIns="91425" spcFirstLastPara="1" rIns="91425" wrap="square" tIns="91425">
+          <a:bodyPr spcFirstLastPara="1" wrap="square" lIns="91425" tIns="91425" rIns="91425" bIns="91425" anchor="b" anchorCtr="0">
             <a:normAutofit/>
           </a:bodyPr>
           <a:lstStyle>
@@ -1424,15 +1471,19 @@
               <a:defRPr sz="5200"/>
             </a:lvl9pPr>
           </a:lstStyle>
-          <a:p/>
+          <a:p>
+            <a:endParaRPr/>
+          </a:p>
         </p:txBody>
       </p:sp>
       <p:sp>
         <p:nvSpPr>
           <p:cNvPr id="11" name="Google Shape;11;p2"/>
-          <p:cNvSpPr txBox="1"/>
+          <p:cNvSpPr txBox="1">
+            <a:spLocks noGrp="1"/>
+          </p:cNvSpPr>
           <p:nvPr>
-            <p:ph idx="1" type="subTitle"/>
+            <p:ph type="subTitle" idx="1"/>
           </p:nvPr>
         </p:nvSpPr>
         <p:spPr>
@@ -1445,7 +1496,7 @@
           </a:prstGeom>
         </p:spPr>
         <p:txBody>
-          <a:bodyPr anchorCtr="0" anchor="t" bIns="91425" lIns="91425" spcFirstLastPara="1" rIns="91425" wrap="square" tIns="91425">
+          <a:bodyPr spcFirstLastPara="1" wrap="square" lIns="91425" tIns="91425" rIns="91425" bIns="91425" anchor="t" anchorCtr="0">
             <a:normAutofit/>
           </a:bodyPr>
           <a:lstStyle>
@@ -1576,15 +1627,19 @@
               <a:defRPr sz="2800"/>
             </a:lvl9pPr>
           </a:lstStyle>
-          <a:p/>
+          <a:p>
+            <a:endParaRPr/>
+          </a:p>
         </p:txBody>
       </p:sp>
       <p:sp>
         <p:nvSpPr>
           <p:cNvPr id="12" name="Google Shape;12;p2"/>
-          <p:cNvSpPr txBox="1"/>
+          <p:cNvSpPr txBox="1">
+            <a:spLocks noGrp="1"/>
+          </p:cNvSpPr>
           <p:nvPr>
-            <p:ph idx="12" type="sldNum"/>
+            <p:ph type="sldNum" idx="12"/>
           </p:nvPr>
         </p:nvSpPr>
         <p:spPr>
@@ -1597,7 +1652,7 @@
           </a:prstGeom>
         </p:spPr>
         <p:txBody>
-          <a:bodyPr anchorCtr="0" anchor="ctr" bIns="91425" lIns="91425" spcFirstLastPara="1" rIns="91425" wrap="square" tIns="91425">
+          <a:bodyPr spcFirstLastPara="1" wrap="square" lIns="91425" tIns="91425" rIns="91425" bIns="91425" anchor="ctr" anchorCtr="0">
             <a:normAutofit/>
           </a:bodyPr>
           <a:lstStyle>
@@ -1639,7 +1694,7 @@
             </a:lvl9pPr>
           </a:lstStyle>
           <a:p>
-            <a:pPr indent="0" lvl="0" marL="0" rtl="0" algn="r">
+            <a:pPr marL="0" lvl="0" indent="0" algn="r" rtl="0">
               <a:spcBef>
                 <a:spcPts val="0"/>
               </a:spcBef>
@@ -1665,11 +1720,11 @@
 </file>
 
 <file path=ppt/slideLayouts/slideLayout10.xml><?xml version="1.0" encoding="utf-8"?>
-<p:sldLayout xmlns:a="http://schemas.openxmlformats.org/drawingml/2006/main" xmlns:r="http://schemas.openxmlformats.org/officeDocument/2006/relationships" xmlns:mc="http://schemas.openxmlformats.org/markup-compatibility/2006" xmlns:mv="urn:schemas-microsoft-com:mac:vml" xmlns:p="http://schemas.openxmlformats.org/presentationml/2006/main" xmlns:c="http://schemas.openxmlformats.org/drawingml/2006/chart" xmlns:dgm="http://schemas.openxmlformats.org/drawingml/2006/diagram" xmlns:o="urn:schemas-microsoft-com:office:office" xmlns:v="urn:schemas-microsoft-com:vml" xmlns:pvml="urn:schemas-microsoft-com:office:powerpoint" xmlns:com="http://schemas.openxmlformats.org/drawingml/2006/compatibility" xmlns:p14="http://schemas.microsoft.com/office/powerpoint/2010/main" xmlns:p15="http://schemas.microsoft.com/office/powerpoint/2012/main" xmlns:ahyp="http://schemas.microsoft.com/office/drawing/2018/hyperlinkcolor" matchingName="Big number">
+<p:sldLayout xmlns:a="http://schemas.openxmlformats.org/drawingml/2006/main" xmlns:r="http://schemas.openxmlformats.org/officeDocument/2006/relationships" xmlns:p="http://schemas.openxmlformats.org/presentationml/2006/main" matchingName="Big number">
   <p:cSld name="BIG_NUMBER">
     <p:spTree>
       <p:nvGrpSpPr>
-        <p:cNvPr id="44" name="Shape 44"/>
+        <p:cNvPr id="1" name="Shape 44"/>
         <p:cNvGrpSpPr/>
         <p:nvPr/>
       </p:nvGrpSpPr>
@@ -1684,9 +1739,11 @@
       <p:sp>
         <p:nvSpPr>
           <p:cNvPr id="45" name="Google Shape;45;p11"/>
-          <p:cNvSpPr txBox="1"/>
+          <p:cNvSpPr txBox="1">
+            <a:spLocks noGrp="1"/>
+          </p:cNvSpPr>
           <p:nvPr>
-            <p:ph hasCustomPrompt="1" type="title"/>
+            <p:ph type="title" hasCustomPrompt="1"/>
           </p:nvPr>
         </p:nvSpPr>
         <p:spPr>
@@ -1699,7 +1756,7 @@
           </a:prstGeom>
         </p:spPr>
         <p:txBody>
-          <a:bodyPr anchorCtr="0" anchor="b" bIns="91425" lIns="91425" spcFirstLastPara="1" rIns="91425" wrap="square" tIns="91425">
+          <a:bodyPr spcFirstLastPara="1" wrap="square" lIns="91425" tIns="91425" rIns="91425" bIns="91425" anchor="b" anchorCtr="0">
             <a:normAutofit/>
           </a:bodyPr>
           <a:lstStyle>
@@ -1813,9 +1870,11 @@
       <p:sp>
         <p:nvSpPr>
           <p:cNvPr id="46" name="Google Shape;46;p11"/>
-          <p:cNvSpPr txBox="1"/>
+          <p:cNvSpPr txBox="1">
+            <a:spLocks noGrp="1"/>
+          </p:cNvSpPr>
           <p:nvPr>
-            <p:ph idx="1" type="body"/>
+            <p:ph type="body" idx="1"/>
           </p:nvPr>
         </p:nvSpPr>
         <p:spPr>
@@ -1828,11 +1887,11 @@
           </a:prstGeom>
         </p:spPr>
         <p:txBody>
-          <a:bodyPr anchorCtr="0" anchor="t" bIns="91425" lIns="91425" spcFirstLastPara="1" rIns="91425" wrap="square" tIns="91425">
+          <a:bodyPr spcFirstLastPara="1" wrap="square" lIns="91425" tIns="91425" rIns="91425" bIns="91425" anchor="t" anchorCtr="0">
             <a:normAutofit/>
           </a:bodyPr>
           <a:lstStyle>
-            <a:lvl1pPr indent="-342900" lvl="0" marL="457200" algn="ctr">
+            <a:lvl1pPr marL="457200" lvl="0" indent="-342900" algn="ctr">
               <a:spcBef>
                 <a:spcPts val="0"/>
               </a:spcBef>
@@ -1843,7 +1902,7 @@
               <a:buChar char="●"/>
               <a:defRPr/>
             </a:lvl1pPr>
-            <a:lvl2pPr indent="-317500" lvl="1" marL="914400" algn="ctr">
+            <a:lvl2pPr marL="914400" lvl="1" indent="-317500" algn="ctr">
               <a:spcBef>
                 <a:spcPts val="0"/>
               </a:spcBef>
@@ -1854,7 +1913,7 @@
               <a:buChar char="○"/>
               <a:defRPr/>
             </a:lvl2pPr>
-            <a:lvl3pPr indent="-317500" lvl="2" marL="1371600" algn="ctr">
+            <a:lvl3pPr marL="1371600" lvl="2" indent="-317500" algn="ctr">
               <a:spcBef>
                 <a:spcPts val="0"/>
               </a:spcBef>
@@ -1865,7 +1924,7 @@
               <a:buChar char="■"/>
               <a:defRPr/>
             </a:lvl3pPr>
-            <a:lvl4pPr indent="-317500" lvl="3" marL="1828800" algn="ctr">
+            <a:lvl4pPr marL="1828800" lvl="3" indent="-317500" algn="ctr">
               <a:spcBef>
                 <a:spcPts val="0"/>
               </a:spcBef>
@@ -1876,7 +1935,7 @@
               <a:buChar char="●"/>
               <a:defRPr/>
             </a:lvl4pPr>
-            <a:lvl5pPr indent="-317500" lvl="4" marL="2286000" algn="ctr">
+            <a:lvl5pPr marL="2286000" lvl="4" indent="-317500" algn="ctr">
               <a:spcBef>
                 <a:spcPts val="0"/>
               </a:spcBef>
@@ -1887,7 +1946,7 @@
               <a:buChar char="○"/>
               <a:defRPr/>
             </a:lvl5pPr>
-            <a:lvl6pPr indent="-317500" lvl="5" marL="2743200" algn="ctr">
+            <a:lvl6pPr marL="2743200" lvl="5" indent="-317500" algn="ctr">
               <a:spcBef>
                 <a:spcPts val="0"/>
               </a:spcBef>
@@ -1898,7 +1957,7 @@
               <a:buChar char="■"/>
               <a:defRPr/>
             </a:lvl6pPr>
-            <a:lvl7pPr indent="-317500" lvl="6" marL="3200400" algn="ctr">
+            <a:lvl7pPr marL="3200400" lvl="6" indent="-317500" algn="ctr">
               <a:spcBef>
                 <a:spcPts val="0"/>
               </a:spcBef>
@@ -1909,7 +1968,7 @@
               <a:buChar char="●"/>
               <a:defRPr/>
             </a:lvl7pPr>
-            <a:lvl8pPr indent="-317500" lvl="7" marL="3657600" algn="ctr">
+            <a:lvl8pPr marL="3657600" lvl="7" indent="-317500" algn="ctr">
               <a:spcBef>
                 <a:spcPts val="0"/>
               </a:spcBef>
@@ -1920,7 +1979,7 @@
               <a:buChar char="○"/>
               <a:defRPr/>
             </a:lvl8pPr>
-            <a:lvl9pPr indent="-317500" lvl="8" marL="4114800" algn="ctr">
+            <a:lvl9pPr marL="4114800" lvl="8" indent="-317500" algn="ctr">
               <a:spcBef>
                 <a:spcPts val="0"/>
               </a:spcBef>
@@ -1932,15 +1991,19 @@
               <a:defRPr/>
             </a:lvl9pPr>
           </a:lstStyle>
-          <a:p/>
+          <a:p>
+            <a:endParaRPr/>
+          </a:p>
         </p:txBody>
       </p:sp>
       <p:sp>
         <p:nvSpPr>
           <p:cNvPr id="47" name="Google Shape;47;p11"/>
-          <p:cNvSpPr txBox="1"/>
+          <p:cNvSpPr txBox="1">
+            <a:spLocks noGrp="1"/>
+          </p:cNvSpPr>
           <p:nvPr>
-            <p:ph idx="12" type="sldNum"/>
+            <p:ph type="sldNum" idx="12"/>
           </p:nvPr>
         </p:nvSpPr>
         <p:spPr>
@@ -1953,7 +2016,7 @@
           </a:prstGeom>
         </p:spPr>
         <p:txBody>
-          <a:bodyPr anchorCtr="0" anchor="ctr" bIns="91425" lIns="91425" spcFirstLastPara="1" rIns="91425" wrap="square" tIns="91425">
+          <a:bodyPr spcFirstLastPara="1" wrap="square" lIns="91425" tIns="91425" rIns="91425" bIns="91425" anchor="ctr" anchorCtr="0">
             <a:normAutofit/>
           </a:bodyPr>
           <a:lstStyle>
@@ -1995,7 +2058,7 @@
             </a:lvl9pPr>
           </a:lstStyle>
           <a:p>
-            <a:pPr indent="0" lvl="0" marL="0" rtl="0" algn="r">
+            <a:pPr marL="0" lvl="0" indent="0" algn="r" rtl="0">
               <a:spcBef>
                 <a:spcPts val="0"/>
               </a:spcBef>
@@ -2021,11 +2084,11 @@
 </file>
 
 <file path=ppt/slideLayouts/slideLayout11.xml><?xml version="1.0" encoding="utf-8"?>
-<p:sldLayout xmlns:a="http://schemas.openxmlformats.org/drawingml/2006/main" xmlns:r="http://schemas.openxmlformats.org/officeDocument/2006/relationships" xmlns:mc="http://schemas.openxmlformats.org/markup-compatibility/2006" xmlns:mv="urn:schemas-microsoft-com:mac:vml" xmlns:p="http://schemas.openxmlformats.org/presentationml/2006/main" xmlns:c="http://schemas.openxmlformats.org/drawingml/2006/chart" xmlns:dgm="http://schemas.openxmlformats.org/drawingml/2006/diagram" xmlns:o="urn:schemas-microsoft-com:office:office" xmlns:v="urn:schemas-microsoft-com:vml" xmlns:pvml="urn:schemas-microsoft-com:office:powerpoint" xmlns:com="http://schemas.openxmlformats.org/drawingml/2006/compatibility" xmlns:p14="http://schemas.microsoft.com/office/powerpoint/2010/main" xmlns:p15="http://schemas.microsoft.com/office/powerpoint/2012/main" xmlns:ahyp="http://schemas.microsoft.com/office/drawing/2018/hyperlinkcolor" matchingName="Blank" type="blank">
+<p:sldLayout xmlns:a="http://schemas.openxmlformats.org/drawingml/2006/main" xmlns:r="http://schemas.openxmlformats.org/officeDocument/2006/relationships" xmlns:p="http://schemas.openxmlformats.org/presentationml/2006/main" matchingName="Blank" type="blank">
   <p:cSld name="BLANK">
     <p:spTree>
       <p:nvGrpSpPr>
-        <p:cNvPr id="48" name="Shape 48"/>
+        <p:cNvPr id="1" name="Shape 48"/>
         <p:cNvGrpSpPr/>
         <p:nvPr/>
       </p:nvGrpSpPr>
@@ -2040,9 +2103,11 @@
       <p:sp>
         <p:nvSpPr>
           <p:cNvPr id="49" name="Google Shape;49;p12"/>
-          <p:cNvSpPr txBox="1"/>
+          <p:cNvSpPr txBox="1">
+            <a:spLocks noGrp="1"/>
+          </p:cNvSpPr>
           <p:nvPr>
-            <p:ph idx="12" type="sldNum"/>
+            <p:ph type="sldNum" idx="12"/>
           </p:nvPr>
         </p:nvSpPr>
         <p:spPr>
@@ -2055,7 +2120,7 @@
           </a:prstGeom>
         </p:spPr>
         <p:txBody>
-          <a:bodyPr anchorCtr="0" anchor="ctr" bIns="91425" lIns="91425" spcFirstLastPara="1" rIns="91425" wrap="square" tIns="91425">
+          <a:bodyPr spcFirstLastPara="1" wrap="square" lIns="91425" tIns="91425" rIns="91425" bIns="91425" anchor="ctr" anchorCtr="0">
             <a:normAutofit/>
           </a:bodyPr>
           <a:lstStyle>
@@ -2097,7 +2162,7 @@
             </a:lvl9pPr>
           </a:lstStyle>
           <a:p>
-            <a:pPr indent="0" lvl="0" marL="0" rtl="0" algn="r">
+            <a:pPr marL="0" lvl="0" indent="0" algn="r" rtl="0">
               <a:spcBef>
                 <a:spcPts val="0"/>
               </a:spcBef>
@@ -2123,11 +2188,11 @@
 </file>
 
 <file path=ppt/slideLayouts/slideLayout2.xml><?xml version="1.0" encoding="utf-8"?>
-<p:sldLayout xmlns:a="http://schemas.openxmlformats.org/drawingml/2006/main" xmlns:r="http://schemas.openxmlformats.org/officeDocument/2006/relationships" xmlns:mc="http://schemas.openxmlformats.org/markup-compatibility/2006" xmlns:mv="urn:schemas-microsoft-com:mac:vml" xmlns:p="http://schemas.openxmlformats.org/presentationml/2006/main" xmlns:c="http://schemas.openxmlformats.org/drawingml/2006/chart" xmlns:dgm="http://schemas.openxmlformats.org/drawingml/2006/diagram" xmlns:o="urn:schemas-microsoft-com:office:office" xmlns:v="urn:schemas-microsoft-com:vml" xmlns:pvml="urn:schemas-microsoft-com:office:powerpoint" xmlns:com="http://schemas.openxmlformats.org/drawingml/2006/compatibility" xmlns:p14="http://schemas.microsoft.com/office/powerpoint/2010/main" xmlns:p15="http://schemas.microsoft.com/office/powerpoint/2012/main" xmlns:ahyp="http://schemas.microsoft.com/office/drawing/2018/hyperlinkcolor" matchingName="Section header" type="secHead">
+<p:sldLayout xmlns:a="http://schemas.openxmlformats.org/drawingml/2006/main" xmlns:r="http://schemas.openxmlformats.org/officeDocument/2006/relationships" xmlns:p="http://schemas.openxmlformats.org/presentationml/2006/main" matchingName="Section header" type="secHead">
   <p:cSld name="SECTION_HEADER">
     <p:spTree>
       <p:nvGrpSpPr>
-        <p:cNvPr id="13" name="Shape 13"/>
+        <p:cNvPr id="1" name="Shape 13"/>
         <p:cNvGrpSpPr/>
         <p:nvPr/>
       </p:nvGrpSpPr>
@@ -2142,7 +2207,9 @@
       <p:sp>
         <p:nvSpPr>
           <p:cNvPr id="14" name="Google Shape;14;p3"/>
-          <p:cNvSpPr txBox="1"/>
+          <p:cNvSpPr txBox="1">
+            <a:spLocks noGrp="1"/>
+          </p:cNvSpPr>
           <p:nvPr>
             <p:ph type="title"/>
           </p:nvPr>
@@ -2157,7 +2224,7 @@
           </a:prstGeom>
         </p:spPr>
         <p:txBody>
-          <a:bodyPr anchorCtr="0" anchor="ctr" bIns="91425" lIns="91425" spcFirstLastPara="1" rIns="91425" wrap="square" tIns="91425">
+          <a:bodyPr spcFirstLastPara="1" wrap="square" lIns="91425" tIns="91425" rIns="91425" bIns="91425" anchor="ctr" anchorCtr="0">
             <a:normAutofit/>
           </a:bodyPr>
           <a:lstStyle>
@@ -2261,15 +2328,19 @@
               <a:defRPr sz="3600"/>
             </a:lvl9pPr>
           </a:lstStyle>
-          <a:p/>
+          <a:p>
+            <a:endParaRPr/>
+          </a:p>
         </p:txBody>
       </p:sp>
       <p:sp>
         <p:nvSpPr>
           <p:cNvPr id="15" name="Google Shape;15;p3"/>
-          <p:cNvSpPr txBox="1"/>
+          <p:cNvSpPr txBox="1">
+            <a:spLocks noGrp="1"/>
+          </p:cNvSpPr>
           <p:nvPr>
-            <p:ph idx="12" type="sldNum"/>
+            <p:ph type="sldNum" idx="12"/>
           </p:nvPr>
         </p:nvSpPr>
         <p:spPr>
@@ -2282,7 +2353,7 @@
           </a:prstGeom>
         </p:spPr>
         <p:txBody>
-          <a:bodyPr anchorCtr="0" anchor="ctr" bIns="91425" lIns="91425" spcFirstLastPara="1" rIns="91425" wrap="square" tIns="91425">
+          <a:bodyPr spcFirstLastPara="1" wrap="square" lIns="91425" tIns="91425" rIns="91425" bIns="91425" anchor="ctr" anchorCtr="0">
             <a:normAutofit/>
           </a:bodyPr>
           <a:lstStyle>
@@ -2324,7 +2395,7 @@
             </a:lvl9pPr>
           </a:lstStyle>
           <a:p>
-            <a:pPr indent="0" lvl="0" marL="0" rtl="0" algn="r">
+            <a:pPr marL="0" lvl="0" indent="0" algn="r" rtl="0">
               <a:spcBef>
                 <a:spcPts val="0"/>
               </a:spcBef>
@@ -2350,11 +2421,11 @@
 </file>
 
 <file path=ppt/slideLayouts/slideLayout3.xml><?xml version="1.0" encoding="utf-8"?>
-<p:sldLayout xmlns:a="http://schemas.openxmlformats.org/drawingml/2006/main" xmlns:r="http://schemas.openxmlformats.org/officeDocument/2006/relationships" xmlns:mc="http://schemas.openxmlformats.org/markup-compatibility/2006" xmlns:mv="urn:schemas-microsoft-com:mac:vml" xmlns:p="http://schemas.openxmlformats.org/presentationml/2006/main" xmlns:c="http://schemas.openxmlformats.org/drawingml/2006/chart" xmlns:dgm="http://schemas.openxmlformats.org/drawingml/2006/diagram" xmlns:o="urn:schemas-microsoft-com:office:office" xmlns:v="urn:schemas-microsoft-com:vml" xmlns:pvml="urn:schemas-microsoft-com:office:powerpoint" xmlns:com="http://schemas.openxmlformats.org/drawingml/2006/compatibility" xmlns:p14="http://schemas.microsoft.com/office/powerpoint/2010/main" xmlns:p15="http://schemas.microsoft.com/office/powerpoint/2012/main" xmlns:ahyp="http://schemas.microsoft.com/office/drawing/2018/hyperlinkcolor" matchingName="Title and body" type="tx">
+<p:sldLayout xmlns:a="http://schemas.openxmlformats.org/drawingml/2006/main" xmlns:r="http://schemas.openxmlformats.org/officeDocument/2006/relationships" xmlns:p="http://schemas.openxmlformats.org/presentationml/2006/main" matchingName="Title and body" type="tx">
   <p:cSld name="TITLE_AND_BODY">
     <p:spTree>
       <p:nvGrpSpPr>
-        <p:cNvPr id="16" name="Shape 16"/>
+        <p:cNvPr id="1" name="Shape 16"/>
         <p:cNvGrpSpPr/>
         <p:nvPr/>
       </p:nvGrpSpPr>
@@ -2369,7 +2440,9 @@
       <p:sp>
         <p:nvSpPr>
           <p:cNvPr id="17" name="Google Shape;17;p4"/>
-          <p:cNvSpPr txBox="1"/>
+          <p:cNvSpPr txBox="1">
+            <a:spLocks noGrp="1"/>
+          </p:cNvSpPr>
           <p:nvPr>
             <p:ph type="title"/>
           </p:nvPr>
@@ -2384,7 +2457,7 @@
           </a:prstGeom>
         </p:spPr>
         <p:txBody>
-          <a:bodyPr anchorCtr="0" anchor="t" bIns="91425" lIns="91425" spcFirstLastPara="1" rIns="91425" wrap="square" tIns="91425">
+          <a:bodyPr spcFirstLastPara="1" wrap="square" lIns="91425" tIns="91425" rIns="91425" bIns="91425" anchor="t" anchorCtr="0">
             <a:normAutofit/>
           </a:bodyPr>
           <a:lstStyle>
@@ -2488,15 +2561,19 @@
               <a:defRPr/>
             </a:lvl9pPr>
           </a:lstStyle>
-          <a:p/>
+          <a:p>
+            <a:endParaRPr/>
+          </a:p>
         </p:txBody>
       </p:sp>
       <p:sp>
         <p:nvSpPr>
           <p:cNvPr id="18" name="Google Shape;18;p4"/>
-          <p:cNvSpPr txBox="1"/>
+          <p:cNvSpPr txBox="1">
+            <a:spLocks noGrp="1"/>
+          </p:cNvSpPr>
           <p:nvPr>
-            <p:ph idx="1" type="body"/>
+            <p:ph type="body" idx="1"/>
           </p:nvPr>
         </p:nvSpPr>
         <p:spPr>
@@ -2509,11 +2586,11 @@
           </a:prstGeom>
         </p:spPr>
         <p:txBody>
-          <a:bodyPr anchorCtr="0" anchor="t" bIns="91425" lIns="91425" spcFirstLastPara="1" rIns="91425" wrap="square" tIns="91425">
+          <a:bodyPr spcFirstLastPara="1" wrap="square" lIns="91425" tIns="91425" rIns="91425" bIns="91425" anchor="t" anchorCtr="0">
             <a:normAutofit/>
           </a:bodyPr>
           <a:lstStyle>
-            <a:lvl1pPr indent="-342900" lvl="0" marL="457200">
+            <a:lvl1pPr marL="457200" lvl="0" indent="-342900">
               <a:spcBef>
                 <a:spcPts val="0"/>
               </a:spcBef>
@@ -2524,7 +2601,7 @@
               <a:buChar char="●"/>
               <a:defRPr/>
             </a:lvl1pPr>
-            <a:lvl2pPr indent="-317500" lvl="1" marL="914400">
+            <a:lvl2pPr marL="914400" lvl="1" indent="-317500">
               <a:spcBef>
                 <a:spcPts val="0"/>
               </a:spcBef>
@@ -2535,7 +2612,7 @@
               <a:buChar char="○"/>
               <a:defRPr/>
             </a:lvl2pPr>
-            <a:lvl3pPr indent="-317500" lvl="2" marL="1371600">
+            <a:lvl3pPr marL="1371600" lvl="2" indent="-317500">
               <a:spcBef>
                 <a:spcPts val="0"/>
               </a:spcBef>
@@ -2546,7 +2623,7 @@
               <a:buChar char="■"/>
               <a:defRPr/>
             </a:lvl3pPr>
-            <a:lvl4pPr indent="-317500" lvl="3" marL="1828800">
+            <a:lvl4pPr marL="1828800" lvl="3" indent="-317500">
               <a:spcBef>
                 <a:spcPts val="0"/>
               </a:spcBef>
@@ -2557,7 +2634,7 @@
               <a:buChar char="●"/>
               <a:defRPr/>
             </a:lvl4pPr>
-            <a:lvl5pPr indent="-317500" lvl="4" marL="2286000">
+            <a:lvl5pPr marL="2286000" lvl="4" indent="-317500">
               <a:spcBef>
                 <a:spcPts val="0"/>
               </a:spcBef>
@@ -2568,7 +2645,7 @@
               <a:buChar char="○"/>
               <a:defRPr/>
             </a:lvl5pPr>
-            <a:lvl6pPr indent="-317500" lvl="5" marL="2743200">
+            <a:lvl6pPr marL="2743200" lvl="5" indent="-317500">
               <a:spcBef>
                 <a:spcPts val="0"/>
               </a:spcBef>
@@ -2579,7 +2656,7 @@
               <a:buChar char="■"/>
               <a:defRPr/>
             </a:lvl6pPr>
-            <a:lvl7pPr indent="-317500" lvl="6" marL="3200400">
+            <a:lvl7pPr marL="3200400" lvl="6" indent="-317500">
               <a:spcBef>
                 <a:spcPts val="0"/>
               </a:spcBef>
@@ -2590,7 +2667,7 @@
               <a:buChar char="●"/>
               <a:defRPr/>
             </a:lvl7pPr>
-            <a:lvl8pPr indent="-317500" lvl="7" marL="3657600">
+            <a:lvl8pPr marL="3657600" lvl="7" indent="-317500">
               <a:spcBef>
                 <a:spcPts val="0"/>
               </a:spcBef>
@@ -2601,7 +2678,7 @@
               <a:buChar char="○"/>
               <a:defRPr/>
             </a:lvl8pPr>
-            <a:lvl9pPr indent="-317500" lvl="8" marL="4114800">
+            <a:lvl9pPr marL="4114800" lvl="8" indent="-317500">
               <a:spcBef>
                 <a:spcPts val="0"/>
               </a:spcBef>
@@ -2613,15 +2690,19 @@
               <a:defRPr/>
             </a:lvl9pPr>
           </a:lstStyle>
-          <a:p/>
+          <a:p>
+            <a:endParaRPr/>
+          </a:p>
         </p:txBody>
       </p:sp>
       <p:sp>
         <p:nvSpPr>
           <p:cNvPr id="19" name="Google Shape;19;p4"/>
-          <p:cNvSpPr txBox="1"/>
+          <p:cNvSpPr txBox="1">
+            <a:spLocks noGrp="1"/>
+          </p:cNvSpPr>
           <p:nvPr>
-            <p:ph idx="12" type="sldNum"/>
+            <p:ph type="sldNum" idx="12"/>
           </p:nvPr>
         </p:nvSpPr>
         <p:spPr>
@@ -2634,7 +2715,7 @@
           </a:prstGeom>
         </p:spPr>
         <p:txBody>
-          <a:bodyPr anchorCtr="0" anchor="ctr" bIns="91425" lIns="91425" spcFirstLastPara="1" rIns="91425" wrap="square" tIns="91425">
+          <a:bodyPr spcFirstLastPara="1" wrap="square" lIns="91425" tIns="91425" rIns="91425" bIns="91425" anchor="ctr" anchorCtr="0">
             <a:normAutofit/>
           </a:bodyPr>
           <a:lstStyle>
@@ -2676,7 +2757,7 @@
             </a:lvl9pPr>
           </a:lstStyle>
           <a:p>
-            <a:pPr indent="0" lvl="0" marL="0" rtl="0" algn="r">
+            <a:pPr marL="0" lvl="0" indent="0" algn="r" rtl="0">
               <a:spcBef>
                 <a:spcPts val="0"/>
               </a:spcBef>
@@ -2702,11 +2783,11 @@
 </file>
 
 <file path=ppt/slideLayouts/slideLayout4.xml><?xml version="1.0" encoding="utf-8"?>
-<p:sldLayout xmlns:a="http://schemas.openxmlformats.org/drawingml/2006/main" xmlns:r="http://schemas.openxmlformats.org/officeDocument/2006/relationships" xmlns:mc="http://schemas.openxmlformats.org/markup-compatibility/2006" xmlns:mv="urn:schemas-microsoft-com:mac:vml" xmlns:p="http://schemas.openxmlformats.org/presentationml/2006/main" xmlns:c="http://schemas.openxmlformats.org/drawingml/2006/chart" xmlns:dgm="http://schemas.openxmlformats.org/drawingml/2006/diagram" xmlns:o="urn:schemas-microsoft-com:office:office" xmlns:v="urn:schemas-microsoft-com:vml" xmlns:pvml="urn:schemas-microsoft-com:office:powerpoint" xmlns:com="http://schemas.openxmlformats.org/drawingml/2006/compatibility" xmlns:p14="http://schemas.microsoft.com/office/powerpoint/2010/main" xmlns:p15="http://schemas.microsoft.com/office/powerpoint/2012/main" xmlns:ahyp="http://schemas.microsoft.com/office/drawing/2018/hyperlinkcolor" matchingName="Title and two columns" type="twoColTx">
+<p:sldLayout xmlns:a="http://schemas.openxmlformats.org/drawingml/2006/main" xmlns:r="http://schemas.openxmlformats.org/officeDocument/2006/relationships" xmlns:p="http://schemas.openxmlformats.org/presentationml/2006/main" matchingName="Title and two columns" type="twoColTx">
   <p:cSld name="TITLE_AND_TWO_COLUMNS">
     <p:spTree>
       <p:nvGrpSpPr>
-        <p:cNvPr id="20" name="Shape 20"/>
+        <p:cNvPr id="1" name="Shape 20"/>
         <p:cNvGrpSpPr/>
         <p:nvPr/>
       </p:nvGrpSpPr>
@@ -2721,7 +2802,9 @@
       <p:sp>
         <p:nvSpPr>
           <p:cNvPr id="21" name="Google Shape;21;p5"/>
-          <p:cNvSpPr txBox="1"/>
+          <p:cNvSpPr txBox="1">
+            <a:spLocks noGrp="1"/>
+          </p:cNvSpPr>
           <p:nvPr>
             <p:ph type="title"/>
           </p:nvPr>
@@ -2736,7 +2819,7 @@
           </a:prstGeom>
         </p:spPr>
         <p:txBody>
-          <a:bodyPr anchorCtr="0" anchor="t" bIns="91425" lIns="91425" spcFirstLastPara="1" rIns="91425" wrap="square" tIns="91425">
+          <a:bodyPr spcFirstLastPara="1" wrap="square" lIns="91425" tIns="91425" rIns="91425" bIns="91425" anchor="t" anchorCtr="0">
             <a:normAutofit/>
           </a:bodyPr>
           <a:lstStyle>
@@ -2840,15 +2923,19 @@
               <a:defRPr/>
             </a:lvl9pPr>
           </a:lstStyle>
-          <a:p/>
+          <a:p>
+            <a:endParaRPr/>
+          </a:p>
         </p:txBody>
       </p:sp>
       <p:sp>
         <p:nvSpPr>
           <p:cNvPr id="22" name="Google Shape;22;p5"/>
-          <p:cNvSpPr txBox="1"/>
+          <p:cNvSpPr txBox="1">
+            <a:spLocks noGrp="1"/>
+          </p:cNvSpPr>
           <p:nvPr>
-            <p:ph idx="1" type="body"/>
+            <p:ph type="body" idx="1"/>
           </p:nvPr>
         </p:nvSpPr>
         <p:spPr>
@@ -2861,11 +2948,11 @@
           </a:prstGeom>
         </p:spPr>
         <p:txBody>
-          <a:bodyPr anchorCtr="0" anchor="t" bIns="91425" lIns="91425" spcFirstLastPara="1" rIns="91425" wrap="square" tIns="91425">
+          <a:bodyPr spcFirstLastPara="1" wrap="square" lIns="91425" tIns="91425" rIns="91425" bIns="91425" anchor="t" anchorCtr="0">
             <a:normAutofit/>
           </a:bodyPr>
           <a:lstStyle>
-            <a:lvl1pPr indent="-317500" lvl="0" marL="457200">
+            <a:lvl1pPr marL="457200" lvl="0" indent="-317500">
               <a:spcBef>
                 <a:spcPts val="0"/>
               </a:spcBef>
@@ -2876,7 +2963,7 @@
               <a:buChar char="●"/>
               <a:defRPr sz="1400"/>
             </a:lvl1pPr>
-            <a:lvl2pPr indent="-304800" lvl="1" marL="914400">
+            <a:lvl2pPr marL="914400" lvl="1" indent="-304800">
               <a:spcBef>
                 <a:spcPts val="0"/>
               </a:spcBef>
@@ -2887,7 +2974,7 @@
               <a:buChar char="○"/>
               <a:defRPr sz="1200"/>
             </a:lvl2pPr>
-            <a:lvl3pPr indent="-304800" lvl="2" marL="1371600">
+            <a:lvl3pPr marL="1371600" lvl="2" indent="-304800">
               <a:spcBef>
                 <a:spcPts val="0"/>
               </a:spcBef>
@@ -2898,7 +2985,7 @@
               <a:buChar char="■"/>
               <a:defRPr sz="1200"/>
             </a:lvl3pPr>
-            <a:lvl4pPr indent="-304800" lvl="3" marL="1828800">
+            <a:lvl4pPr marL="1828800" lvl="3" indent="-304800">
               <a:spcBef>
                 <a:spcPts val="0"/>
               </a:spcBef>
@@ -2909,7 +2996,7 @@
               <a:buChar char="●"/>
               <a:defRPr sz="1200"/>
             </a:lvl4pPr>
-            <a:lvl5pPr indent="-304800" lvl="4" marL="2286000">
+            <a:lvl5pPr marL="2286000" lvl="4" indent="-304800">
               <a:spcBef>
                 <a:spcPts val="0"/>
               </a:spcBef>
@@ -2920,7 +3007,7 @@
               <a:buChar char="○"/>
               <a:defRPr sz="1200"/>
             </a:lvl5pPr>
-            <a:lvl6pPr indent="-304800" lvl="5" marL="2743200">
+            <a:lvl6pPr marL="2743200" lvl="5" indent="-304800">
               <a:spcBef>
                 <a:spcPts val="0"/>
               </a:spcBef>
@@ -2931,7 +3018,7 @@
               <a:buChar char="■"/>
               <a:defRPr sz="1200"/>
             </a:lvl6pPr>
-            <a:lvl7pPr indent="-304800" lvl="6" marL="3200400">
+            <a:lvl7pPr marL="3200400" lvl="6" indent="-304800">
               <a:spcBef>
                 <a:spcPts val="0"/>
               </a:spcBef>
@@ -2942,7 +3029,7 @@
               <a:buChar char="●"/>
               <a:defRPr sz="1200"/>
             </a:lvl7pPr>
-            <a:lvl8pPr indent="-304800" lvl="7" marL="3657600">
+            <a:lvl8pPr marL="3657600" lvl="7" indent="-304800">
               <a:spcBef>
                 <a:spcPts val="0"/>
               </a:spcBef>
@@ -2953,7 +3040,7 @@
               <a:buChar char="○"/>
               <a:defRPr sz="1200"/>
             </a:lvl8pPr>
-            <a:lvl9pPr indent="-304800" lvl="8" marL="4114800">
+            <a:lvl9pPr marL="4114800" lvl="8" indent="-304800">
               <a:spcBef>
                 <a:spcPts val="0"/>
               </a:spcBef>
@@ -2965,15 +3052,19 @@
               <a:defRPr sz="1200"/>
             </a:lvl9pPr>
           </a:lstStyle>
-          <a:p/>
+          <a:p>
+            <a:endParaRPr/>
+          </a:p>
         </p:txBody>
       </p:sp>
       <p:sp>
         <p:nvSpPr>
           <p:cNvPr id="23" name="Google Shape;23;p5"/>
-          <p:cNvSpPr txBox="1"/>
+          <p:cNvSpPr txBox="1">
+            <a:spLocks noGrp="1"/>
+          </p:cNvSpPr>
           <p:nvPr>
-            <p:ph idx="2" type="body"/>
+            <p:ph type="body" idx="2"/>
           </p:nvPr>
         </p:nvSpPr>
         <p:spPr>
@@ -2986,11 +3077,11 @@
           </a:prstGeom>
         </p:spPr>
         <p:txBody>
-          <a:bodyPr anchorCtr="0" anchor="t" bIns="91425" lIns="91425" spcFirstLastPara="1" rIns="91425" wrap="square" tIns="91425">
+          <a:bodyPr spcFirstLastPara="1" wrap="square" lIns="91425" tIns="91425" rIns="91425" bIns="91425" anchor="t" anchorCtr="0">
             <a:normAutofit/>
           </a:bodyPr>
           <a:lstStyle>
-            <a:lvl1pPr indent="-317500" lvl="0" marL="457200">
+            <a:lvl1pPr marL="457200" lvl="0" indent="-317500">
               <a:spcBef>
                 <a:spcPts val="0"/>
               </a:spcBef>
@@ -3001,7 +3092,7 @@
               <a:buChar char="●"/>
               <a:defRPr sz="1400"/>
             </a:lvl1pPr>
-            <a:lvl2pPr indent="-304800" lvl="1" marL="914400">
+            <a:lvl2pPr marL="914400" lvl="1" indent="-304800">
               <a:spcBef>
                 <a:spcPts val="0"/>
               </a:spcBef>
@@ -3012,7 +3103,7 @@
               <a:buChar char="○"/>
               <a:defRPr sz="1200"/>
             </a:lvl2pPr>
-            <a:lvl3pPr indent="-304800" lvl="2" marL="1371600">
+            <a:lvl3pPr marL="1371600" lvl="2" indent="-304800">
               <a:spcBef>
                 <a:spcPts val="0"/>
               </a:spcBef>
@@ -3023,7 +3114,7 @@
               <a:buChar char="■"/>
               <a:defRPr sz="1200"/>
             </a:lvl3pPr>
-            <a:lvl4pPr indent="-304800" lvl="3" marL="1828800">
+            <a:lvl4pPr marL="1828800" lvl="3" indent="-304800">
               <a:spcBef>
                 <a:spcPts val="0"/>
               </a:spcBef>
@@ -3034,7 +3125,7 @@
               <a:buChar char="●"/>
               <a:defRPr sz="1200"/>
             </a:lvl4pPr>
-            <a:lvl5pPr indent="-304800" lvl="4" marL="2286000">
+            <a:lvl5pPr marL="2286000" lvl="4" indent="-304800">
               <a:spcBef>
                 <a:spcPts val="0"/>
               </a:spcBef>
@@ -3045,7 +3136,7 @@
               <a:buChar char="○"/>
               <a:defRPr sz="1200"/>
             </a:lvl5pPr>
-            <a:lvl6pPr indent="-304800" lvl="5" marL="2743200">
+            <a:lvl6pPr marL="2743200" lvl="5" indent="-304800">
               <a:spcBef>
                 <a:spcPts val="0"/>
               </a:spcBef>
@@ -3056,7 +3147,7 @@
               <a:buChar char="■"/>
               <a:defRPr sz="1200"/>
             </a:lvl6pPr>
-            <a:lvl7pPr indent="-304800" lvl="6" marL="3200400">
+            <a:lvl7pPr marL="3200400" lvl="6" indent="-304800">
               <a:spcBef>
                 <a:spcPts val="0"/>
               </a:spcBef>
@@ -3067,7 +3158,7 @@
               <a:buChar char="●"/>
               <a:defRPr sz="1200"/>
             </a:lvl7pPr>
-            <a:lvl8pPr indent="-304800" lvl="7" marL="3657600">
+            <a:lvl8pPr marL="3657600" lvl="7" indent="-304800">
               <a:spcBef>
                 <a:spcPts val="0"/>
               </a:spcBef>
@@ -3078,7 +3169,7 @@
               <a:buChar char="○"/>
               <a:defRPr sz="1200"/>
             </a:lvl8pPr>
-            <a:lvl9pPr indent="-304800" lvl="8" marL="4114800">
+            <a:lvl9pPr marL="4114800" lvl="8" indent="-304800">
               <a:spcBef>
                 <a:spcPts val="0"/>
               </a:spcBef>
@@ -3090,15 +3181,19 @@
               <a:defRPr sz="1200"/>
             </a:lvl9pPr>
           </a:lstStyle>
-          <a:p/>
+          <a:p>
+            <a:endParaRPr/>
+          </a:p>
         </p:txBody>
       </p:sp>
       <p:sp>
         <p:nvSpPr>
           <p:cNvPr id="24" name="Google Shape;24;p5"/>
-          <p:cNvSpPr txBox="1"/>
+          <p:cNvSpPr txBox="1">
+            <a:spLocks noGrp="1"/>
+          </p:cNvSpPr>
           <p:nvPr>
-            <p:ph idx="12" type="sldNum"/>
+            <p:ph type="sldNum" idx="12"/>
           </p:nvPr>
         </p:nvSpPr>
         <p:spPr>
@@ -3111,7 +3206,7 @@
           </a:prstGeom>
         </p:spPr>
         <p:txBody>
-          <a:bodyPr anchorCtr="0" anchor="ctr" bIns="91425" lIns="91425" spcFirstLastPara="1" rIns="91425" wrap="square" tIns="91425">
+          <a:bodyPr spcFirstLastPara="1" wrap="square" lIns="91425" tIns="91425" rIns="91425" bIns="91425" anchor="ctr" anchorCtr="0">
             <a:normAutofit/>
           </a:bodyPr>
           <a:lstStyle>
@@ -3153,7 +3248,7 @@
             </a:lvl9pPr>
           </a:lstStyle>
           <a:p>
-            <a:pPr indent="0" lvl="0" marL="0" rtl="0" algn="r">
+            <a:pPr marL="0" lvl="0" indent="0" algn="r" rtl="0">
               <a:spcBef>
                 <a:spcPts val="0"/>
               </a:spcBef>
@@ -3179,11 +3274,11 @@
 </file>
 
 <file path=ppt/slideLayouts/slideLayout5.xml><?xml version="1.0" encoding="utf-8"?>
-<p:sldLayout xmlns:a="http://schemas.openxmlformats.org/drawingml/2006/main" xmlns:r="http://schemas.openxmlformats.org/officeDocument/2006/relationships" xmlns:mc="http://schemas.openxmlformats.org/markup-compatibility/2006" xmlns:mv="urn:schemas-microsoft-com:mac:vml" xmlns:p="http://schemas.openxmlformats.org/presentationml/2006/main" xmlns:c="http://schemas.openxmlformats.org/drawingml/2006/chart" xmlns:dgm="http://schemas.openxmlformats.org/drawingml/2006/diagram" xmlns:o="urn:schemas-microsoft-com:office:office" xmlns:v="urn:schemas-microsoft-com:vml" xmlns:pvml="urn:schemas-microsoft-com:office:powerpoint" xmlns:com="http://schemas.openxmlformats.org/drawingml/2006/compatibility" xmlns:p14="http://schemas.microsoft.com/office/powerpoint/2010/main" xmlns:p15="http://schemas.microsoft.com/office/powerpoint/2012/main" xmlns:ahyp="http://schemas.microsoft.com/office/drawing/2018/hyperlinkcolor" matchingName="Title only" type="titleOnly">
+<p:sldLayout xmlns:a="http://schemas.openxmlformats.org/drawingml/2006/main" xmlns:r="http://schemas.openxmlformats.org/officeDocument/2006/relationships" xmlns:p="http://schemas.openxmlformats.org/presentationml/2006/main" matchingName="Title only" type="titleOnly">
   <p:cSld name="TITLE_ONLY">
     <p:spTree>
       <p:nvGrpSpPr>
-        <p:cNvPr id="25" name="Shape 25"/>
+        <p:cNvPr id="1" name="Shape 25"/>
         <p:cNvGrpSpPr/>
         <p:nvPr/>
       </p:nvGrpSpPr>
@@ -3198,7 +3293,9 @@
       <p:sp>
         <p:nvSpPr>
           <p:cNvPr id="26" name="Google Shape;26;p6"/>
-          <p:cNvSpPr txBox="1"/>
+          <p:cNvSpPr txBox="1">
+            <a:spLocks noGrp="1"/>
+          </p:cNvSpPr>
           <p:nvPr>
             <p:ph type="title"/>
           </p:nvPr>
@@ -3213,7 +3310,7 @@
           </a:prstGeom>
         </p:spPr>
         <p:txBody>
-          <a:bodyPr anchorCtr="0" anchor="t" bIns="91425" lIns="91425" spcFirstLastPara="1" rIns="91425" wrap="square" tIns="91425">
+          <a:bodyPr spcFirstLastPara="1" wrap="square" lIns="91425" tIns="91425" rIns="91425" bIns="91425" anchor="t" anchorCtr="0">
             <a:normAutofit/>
           </a:bodyPr>
           <a:lstStyle>
@@ -3317,15 +3414,19 @@
               <a:defRPr/>
             </a:lvl9pPr>
           </a:lstStyle>
-          <a:p/>
+          <a:p>
+            <a:endParaRPr/>
+          </a:p>
         </p:txBody>
       </p:sp>
       <p:sp>
         <p:nvSpPr>
           <p:cNvPr id="27" name="Google Shape;27;p6"/>
-          <p:cNvSpPr txBox="1"/>
+          <p:cNvSpPr txBox="1">
+            <a:spLocks noGrp="1"/>
+          </p:cNvSpPr>
           <p:nvPr>
-            <p:ph idx="12" type="sldNum"/>
+            <p:ph type="sldNum" idx="12"/>
           </p:nvPr>
         </p:nvSpPr>
         <p:spPr>
@@ -3338,7 +3439,7 @@
           </a:prstGeom>
         </p:spPr>
         <p:txBody>
-          <a:bodyPr anchorCtr="0" anchor="ctr" bIns="91425" lIns="91425" spcFirstLastPara="1" rIns="91425" wrap="square" tIns="91425">
+          <a:bodyPr spcFirstLastPara="1" wrap="square" lIns="91425" tIns="91425" rIns="91425" bIns="91425" anchor="ctr" anchorCtr="0">
             <a:normAutofit/>
           </a:bodyPr>
           <a:lstStyle>
@@ -3380,7 +3481,7 @@
             </a:lvl9pPr>
           </a:lstStyle>
           <a:p>
-            <a:pPr indent="0" lvl="0" marL="0" rtl="0" algn="r">
+            <a:pPr marL="0" lvl="0" indent="0" algn="r" rtl="0">
               <a:spcBef>
                 <a:spcPts val="0"/>
               </a:spcBef>
@@ -3406,11 +3507,11 @@
 </file>
 
 <file path=ppt/slideLayouts/slideLayout6.xml><?xml version="1.0" encoding="utf-8"?>
-<p:sldLayout xmlns:a="http://schemas.openxmlformats.org/drawingml/2006/main" xmlns:r="http://schemas.openxmlformats.org/officeDocument/2006/relationships" xmlns:mc="http://schemas.openxmlformats.org/markup-compatibility/2006" xmlns:mv="urn:schemas-microsoft-com:mac:vml" xmlns:p="http://schemas.openxmlformats.org/presentationml/2006/main" xmlns:c="http://schemas.openxmlformats.org/drawingml/2006/chart" xmlns:dgm="http://schemas.openxmlformats.org/drawingml/2006/diagram" xmlns:o="urn:schemas-microsoft-com:office:office" xmlns:v="urn:schemas-microsoft-com:vml" xmlns:pvml="urn:schemas-microsoft-com:office:powerpoint" xmlns:com="http://schemas.openxmlformats.org/drawingml/2006/compatibility" xmlns:p14="http://schemas.microsoft.com/office/powerpoint/2010/main" xmlns:p15="http://schemas.microsoft.com/office/powerpoint/2012/main" xmlns:ahyp="http://schemas.microsoft.com/office/drawing/2018/hyperlinkcolor" matchingName="One column text">
+<p:sldLayout xmlns:a="http://schemas.openxmlformats.org/drawingml/2006/main" xmlns:r="http://schemas.openxmlformats.org/officeDocument/2006/relationships" xmlns:p="http://schemas.openxmlformats.org/presentationml/2006/main" matchingName="One column text">
   <p:cSld name="ONE_COLUMN_TEXT">
     <p:spTree>
       <p:nvGrpSpPr>
-        <p:cNvPr id="28" name="Shape 28"/>
+        <p:cNvPr id="1" name="Shape 28"/>
         <p:cNvGrpSpPr/>
         <p:nvPr/>
       </p:nvGrpSpPr>
@@ -3425,7 +3526,9 @@
       <p:sp>
         <p:nvSpPr>
           <p:cNvPr id="29" name="Google Shape;29;p7"/>
-          <p:cNvSpPr txBox="1"/>
+          <p:cNvSpPr txBox="1">
+            <a:spLocks noGrp="1"/>
+          </p:cNvSpPr>
           <p:nvPr>
             <p:ph type="title"/>
           </p:nvPr>
@@ -3440,7 +3543,7 @@
           </a:prstGeom>
         </p:spPr>
         <p:txBody>
-          <a:bodyPr anchorCtr="0" anchor="b" bIns="91425" lIns="91425" spcFirstLastPara="1" rIns="91425" wrap="square" tIns="91425">
+          <a:bodyPr spcFirstLastPara="1" wrap="square" lIns="91425" tIns="91425" rIns="91425" bIns="91425" anchor="b" anchorCtr="0">
             <a:normAutofit/>
           </a:bodyPr>
           <a:lstStyle>
@@ -3544,15 +3647,19 @@
               <a:defRPr sz="2400"/>
             </a:lvl9pPr>
           </a:lstStyle>
-          <a:p/>
+          <a:p>
+            <a:endParaRPr/>
+          </a:p>
         </p:txBody>
       </p:sp>
       <p:sp>
         <p:nvSpPr>
           <p:cNvPr id="30" name="Google Shape;30;p7"/>
-          <p:cNvSpPr txBox="1"/>
+          <p:cNvSpPr txBox="1">
+            <a:spLocks noGrp="1"/>
+          </p:cNvSpPr>
           <p:nvPr>
-            <p:ph idx="1" type="body"/>
+            <p:ph type="body" idx="1"/>
           </p:nvPr>
         </p:nvSpPr>
         <p:spPr>
@@ -3565,11 +3672,11 @@
           </a:prstGeom>
         </p:spPr>
         <p:txBody>
-          <a:bodyPr anchorCtr="0" anchor="t" bIns="91425" lIns="91425" spcFirstLastPara="1" rIns="91425" wrap="square" tIns="91425">
+          <a:bodyPr spcFirstLastPara="1" wrap="square" lIns="91425" tIns="91425" rIns="91425" bIns="91425" anchor="t" anchorCtr="0">
             <a:normAutofit/>
           </a:bodyPr>
           <a:lstStyle>
-            <a:lvl1pPr indent="-304800" lvl="0" marL="457200">
+            <a:lvl1pPr marL="457200" lvl="0" indent="-304800">
               <a:spcBef>
                 <a:spcPts val="0"/>
               </a:spcBef>
@@ -3580,7 +3687,7 @@
               <a:buChar char="●"/>
               <a:defRPr sz="1200"/>
             </a:lvl1pPr>
-            <a:lvl2pPr indent="-304800" lvl="1" marL="914400">
+            <a:lvl2pPr marL="914400" lvl="1" indent="-304800">
               <a:spcBef>
                 <a:spcPts val="0"/>
               </a:spcBef>
@@ -3591,7 +3698,7 @@
               <a:buChar char="○"/>
               <a:defRPr sz="1200"/>
             </a:lvl2pPr>
-            <a:lvl3pPr indent="-304800" lvl="2" marL="1371600">
+            <a:lvl3pPr marL="1371600" lvl="2" indent="-304800">
               <a:spcBef>
                 <a:spcPts val="0"/>
               </a:spcBef>
@@ -3602,7 +3709,7 @@
               <a:buChar char="■"/>
               <a:defRPr sz="1200"/>
             </a:lvl3pPr>
-            <a:lvl4pPr indent="-304800" lvl="3" marL="1828800">
+            <a:lvl4pPr marL="1828800" lvl="3" indent="-304800">
               <a:spcBef>
                 <a:spcPts val="0"/>
               </a:spcBef>
@@ -3613,7 +3720,7 @@
               <a:buChar char="●"/>
               <a:defRPr sz="1200"/>
             </a:lvl4pPr>
-            <a:lvl5pPr indent="-304800" lvl="4" marL="2286000">
+            <a:lvl5pPr marL="2286000" lvl="4" indent="-304800">
               <a:spcBef>
                 <a:spcPts val="0"/>
               </a:spcBef>
@@ -3624,7 +3731,7 @@
               <a:buChar char="○"/>
               <a:defRPr sz="1200"/>
             </a:lvl5pPr>
-            <a:lvl6pPr indent="-304800" lvl="5" marL="2743200">
+            <a:lvl6pPr marL="2743200" lvl="5" indent="-304800">
               <a:spcBef>
                 <a:spcPts val="0"/>
               </a:spcBef>
@@ -3635,7 +3742,7 @@
               <a:buChar char="■"/>
               <a:defRPr sz="1200"/>
             </a:lvl6pPr>
-            <a:lvl7pPr indent="-304800" lvl="6" marL="3200400">
+            <a:lvl7pPr marL="3200400" lvl="6" indent="-304800">
               <a:spcBef>
                 <a:spcPts val="0"/>
               </a:spcBef>
@@ -3646,7 +3753,7 @@
               <a:buChar char="●"/>
               <a:defRPr sz="1200"/>
             </a:lvl7pPr>
-            <a:lvl8pPr indent="-304800" lvl="7" marL="3657600">
+            <a:lvl8pPr marL="3657600" lvl="7" indent="-304800">
               <a:spcBef>
                 <a:spcPts val="0"/>
               </a:spcBef>
@@ -3657,7 +3764,7 @@
               <a:buChar char="○"/>
               <a:defRPr sz="1200"/>
             </a:lvl8pPr>
-            <a:lvl9pPr indent="-304800" lvl="8" marL="4114800">
+            <a:lvl9pPr marL="4114800" lvl="8" indent="-304800">
               <a:spcBef>
                 <a:spcPts val="0"/>
               </a:spcBef>
@@ -3669,15 +3776,19 @@
               <a:defRPr sz="1200"/>
             </a:lvl9pPr>
           </a:lstStyle>
-          <a:p/>
+          <a:p>
+            <a:endParaRPr/>
+          </a:p>
         </p:txBody>
       </p:sp>
       <p:sp>
         <p:nvSpPr>
           <p:cNvPr id="31" name="Google Shape;31;p7"/>
-          <p:cNvSpPr txBox="1"/>
+          <p:cNvSpPr txBox="1">
+            <a:spLocks noGrp="1"/>
+          </p:cNvSpPr>
           <p:nvPr>
-            <p:ph idx="12" type="sldNum"/>
+            <p:ph type="sldNum" idx="12"/>
           </p:nvPr>
         </p:nvSpPr>
         <p:spPr>
@@ -3690,7 +3801,7 @@
           </a:prstGeom>
         </p:spPr>
         <p:txBody>
-          <a:bodyPr anchorCtr="0" anchor="ctr" bIns="91425" lIns="91425" spcFirstLastPara="1" rIns="91425" wrap="square" tIns="91425">
+          <a:bodyPr spcFirstLastPara="1" wrap="square" lIns="91425" tIns="91425" rIns="91425" bIns="91425" anchor="ctr" anchorCtr="0">
             <a:normAutofit/>
           </a:bodyPr>
           <a:lstStyle>
@@ -3732,7 +3843,7 @@
             </a:lvl9pPr>
           </a:lstStyle>
           <a:p>
-            <a:pPr indent="0" lvl="0" marL="0" rtl="0" algn="r">
+            <a:pPr marL="0" lvl="0" indent="0" algn="r" rtl="0">
               <a:spcBef>
                 <a:spcPts val="0"/>
               </a:spcBef>
@@ -3758,11 +3869,11 @@
 </file>
 
 <file path=ppt/slideLayouts/slideLayout7.xml><?xml version="1.0" encoding="utf-8"?>
-<p:sldLayout xmlns:a="http://schemas.openxmlformats.org/drawingml/2006/main" xmlns:r="http://schemas.openxmlformats.org/officeDocument/2006/relationships" xmlns:mc="http://schemas.openxmlformats.org/markup-compatibility/2006" xmlns:mv="urn:schemas-microsoft-com:mac:vml" xmlns:p="http://schemas.openxmlformats.org/presentationml/2006/main" xmlns:c="http://schemas.openxmlformats.org/drawingml/2006/chart" xmlns:dgm="http://schemas.openxmlformats.org/drawingml/2006/diagram" xmlns:o="urn:schemas-microsoft-com:office:office" xmlns:v="urn:schemas-microsoft-com:vml" xmlns:pvml="urn:schemas-microsoft-com:office:powerpoint" xmlns:com="http://schemas.openxmlformats.org/drawingml/2006/compatibility" xmlns:p14="http://schemas.microsoft.com/office/powerpoint/2010/main" xmlns:p15="http://schemas.microsoft.com/office/powerpoint/2012/main" xmlns:ahyp="http://schemas.microsoft.com/office/drawing/2018/hyperlinkcolor" matchingName="Main point">
+<p:sldLayout xmlns:a="http://schemas.openxmlformats.org/drawingml/2006/main" xmlns:r="http://schemas.openxmlformats.org/officeDocument/2006/relationships" xmlns:p="http://schemas.openxmlformats.org/presentationml/2006/main" matchingName="Main point">
   <p:cSld name="MAIN_POINT">
     <p:spTree>
       <p:nvGrpSpPr>
-        <p:cNvPr id="32" name="Shape 32"/>
+        <p:cNvPr id="1" name="Shape 32"/>
         <p:cNvGrpSpPr/>
         <p:nvPr/>
       </p:nvGrpSpPr>
@@ -3777,7 +3888,9 @@
       <p:sp>
         <p:nvSpPr>
           <p:cNvPr id="33" name="Google Shape;33;p8"/>
-          <p:cNvSpPr txBox="1"/>
+          <p:cNvSpPr txBox="1">
+            <a:spLocks noGrp="1"/>
+          </p:cNvSpPr>
           <p:nvPr>
             <p:ph type="title"/>
           </p:nvPr>
@@ -3792,7 +3905,7 @@
           </a:prstGeom>
         </p:spPr>
         <p:txBody>
-          <a:bodyPr anchorCtr="0" anchor="ctr" bIns="91425" lIns="91425" spcFirstLastPara="1" rIns="91425" wrap="square" tIns="91425">
+          <a:bodyPr spcFirstLastPara="1" wrap="square" lIns="91425" tIns="91425" rIns="91425" bIns="91425" anchor="ctr" anchorCtr="0">
             <a:normAutofit/>
           </a:bodyPr>
           <a:lstStyle>
@@ -3896,15 +4009,19 @@
               <a:defRPr sz="4800"/>
             </a:lvl9pPr>
           </a:lstStyle>
-          <a:p/>
+          <a:p>
+            <a:endParaRPr/>
+          </a:p>
         </p:txBody>
       </p:sp>
       <p:sp>
         <p:nvSpPr>
           <p:cNvPr id="34" name="Google Shape;34;p8"/>
-          <p:cNvSpPr txBox="1"/>
+          <p:cNvSpPr txBox="1">
+            <a:spLocks noGrp="1"/>
+          </p:cNvSpPr>
           <p:nvPr>
-            <p:ph idx="12" type="sldNum"/>
+            <p:ph type="sldNum" idx="12"/>
           </p:nvPr>
         </p:nvSpPr>
         <p:spPr>
@@ -3917,7 +4034,7 @@
           </a:prstGeom>
         </p:spPr>
         <p:txBody>
-          <a:bodyPr anchorCtr="0" anchor="ctr" bIns="91425" lIns="91425" spcFirstLastPara="1" rIns="91425" wrap="square" tIns="91425">
+          <a:bodyPr spcFirstLastPara="1" wrap="square" lIns="91425" tIns="91425" rIns="91425" bIns="91425" anchor="ctr" anchorCtr="0">
             <a:normAutofit/>
           </a:bodyPr>
           <a:lstStyle>
@@ -3959,7 +4076,7 @@
             </a:lvl9pPr>
           </a:lstStyle>
           <a:p>
-            <a:pPr indent="0" lvl="0" marL="0" rtl="0" algn="r">
+            <a:pPr marL="0" lvl="0" indent="0" algn="r" rtl="0">
               <a:spcBef>
                 <a:spcPts val="0"/>
               </a:spcBef>
@@ -3985,11 +4102,11 @@
 </file>
 
 <file path=ppt/slideLayouts/slideLayout8.xml><?xml version="1.0" encoding="utf-8"?>
-<p:sldLayout xmlns:a="http://schemas.openxmlformats.org/drawingml/2006/main" xmlns:r="http://schemas.openxmlformats.org/officeDocument/2006/relationships" xmlns:mc="http://schemas.openxmlformats.org/markup-compatibility/2006" xmlns:mv="urn:schemas-microsoft-com:mac:vml" xmlns:p="http://schemas.openxmlformats.org/presentationml/2006/main" xmlns:c="http://schemas.openxmlformats.org/drawingml/2006/chart" xmlns:dgm="http://schemas.openxmlformats.org/drawingml/2006/diagram" xmlns:o="urn:schemas-microsoft-com:office:office" xmlns:v="urn:schemas-microsoft-com:vml" xmlns:pvml="urn:schemas-microsoft-com:office:powerpoint" xmlns:com="http://schemas.openxmlformats.org/drawingml/2006/compatibility" xmlns:p14="http://schemas.microsoft.com/office/powerpoint/2010/main" xmlns:p15="http://schemas.microsoft.com/office/powerpoint/2012/main" xmlns:ahyp="http://schemas.microsoft.com/office/drawing/2018/hyperlinkcolor" matchingName="Section title and description">
+<p:sldLayout xmlns:a="http://schemas.openxmlformats.org/drawingml/2006/main" xmlns:r="http://schemas.openxmlformats.org/officeDocument/2006/relationships" xmlns:p="http://schemas.openxmlformats.org/presentationml/2006/main" matchingName="Section title and description">
   <p:cSld name="SECTION_TITLE_AND_DESCRIPTION">
     <p:spTree>
       <p:nvGrpSpPr>
-        <p:cNvPr id="35" name="Shape 35"/>
+        <p:cNvPr id="1" name="Shape 35"/>
         <p:cNvGrpSpPr/>
         <p:nvPr/>
       </p:nvGrpSpPr>
@@ -4023,12 +4140,12 @@
           </a:ln>
         </p:spPr>
         <p:txBody>
-          <a:bodyPr anchorCtr="0" anchor="ctr" bIns="91425" lIns="91425" spcFirstLastPara="1" rIns="91425" wrap="square" tIns="91425">
+          <a:bodyPr spcFirstLastPara="1" wrap="square" lIns="91425" tIns="91425" rIns="91425" bIns="91425" anchor="ctr" anchorCtr="0">
             <a:noAutofit/>
           </a:bodyPr>
           <a:lstStyle/>
           <a:p>
-            <a:pPr indent="0" lvl="0" marL="0" rtl="0" algn="l">
+            <a:pPr marL="0" lvl="0" indent="0" algn="l" rtl="0">
               <a:spcBef>
                 <a:spcPts val="0"/>
               </a:spcBef>
@@ -4037,9 +4154,6 @@
               </a:spcAft>
               <a:buNone/>
             </a:pPr>
-            <a:r>
-              <a:t/>
-            </a:r>
             <a:endParaRPr/>
           </a:p>
         </p:txBody>
@@ -4047,7 +4161,9 @@
       <p:sp>
         <p:nvSpPr>
           <p:cNvPr id="37" name="Google Shape;37;p9"/>
-          <p:cNvSpPr txBox="1"/>
+          <p:cNvSpPr txBox="1">
+            <a:spLocks noGrp="1"/>
+          </p:cNvSpPr>
           <p:nvPr>
             <p:ph type="title"/>
           </p:nvPr>
@@ -4062,7 +4178,7 @@
           </a:prstGeom>
         </p:spPr>
         <p:txBody>
-          <a:bodyPr anchorCtr="0" anchor="b" bIns="91425" lIns="91425" spcFirstLastPara="1" rIns="91425" wrap="square" tIns="91425">
+          <a:bodyPr spcFirstLastPara="1" wrap="square" lIns="91425" tIns="91425" rIns="91425" bIns="91425" anchor="b" anchorCtr="0">
             <a:normAutofit/>
           </a:bodyPr>
           <a:lstStyle>
@@ -4166,15 +4282,19 @@
               <a:defRPr sz="4200"/>
             </a:lvl9pPr>
           </a:lstStyle>
-          <a:p/>
+          <a:p>
+            <a:endParaRPr/>
+          </a:p>
         </p:txBody>
       </p:sp>
       <p:sp>
         <p:nvSpPr>
           <p:cNvPr id="38" name="Google Shape;38;p9"/>
-          <p:cNvSpPr txBox="1"/>
+          <p:cNvSpPr txBox="1">
+            <a:spLocks noGrp="1"/>
+          </p:cNvSpPr>
           <p:nvPr>
-            <p:ph idx="1" type="subTitle"/>
+            <p:ph type="subTitle" idx="1"/>
           </p:nvPr>
         </p:nvSpPr>
         <p:spPr>
@@ -4187,7 +4307,7 @@
           </a:prstGeom>
         </p:spPr>
         <p:txBody>
-          <a:bodyPr anchorCtr="0" anchor="t" bIns="91425" lIns="91425" spcFirstLastPara="1" rIns="91425" wrap="square" tIns="91425">
+          <a:bodyPr spcFirstLastPara="1" wrap="square" lIns="91425" tIns="91425" rIns="91425" bIns="91425" anchor="t" anchorCtr="0">
             <a:normAutofit/>
           </a:bodyPr>
           <a:lstStyle>
@@ -4318,15 +4438,19 @@
               <a:defRPr sz="2100"/>
             </a:lvl9pPr>
           </a:lstStyle>
-          <a:p/>
+          <a:p>
+            <a:endParaRPr/>
+          </a:p>
         </p:txBody>
       </p:sp>
       <p:sp>
         <p:nvSpPr>
           <p:cNvPr id="39" name="Google Shape;39;p9"/>
-          <p:cNvSpPr txBox="1"/>
+          <p:cNvSpPr txBox="1">
+            <a:spLocks noGrp="1"/>
+          </p:cNvSpPr>
           <p:nvPr>
-            <p:ph idx="2" type="body"/>
+            <p:ph type="body" idx="2"/>
           </p:nvPr>
         </p:nvSpPr>
         <p:spPr>
@@ -4339,11 +4463,11 @@
           </a:prstGeom>
         </p:spPr>
         <p:txBody>
-          <a:bodyPr anchorCtr="0" anchor="ctr" bIns="91425" lIns="91425" spcFirstLastPara="1" rIns="91425" wrap="square" tIns="91425">
+          <a:bodyPr spcFirstLastPara="1" wrap="square" lIns="91425" tIns="91425" rIns="91425" bIns="91425" anchor="ctr" anchorCtr="0">
             <a:normAutofit/>
           </a:bodyPr>
           <a:lstStyle>
-            <a:lvl1pPr indent="-342900" lvl="0" marL="457200">
+            <a:lvl1pPr marL="457200" lvl="0" indent="-342900">
               <a:spcBef>
                 <a:spcPts val="0"/>
               </a:spcBef>
@@ -4354,7 +4478,7 @@
               <a:buChar char="●"/>
               <a:defRPr/>
             </a:lvl1pPr>
-            <a:lvl2pPr indent="-317500" lvl="1" marL="914400">
+            <a:lvl2pPr marL="914400" lvl="1" indent="-317500">
               <a:spcBef>
                 <a:spcPts val="0"/>
               </a:spcBef>
@@ -4365,7 +4489,7 @@
               <a:buChar char="○"/>
               <a:defRPr/>
             </a:lvl2pPr>
-            <a:lvl3pPr indent="-317500" lvl="2" marL="1371600">
+            <a:lvl3pPr marL="1371600" lvl="2" indent="-317500">
               <a:spcBef>
                 <a:spcPts val="0"/>
               </a:spcBef>
@@ -4376,7 +4500,7 @@
               <a:buChar char="■"/>
               <a:defRPr/>
             </a:lvl3pPr>
-            <a:lvl4pPr indent="-317500" lvl="3" marL="1828800">
+            <a:lvl4pPr marL="1828800" lvl="3" indent="-317500">
               <a:spcBef>
                 <a:spcPts val="0"/>
               </a:spcBef>
@@ -4387,7 +4511,7 @@
               <a:buChar char="●"/>
               <a:defRPr/>
             </a:lvl4pPr>
-            <a:lvl5pPr indent="-317500" lvl="4" marL="2286000">
+            <a:lvl5pPr marL="2286000" lvl="4" indent="-317500">
               <a:spcBef>
                 <a:spcPts val="0"/>
               </a:spcBef>
@@ -4398,7 +4522,7 @@
               <a:buChar char="○"/>
               <a:defRPr/>
             </a:lvl5pPr>
-            <a:lvl6pPr indent="-317500" lvl="5" marL="2743200">
+            <a:lvl6pPr marL="2743200" lvl="5" indent="-317500">
               <a:spcBef>
                 <a:spcPts val="0"/>
               </a:spcBef>
@@ -4409,7 +4533,7 @@
               <a:buChar char="■"/>
               <a:defRPr/>
             </a:lvl6pPr>
-            <a:lvl7pPr indent="-317500" lvl="6" marL="3200400">
+            <a:lvl7pPr marL="3200400" lvl="6" indent="-317500">
               <a:spcBef>
                 <a:spcPts val="0"/>
               </a:spcBef>
@@ -4420,7 +4544,7 @@
               <a:buChar char="●"/>
               <a:defRPr/>
             </a:lvl7pPr>
-            <a:lvl8pPr indent="-317500" lvl="7" marL="3657600">
+            <a:lvl8pPr marL="3657600" lvl="7" indent="-317500">
               <a:spcBef>
                 <a:spcPts val="0"/>
               </a:spcBef>
@@ -4431,7 +4555,7 @@
               <a:buChar char="○"/>
               <a:defRPr/>
             </a:lvl8pPr>
-            <a:lvl9pPr indent="-317500" lvl="8" marL="4114800">
+            <a:lvl9pPr marL="4114800" lvl="8" indent="-317500">
               <a:spcBef>
                 <a:spcPts val="0"/>
               </a:spcBef>
@@ -4443,15 +4567,19 @@
               <a:defRPr/>
             </a:lvl9pPr>
           </a:lstStyle>
-          <a:p/>
+          <a:p>
+            <a:endParaRPr/>
+          </a:p>
         </p:txBody>
       </p:sp>
       <p:sp>
         <p:nvSpPr>
           <p:cNvPr id="40" name="Google Shape;40;p9"/>
-          <p:cNvSpPr txBox="1"/>
+          <p:cNvSpPr txBox="1">
+            <a:spLocks noGrp="1"/>
+          </p:cNvSpPr>
           <p:nvPr>
-            <p:ph idx="12" type="sldNum"/>
+            <p:ph type="sldNum" idx="12"/>
           </p:nvPr>
         </p:nvSpPr>
         <p:spPr>
@@ -4464,7 +4592,7 @@
           </a:prstGeom>
         </p:spPr>
         <p:txBody>
-          <a:bodyPr anchorCtr="0" anchor="ctr" bIns="91425" lIns="91425" spcFirstLastPara="1" rIns="91425" wrap="square" tIns="91425">
+          <a:bodyPr spcFirstLastPara="1" wrap="square" lIns="91425" tIns="91425" rIns="91425" bIns="91425" anchor="ctr" anchorCtr="0">
             <a:normAutofit/>
           </a:bodyPr>
           <a:lstStyle>
@@ -4506,7 +4634,7 @@
             </a:lvl9pPr>
           </a:lstStyle>
           <a:p>
-            <a:pPr indent="0" lvl="0" marL="0" rtl="0" algn="r">
+            <a:pPr marL="0" lvl="0" indent="0" algn="r" rtl="0">
               <a:spcBef>
                 <a:spcPts val="0"/>
               </a:spcBef>
@@ -4532,11 +4660,11 @@
 </file>
 
 <file path=ppt/slideLayouts/slideLayout9.xml><?xml version="1.0" encoding="utf-8"?>
-<p:sldLayout xmlns:a="http://schemas.openxmlformats.org/drawingml/2006/main" xmlns:r="http://schemas.openxmlformats.org/officeDocument/2006/relationships" xmlns:mc="http://schemas.openxmlformats.org/markup-compatibility/2006" xmlns:mv="urn:schemas-microsoft-com:mac:vml" xmlns:p="http://schemas.openxmlformats.org/presentationml/2006/main" xmlns:c="http://schemas.openxmlformats.org/drawingml/2006/chart" xmlns:dgm="http://schemas.openxmlformats.org/drawingml/2006/diagram" xmlns:o="urn:schemas-microsoft-com:office:office" xmlns:v="urn:schemas-microsoft-com:vml" xmlns:pvml="urn:schemas-microsoft-com:office:powerpoint" xmlns:com="http://schemas.openxmlformats.org/drawingml/2006/compatibility" xmlns:p14="http://schemas.microsoft.com/office/powerpoint/2010/main" xmlns:p15="http://schemas.microsoft.com/office/powerpoint/2012/main" xmlns:ahyp="http://schemas.microsoft.com/office/drawing/2018/hyperlinkcolor" matchingName="Caption">
+<p:sldLayout xmlns:a="http://schemas.openxmlformats.org/drawingml/2006/main" xmlns:r="http://schemas.openxmlformats.org/officeDocument/2006/relationships" xmlns:p="http://schemas.openxmlformats.org/presentationml/2006/main" matchingName="Caption">
   <p:cSld name="CAPTION_ONLY">
     <p:spTree>
       <p:nvGrpSpPr>
-        <p:cNvPr id="41" name="Shape 41"/>
+        <p:cNvPr id="1" name="Shape 41"/>
         <p:cNvGrpSpPr/>
         <p:nvPr/>
       </p:nvGrpSpPr>
@@ -4551,9 +4679,11 @@
       <p:sp>
         <p:nvSpPr>
           <p:cNvPr id="42" name="Google Shape;42;p10"/>
-          <p:cNvSpPr txBox="1"/>
+          <p:cNvSpPr txBox="1">
+            <a:spLocks noGrp="1"/>
+          </p:cNvSpPr>
           <p:nvPr>
-            <p:ph idx="1" type="body"/>
+            <p:ph type="body" idx="1"/>
           </p:nvPr>
         </p:nvSpPr>
         <p:spPr>
@@ -4566,11 +4696,11 @@
           </a:prstGeom>
         </p:spPr>
         <p:txBody>
-          <a:bodyPr anchorCtr="0" anchor="ctr" bIns="91425" lIns="91425" spcFirstLastPara="1" rIns="91425" wrap="square" tIns="91425">
+          <a:bodyPr spcFirstLastPara="1" wrap="square" lIns="91425" tIns="91425" rIns="91425" bIns="91425" anchor="ctr" anchorCtr="0">
             <a:normAutofit/>
           </a:bodyPr>
           <a:lstStyle>
-            <a:lvl1pPr indent="-228600" lvl="0" marL="457200">
+            <a:lvl1pPr marL="457200" lvl="0" indent="-228600">
               <a:lnSpc>
                 <a:spcPct val="100000"/>
               </a:lnSpc>
@@ -4585,15 +4715,19 @@
               <a:defRPr/>
             </a:lvl1pPr>
           </a:lstStyle>
-          <a:p/>
+          <a:p>
+            <a:endParaRPr/>
+          </a:p>
         </p:txBody>
       </p:sp>
       <p:sp>
         <p:nvSpPr>
           <p:cNvPr id="43" name="Google Shape;43;p10"/>
-          <p:cNvSpPr txBox="1"/>
+          <p:cNvSpPr txBox="1">
+            <a:spLocks noGrp="1"/>
+          </p:cNvSpPr>
           <p:nvPr>
-            <p:ph idx="12" type="sldNum"/>
+            <p:ph type="sldNum" idx="12"/>
           </p:nvPr>
         </p:nvSpPr>
         <p:spPr>
@@ -4606,7 +4740,7 @@
           </a:prstGeom>
         </p:spPr>
         <p:txBody>
-          <a:bodyPr anchorCtr="0" anchor="ctr" bIns="91425" lIns="91425" spcFirstLastPara="1" rIns="91425" wrap="square" tIns="91425">
+          <a:bodyPr spcFirstLastPara="1" wrap="square" lIns="91425" tIns="91425" rIns="91425" bIns="91425" anchor="ctr" anchorCtr="0">
             <a:normAutofit/>
           </a:bodyPr>
           <a:lstStyle>
@@ -4648,7 +4782,7 @@
             </a:lvl9pPr>
           </a:lstStyle>
           <a:p>
-            <a:pPr indent="0" lvl="0" marL="0" rtl="0" algn="r">
+            <a:pPr marL="0" lvl="0" indent="0" algn="r" rtl="0">
               <a:spcBef>
                 <a:spcPts val="0"/>
               </a:spcBef>
@@ -4674,18 +4808,19 @@
 </file>
 
 <file path=ppt/slideMasters/slideMaster1.xml><?xml version="1.0" encoding="utf-8"?>
-<p:sldMaster xmlns:a="http://schemas.openxmlformats.org/drawingml/2006/main" xmlns:r="http://schemas.openxmlformats.org/officeDocument/2006/relationships" xmlns:mc="http://schemas.openxmlformats.org/markup-compatibility/2006" xmlns:mv="urn:schemas-microsoft-com:mac:vml" xmlns:p="http://schemas.openxmlformats.org/presentationml/2006/main" xmlns:c="http://schemas.openxmlformats.org/drawingml/2006/chart" xmlns:dgm="http://schemas.openxmlformats.org/drawingml/2006/diagram" xmlns:o="urn:schemas-microsoft-com:office:office" xmlns:v="urn:schemas-microsoft-com:vml" xmlns:pvml="urn:schemas-microsoft-com:office:powerpoint" xmlns:com="http://schemas.openxmlformats.org/drawingml/2006/compatibility" xmlns:p14="http://schemas.microsoft.com/office/powerpoint/2010/main" xmlns:p15="http://schemas.microsoft.com/office/powerpoint/2012/main" xmlns:ahyp="http://schemas.microsoft.com/office/drawing/2018/hyperlinkcolor">
+<p:sldMaster xmlns:a="http://schemas.openxmlformats.org/drawingml/2006/main" xmlns:r="http://schemas.openxmlformats.org/officeDocument/2006/relationships" xmlns:p="http://schemas.openxmlformats.org/presentationml/2006/main">
   <p:cSld name="simple-light-2">
     <p:bg>
       <p:bgPr>
         <a:solidFill>
           <a:schemeClr val="lt1"/>
         </a:solidFill>
+        <a:effectLst/>
       </p:bgPr>
     </p:bg>
     <p:spTree>
       <p:nvGrpSpPr>
-        <p:cNvPr id="5" name="Shape 5"/>
+        <p:cNvPr id="1" name="Shape 5"/>
         <p:cNvGrpSpPr/>
         <p:nvPr/>
       </p:nvGrpSpPr>
@@ -4700,7 +4835,9 @@
       <p:sp>
         <p:nvSpPr>
           <p:cNvPr id="6" name="Google Shape;6;p1"/>
-          <p:cNvSpPr txBox="1"/>
+          <p:cNvSpPr txBox="1">
+            <a:spLocks noGrp="1"/>
+          </p:cNvSpPr>
           <p:nvPr>
             <p:ph type="title"/>
           </p:nvPr>
@@ -4719,7 +4856,7 @@
           </a:ln>
         </p:spPr>
         <p:txBody>
-          <a:bodyPr anchorCtr="0" anchor="t" bIns="91425" lIns="91425" spcFirstLastPara="1" rIns="91425" wrap="square" tIns="91425">
+          <a:bodyPr spcFirstLastPara="1" wrap="square" lIns="91425" tIns="91425" rIns="91425" bIns="91425" anchor="t" anchorCtr="0">
             <a:normAutofit/>
           </a:bodyPr>
           <a:lstStyle>
@@ -4886,15 +5023,19 @@
               </a:defRPr>
             </a:lvl9pPr>
           </a:lstStyle>
-          <a:p/>
+          <a:p>
+            <a:endParaRPr/>
+          </a:p>
         </p:txBody>
       </p:sp>
       <p:sp>
         <p:nvSpPr>
           <p:cNvPr id="7" name="Google Shape;7;p1"/>
-          <p:cNvSpPr txBox="1"/>
+          <p:cNvSpPr txBox="1">
+            <a:spLocks noGrp="1"/>
+          </p:cNvSpPr>
           <p:nvPr>
-            <p:ph idx="1" type="body"/>
+            <p:ph type="body" idx="1"/>
           </p:nvPr>
         </p:nvSpPr>
         <p:spPr>
@@ -4911,11 +5052,11 @@
           </a:ln>
         </p:spPr>
         <p:txBody>
-          <a:bodyPr anchorCtr="0" anchor="t" bIns="91425" lIns="91425" spcFirstLastPara="1" rIns="91425" wrap="square" tIns="91425">
+          <a:bodyPr spcFirstLastPara="1" wrap="square" lIns="91425" tIns="91425" rIns="91425" bIns="91425" anchor="t" anchorCtr="0">
             <a:normAutofit/>
           </a:bodyPr>
           <a:lstStyle>
-            <a:lvl1pPr indent="-342900" lvl="0" marL="457200">
+            <a:lvl1pPr marL="457200" lvl="0" indent="-342900">
               <a:lnSpc>
                 <a:spcPct val="115000"/>
               </a:lnSpc>
@@ -4936,7 +5077,7 @@
                 </a:solidFill>
               </a:defRPr>
             </a:lvl1pPr>
-            <a:lvl2pPr indent="-317500" lvl="1" marL="914400">
+            <a:lvl2pPr marL="914400" lvl="1" indent="-317500">
               <a:lnSpc>
                 <a:spcPct val="115000"/>
               </a:lnSpc>
@@ -4957,7 +5098,7 @@
                 </a:solidFill>
               </a:defRPr>
             </a:lvl2pPr>
-            <a:lvl3pPr indent="-317500" lvl="2" marL="1371600">
+            <a:lvl3pPr marL="1371600" lvl="2" indent="-317500">
               <a:lnSpc>
                 <a:spcPct val="115000"/>
               </a:lnSpc>
@@ -4978,7 +5119,7 @@
                 </a:solidFill>
               </a:defRPr>
             </a:lvl3pPr>
-            <a:lvl4pPr indent="-317500" lvl="3" marL="1828800">
+            <a:lvl4pPr marL="1828800" lvl="3" indent="-317500">
               <a:lnSpc>
                 <a:spcPct val="115000"/>
               </a:lnSpc>
@@ -4999,7 +5140,7 @@
                 </a:solidFill>
               </a:defRPr>
             </a:lvl4pPr>
-            <a:lvl5pPr indent="-317500" lvl="4" marL="2286000">
+            <a:lvl5pPr marL="2286000" lvl="4" indent="-317500">
               <a:lnSpc>
                 <a:spcPct val="115000"/>
               </a:lnSpc>
@@ -5020,7 +5161,7 @@
                 </a:solidFill>
               </a:defRPr>
             </a:lvl5pPr>
-            <a:lvl6pPr indent="-317500" lvl="5" marL="2743200">
+            <a:lvl6pPr marL="2743200" lvl="5" indent="-317500">
               <a:lnSpc>
                 <a:spcPct val="115000"/>
               </a:lnSpc>
@@ -5041,7 +5182,7 @@
                 </a:solidFill>
               </a:defRPr>
             </a:lvl6pPr>
-            <a:lvl7pPr indent="-317500" lvl="6" marL="3200400">
+            <a:lvl7pPr marL="3200400" lvl="6" indent="-317500">
               <a:lnSpc>
                 <a:spcPct val="115000"/>
               </a:lnSpc>
@@ -5062,7 +5203,7 @@
                 </a:solidFill>
               </a:defRPr>
             </a:lvl7pPr>
-            <a:lvl8pPr indent="-317500" lvl="7" marL="3657600">
+            <a:lvl8pPr marL="3657600" lvl="7" indent="-317500">
               <a:lnSpc>
                 <a:spcPct val="115000"/>
               </a:lnSpc>
@@ -5083,7 +5224,7 @@
                 </a:solidFill>
               </a:defRPr>
             </a:lvl8pPr>
-            <a:lvl9pPr indent="-317500" lvl="8" marL="4114800">
+            <a:lvl9pPr marL="4114800" lvl="8" indent="-317500">
               <a:lnSpc>
                 <a:spcPct val="115000"/>
               </a:lnSpc>
@@ -5105,15 +5246,19 @@
               </a:defRPr>
             </a:lvl9pPr>
           </a:lstStyle>
-          <a:p/>
+          <a:p>
+            <a:endParaRPr/>
+          </a:p>
         </p:txBody>
       </p:sp>
       <p:sp>
         <p:nvSpPr>
           <p:cNvPr id="8" name="Google Shape;8;p1"/>
-          <p:cNvSpPr txBox="1"/>
+          <p:cNvSpPr txBox="1">
+            <a:spLocks noGrp="1"/>
+          </p:cNvSpPr>
           <p:nvPr>
-            <p:ph idx="12" type="sldNum"/>
+            <p:ph type="sldNum" idx="12"/>
           </p:nvPr>
         </p:nvSpPr>
         <p:spPr>
@@ -5130,7 +5275,7 @@
           </a:ln>
         </p:spPr>
         <p:txBody>
-          <a:bodyPr anchorCtr="0" anchor="ctr" bIns="91425" lIns="91425" spcFirstLastPara="1" rIns="91425" wrap="square" tIns="91425">
+          <a:bodyPr spcFirstLastPara="1" wrap="square" lIns="91425" tIns="91425" rIns="91425" bIns="91425" anchor="ctr" anchorCtr="0">
             <a:normAutofit/>
           </a:bodyPr>
           <a:lstStyle>
@@ -5208,7 +5353,7 @@
             </a:lvl9pPr>
           </a:lstStyle>
           <a:p>
-            <a:pPr indent="0" lvl="0" marL="0" rtl="0" algn="r">
+            <a:pPr marL="0" lvl="0" indent="0" algn="r" rtl="0">
               <a:spcBef>
                 <a:spcPts val="0"/>
               </a:spcBef>
@@ -5227,7 +5372,7 @@
       </p:sp>
     </p:spTree>
   </p:cSld>
-  <p:clrMap accent1="accent1" accent2="accent2" accent3="accent3" accent4="accent4" accent5="accent5" accent6="accent6" bg1="lt1" bg2="dk2" tx1="dk1" tx2="lt2" folHlink="folHlink" hlink="hlink"/>
+  <p:clrMap bg1="lt1" tx1="dk1" bg2="dk2" tx2="lt2" accent1="accent1" accent2="accent2" accent3="accent3" accent4="accent4" accent5="accent5" accent6="accent6" hlink="hlink" folHlink="folHlink"/>
   <p:sldLayoutIdLst>
     <p:sldLayoutId id="2147483648" r:id="rId1"/>
     <p:sldLayoutId id="2147483649" r:id="rId2"/>
@@ -5241,10 +5386,10 @@
     <p:sldLayoutId id="2147483657" r:id="rId10"/>
     <p:sldLayoutId id="2147483658" r:id="rId11"/>
   </p:sldLayoutIdLst>
-  <p:hf dt="0" ftr="0" hdr="0" sldNum="0"/>
+  <p:hf sldNum="0" hdr="0" ftr="0" dt="0"/>
   <p:txStyles>
     <p:titleStyle>
-      <a:defPPr lvl="0" marR="0" rtl="0" algn="l">
+      <a:defPPr marR="0" lvl="0" algn="l" rtl="0">
         <a:lnSpc>
           <a:spcPct val="100000"/>
         </a:lnSpc>
@@ -5255,7 +5400,7 @@
           <a:spcPts val="0"/>
         </a:spcAft>
       </a:defPPr>
-      <a:lvl1pPr lvl="0" marR="0" rtl="0" algn="l">
+      <a:lvl1pPr marR="0" lvl="0" algn="l" rtl="0">
         <a:lnSpc>
           <a:spcPct val="100000"/>
         </a:lnSpc>
@@ -5269,7 +5414,7 @@
           <a:srgbClr val="000000"/>
         </a:buClr>
         <a:buFont typeface="Arial"/>
-        <a:defRPr b="0" i="0" sz="1400" u="none" cap="none" strike="noStrike">
+        <a:defRPr sz="1400" b="0" i="0" u="none" strike="noStrike" cap="none">
           <a:solidFill>
             <a:srgbClr val="000000"/>
           </a:solidFill>
@@ -5279,7 +5424,7 @@
           <a:sym typeface="Arial"/>
         </a:defRPr>
       </a:lvl1pPr>
-      <a:lvl2pPr lvl="1" marR="0" rtl="0" algn="l">
+      <a:lvl2pPr marR="0" lvl="1" algn="l" rtl="0">
         <a:lnSpc>
           <a:spcPct val="100000"/>
         </a:lnSpc>
@@ -5293,7 +5438,7 @@
           <a:srgbClr val="000000"/>
         </a:buClr>
         <a:buFont typeface="Arial"/>
-        <a:defRPr b="0" i="0" sz="1400" u="none" cap="none" strike="noStrike">
+        <a:defRPr sz="1400" b="0" i="0" u="none" strike="noStrike" cap="none">
           <a:solidFill>
             <a:srgbClr val="000000"/>
           </a:solidFill>
@@ -5303,7 +5448,7 @@
           <a:sym typeface="Arial"/>
         </a:defRPr>
       </a:lvl2pPr>
-      <a:lvl3pPr lvl="2" marR="0" rtl="0" algn="l">
+      <a:lvl3pPr marR="0" lvl="2" algn="l" rtl="0">
         <a:lnSpc>
           <a:spcPct val="100000"/>
         </a:lnSpc>
@@ -5317,7 +5462,7 @@
           <a:srgbClr val="000000"/>
         </a:buClr>
         <a:buFont typeface="Arial"/>
-        <a:defRPr b="0" i="0" sz="1400" u="none" cap="none" strike="noStrike">
+        <a:defRPr sz="1400" b="0" i="0" u="none" strike="noStrike" cap="none">
           <a:solidFill>
             <a:srgbClr val="000000"/>
           </a:solidFill>
@@ -5327,7 +5472,7 @@
           <a:sym typeface="Arial"/>
         </a:defRPr>
       </a:lvl3pPr>
-      <a:lvl4pPr lvl="3" marR="0" rtl="0" algn="l">
+      <a:lvl4pPr marR="0" lvl="3" algn="l" rtl="0">
         <a:lnSpc>
           <a:spcPct val="100000"/>
         </a:lnSpc>
@@ -5341,7 +5486,7 @@
           <a:srgbClr val="000000"/>
         </a:buClr>
         <a:buFont typeface="Arial"/>
-        <a:defRPr b="0" i="0" sz="1400" u="none" cap="none" strike="noStrike">
+        <a:defRPr sz="1400" b="0" i="0" u="none" strike="noStrike" cap="none">
           <a:solidFill>
             <a:srgbClr val="000000"/>
           </a:solidFill>
@@ -5351,7 +5496,7 @@
           <a:sym typeface="Arial"/>
         </a:defRPr>
       </a:lvl4pPr>
-      <a:lvl5pPr lvl="4" marR="0" rtl="0" algn="l">
+      <a:lvl5pPr marR="0" lvl="4" algn="l" rtl="0">
         <a:lnSpc>
           <a:spcPct val="100000"/>
         </a:lnSpc>
@@ -5365,7 +5510,7 @@
           <a:srgbClr val="000000"/>
         </a:buClr>
         <a:buFont typeface="Arial"/>
-        <a:defRPr b="0" i="0" sz="1400" u="none" cap="none" strike="noStrike">
+        <a:defRPr sz="1400" b="0" i="0" u="none" strike="noStrike" cap="none">
           <a:solidFill>
             <a:srgbClr val="000000"/>
           </a:solidFill>
@@ -5375,7 +5520,7 @@
           <a:sym typeface="Arial"/>
         </a:defRPr>
       </a:lvl5pPr>
-      <a:lvl6pPr lvl="5" marR="0" rtl="0" algn="l">
+      <a:lvl6pPr marR="0" lvl="5" algn="l" rtl="0">
         <a:lnSpc>
           <a:spcPct val="100000"/>
         </a:lnSpc>
@@ -5389,7 +5534,7 @@
           <a:srgbClr val="000000"/>
         </a:buClr>
         <a:buFont typeface="Arial"/>
-        <a:defRPr b="0" i="0" sz="1400" u="none" cap="none" strike="noStrike">
+        <a:defRPr sz="1400" b="0" i="0" u="none" strike="noStrike" cap="none">
           <a:solidFill>
             <a:srgbClr val="000000"/>
           </a:solidFill>
@@ -5399,7 +5544,7 @@
           <a:sym typeface="Arial"/>
         </a:defRPr>
       </a:lvl6pPr>
-      <a:lvl7pPr lvl="6" marR="0" rtl="0" algn="l">
+      <a:lvl7pPr marR="0" lvl="6" algn="l" rtl="0">
         <a:lnSpc>
           <a:spcPct val="100000"/>
         </a:lnSpc>
@@ -5413,7 +5558,7 @@
           <a:srgbClr val="000000"/>
         </a:buClr>
         <a:buFont typeface="Arial"/>
-        <a:defRPr b="0" i="0" sz="1400" u="none" cap="none" strike="noStrike">
+        <a:defRPr sz="1400" b="0" i="0" u="none" strike="noStrike" cap="none">
           <a:solidFill>
             <a:srgbClr val="000000"/>
           </a:solidFill>
@@ -5423,7 +5568,7 @@
           <a:sym typeface="Arial"/>
         </a:defRPr>
       </a:lvl7pPr>
-      <a:lvl8pPr lvl="7" marR="0" rtl="0" algn="l">
+      <a:lvl8pPr marR="0" lvl="7" algn="l" rtl="0">
         <a:lnSpc>
           <a:spcPct val="100000"/>
         </a:lnSpc>
@@ -5437,7 +5582,7 @@
           <a:srgbClr val="000000"/>
         </a:buClr>
         <a:buFont typeface="Arial"/>
-        <a:defRPr b="0" i="0" sz="1400" u="none" cap="none" strike="noStrike">
+        <a:defRPr sz="1400" b="0" i="0" u="none" strike="noStrike" cap="none">
           <a:solidFill>
             <a:srgbClr val="000000"/>
           </a:solidFill>
@@ -5447,7 +5592,7 @@
           <a:sym typeface="Arial"/>
         </a:defRPr>
       </a:lvl8pPr>
-      <a:lvl9pPr lvl="8" marR="0" rtl="0" algn="l">
+      <a:lvl9pPr marR="0" lvl="8" algn="l" rtl="0">
         <a:lnSpc>
           <a:spcPct val="100000"/>
         </a:lnSpc>
@@ -5461,7 +5606,7 @@
           <a:srgbClr val="000000"/>
         </a:buClr>
         <a:buFont typeface="Arial"/>
-        <a:defRPr b="0" i="0" sz="1400" u="none" cap="none" strike="noStrike">
+        <a:defRPr sz="1400" b="0" i="0" u="none" strike="noStrike" cap="none">
           <a:solidFill>
             <a:srgbClr val="000000"/>
           </a:solidFill>
@@ -5473,7 +5618,7 @@
       </a:lvl9pPr>
     </p:titleStyle>
     <p:bodyStyle>
-      <a:defPPr lvl="0" marR="0" rtl="0" algn="l">
+      <a:defPPr marR="0" lvl="0" algn="l" rtl="0">
         <a:lnSpc>
           <a:spcPct val="100000"/>
         </a:lnSpc>
@@ -5484,7 +5629,7 @@
           <a:spcPts val="0"/>
         </a:spcAft>
       </a:defPPr>
-      <a:lvl1pPr lvl="0" marR="0" rtl="0" algn="l">
+      <a:lvl1pPr marR="0" lvl="0" algn="l" rtl="0">
         <a:lnSpc>
           <a:spcPct val="100000"/>
         </a:lnSpc>
@@ -5498,7 +5643,7 @@
           <a:srgbClr val="000000"/>
         </a:buClr>
         <a:buFont typeface="Arial"/>
-        <a:defRPr b="0" i="0" sz="1400" u="none" cap="none" strike="noStrike">
+        <a:defRPr sz="1400" b="0" i="0" u="none" strike="noStrike" cap="none">
           <a:solidFill>
             <a:srgbClr val="000000"/>
           </a:solidFill>
@@ -5508,7 +5653,7 @@
           <a:sym typeface="Arial"/>
         </a:defRPr>
       </a:lvl1pPr>
-      <a:lvl2pPr lvl="1" marR="0" rtl="0" algn="l">
+      <a:lvl2pPr marR="0" lvl="1" algn="l" rtl="0">
         <a:lnSpc>
           <a:spcPct val="100000"/>
         </a:lnSpc>
@@ -5522,7 +5667,7 @@
           <a:srgbClr val="000000"/>
         </a:buClr>
         <a:buFont typeface="Arial"/>
-        <a:defRPr b="0" i="0" sz="1400" u="none" cap="none" strike="noStrike">
+        <a:defRPr sz="1400" b="0" i="0" u="none" strike="noStrike" cap="none">
           <a:solidFill>
             <a:srgbClr val="000000"/>
           </a:solidFill>
@@ -5532,7 +5677,7 @@
           <a:sym typeface="Arial"/>
         </a:defRPr>
       </a:lvl2pPr>
-      <a:lvl3pPr lvl="2" marR="0" rtl="0" algn="l">
+      <a:lvl3pPr marR="0" lvl="2" algn="l" rtl="0">
         <a:lnSpc>
           <a:spcPct val="100000"/>
         </a:lnSpc>
@@ -5546,7 +5691,7 @@
           <a:srgbClr val="000000"/>
         </a:buClr>
         <a:buFont typeface="Arial"/>
-        <a:defRPr b="0" i="0" sz="1400" u="none" cap="none" strike="noStrike">
+        <a:defRPr sz="1400" b="0" i="0" u="none" strike="noStrike" cap="none">
           <a:solidFill>
             <a:srgbClr val="000000"/>
           </a:solidFill>
@@ -5556,7 +5701,7 @@
           <a:sym typeface="Arial"/>
         </a:defRPr>
       </a:lvl3pPr>
-      <a:lvl4pPr lvl="3" marR="0" rtl="0" algn="l">
+      <a:lvl4pPr marR="0" lvl="3" algn="l" rtl="0">
         <a:lnSpc>
           <a:spcPct val="100000"/>
         </a:lnSpc>
@@ -5570,7 +5715,7 @@
           <a:srgbClr val="000000"/>
         </a:buClr>
         <a:buFont typeface="Arial"/>
-        <a:defRPr b="0" i="0" sz="1400" u="none" cap="none" strike="noStrike">
+        <a:defRPr sz="1400" b="0" i="0" u="none" strike="noStrike" cap="none">
           <a:solidFill>
             <a:srgbClr val="000000"/>
           </a:solidFill>
@@ -5580,7 +5725,7 @@
           <a:sym typeface="Arial"/>
         </a:defRPr>
       </a:lvl4pPr>
-      <a:lvl5pPr lvl="4" marR="0" rtl="0" algn="l">
+      <a:lvl5pPr marR="0" lvl="4" algn="l" rtl="0">
         <a:lnSpc>
           <a:spcPct val="100000"/>
         </a:lnSpc>
@@ -5594,7 +5739,7 @@
           <a:srgbClr val="000000"/>
         </a:buClr>
         <a:buFont typeface="Arial"/>
-        <a:defRPr b="0" i="0" sz="1400" u="none" cap="none" strike="noStrike">
+        <a:defRPr sz="1400" b="0" i="0" u="none" strike="noStrike" cap="none">
           <a:solidFill>
             <a:srgbClr val="000000"/>
           </a:solidFill>
@@ -5604,7 +5749,7 @@
           <a:sym typeface="Arial"/>
         </a:defRPr>
       </a:lvl5pPr>
-      <a:lvl6pPr lvl="5" marR="0" rtl="0" algn="l">
+      <a:lvl6pPr marR="0" lvl="5" algn="l" rtl="0">
         <a:lnSpc>
           <a:spcPct val="100000"/>
         </a:lnSpc>
@@ -5618,7 +5763,7 @@
           <a:srgbClr val="000000"/>
         </a:buClr>
         <a:buFont typeface="Arial"/>
-        <a:defRPr b="0" i="0" sz="1400" u="none" cap="none" strike="noStrike">
+        <a:defRPr sz="1400" b="0" i="0" u="none" strike="noStrike" cap="none">
           <a:solidFill>
             <a:srgbClr val="000000"/>
           </a:solidFill>
@@ -5628,7 +5773,7 @@
           <a:sym typeface="Arial"/>
         </a:defRPr>
       </a:lvl6pPr>
-      <a:lvl7pPr lvl="6" marR="0" rtl="0" algn="l">
+      <a:lvl7pPr marR="0" lvl="6" algn="l" rtl="0">
         <a:lnSpc>
           <a:spcPct val="100000"/>
         </a:lnSpc>
@@ -5642,7 +5787,7 @@
           <a:srgbClr val="000000"/>
         </a:buClr>
         <a:buFont typeface="Arial"/>
-        <a:defRPr b="0" i="0" sz="1400" u="none" cap="none" strike="noStrike">
+        <a:defRPr sz="1400" b="0" i="0" u="none" strike="noStrike" cap="none">
           <a:solidFill>
             <a:srgbClr val="000000"/>
           </a:solidFill>
@@ -5652,7 +5797,7 @@
           <a:sym typeface="Arial"/>
         </a:defRPr>
       </a:lvl7pPr>
-      <a:lvl8pPr lvl="7" marR="0" rtl="0" algn="l">
+      <a:lvl8pPr marR="0" lvl="7" algn="l" rtl="0">
         <a:lnSpc>
           <a:spcPct val="100000"/>
         </a:lnSpc>
@@ -5666,7 +5811,7 @@
           <a:srgbClr val="000000"/>
         </a:buClr>
         <a:buFont typeface="Arial"/>
-        <a:defRPr b="0" i="0" sz="1400" u="none" cap="none" strike="noStrike">
+        <a:defRPr sz="1400" b="0" i="0" u="none" strike="noStrike" cap="none">
           <a:solidFill>
             <a:srgbClr val="000000"/>
           </a:solidFill>
@@ -5676,7 +5821,7 @@
           <a:sym typeface="Arial"/>
         </a:defRPr>
       </a:lvl8pPr>
-      <a:lvl9pPr lvl="8" marR="0" rtl="0" algn="l">
+      <a:lvl9pPr marR="0" lvl="8" algn="l" rtl="0">
         <a:lnSpc>
           <a:spcPct val="100000"/>
         </a:lnSpc>
@@ -5690,7 +5835,7 @@
           <a:srgbClr val="000000"/>
         </a:buClr>
         <a:buFont typeface="Arial"/>
-        <a:defRPr b="0" i="0" sz="1400" u="none" cap="none" strike="noStrike">
+        <a:defRPr sz="1400" b="0" i="0" u="none" strike="noStrike" cap="none">
           <a:solidFill>
             <a:srgbClr val="000000"/>
           </a:solidFill>
@@ -5702,7 +5847,7 @@
       </a:lvl9pPr>
     </p:bodyStyle>
     <p:otherStyle>
-      <a:defPPr lvl="0" marR="0" rtl="0" algn="l">
+      <a:defPPr marR="0" lvl="0" algn="l" rtl="0">
         <a:lnSpc>
           <a:spcPct val="100000"/>
         </a:lnSpc>
@@ -5713,7 +5858,7 @@
           <a:spcPts val="0"/>
         </a:spcAft>
       </a:defPPr>
-      <a:lvl1pPr lvl="0" marR="0" rtl="0" algn="l">
+      <a:lvl1pPr marR="0" lvl="0" algn="l" rtl="0">
         <a:lnSpc>
           <a:spcPct val="100000"/>
         </a:lnSpc>
@@ -5727,7 +5872,7 @@
           <a:srgbClr val="000000"/>
         </a:buClr>
         <a:buFont typeface="Arial"/>
-        <a:defRPr b="0" i="0" sz="1400" u="none" cap="none" strike="noStrike">
+        <a:defRPr sz="1400" b="0" i="0" u="none" strike="noStrike" cap="none">
           <a:solidFill>
             <a:srgbClr val="000000"/>
           </a:solidFill>
@@ -5737,7 +5882,7 @@
           <a:sym typeface="Arial"/>
         </a:defRPr>
       </a:lvl1pPr>
-      <a:lvl2pPr lvl="1" marR="0" rtl="0" algn="l">
+      <a:lvl2pPr marR="0" lvl="1" algn="l" rtl="0">
         <a:lnSpc>
           <a:spcPct val="100000"/>
         </a:lnSpc>
@@ -5751,7 +5896,7 @@
           <a:srgbClr val="000000"/>
         </a:buClr>
         <a:buFont typeface="Arial"/>
-        <a:defRPr b="0" i="0" sz="1400" u="none" cap="none" strike="noStrike">
+        <a:defRPr sz="1400" b="0" i="0" u="none" strike="noStrike" cap="none">
           <a:solidFill>
             <a:srgbClr val="000000"/>
           </a:solidFill>
@@ -5761,7 +5906,7 @@
           <a:sym typeface="Arial"/>
         </a:defRPr>
       </a:lvl2pPr>
-      <a:lvl3pPr lvl="2" marR="0" rtl="0" algn="l">
+      <a:lvl3pPr marR="0" lvl="2" algn="l" rtl="0">
         <a:lnSpc>
           <a:spcPct val="100000"/>
         </a:lnSpc>
@@ -5775,7 +5920,7 @@
           <a:srgbClr val="000000"/>
         </a:buClr>
         <a:buFont typeface="Arial"/>
-        <a:defRPr b="0" i="0" sz="1400" u="none" cap="none" strike="noStrike">
+        <a:defRPr sz="1400" b="0" i="0" u="none" strike="noStrike" cap="none">
           <a:solidFill>
             <a:srgbClr val="000000"/>
           </a:solidFill>
@@ -5785,7 +5930,7 @@
           <a:sym typeface="Arial"/>
         </a:defRPr>
       </a:lvl3pPr>
-      <a:lvl4pPr lvl="3" marR="0" rtl="0" algn="l">
+      <a:lvl4pPr marR="0" lvl="3" algn="l" rtl="0">
         <a:lnSpc>
           <a:spcPct val="100000"/>
         </a:lnSpc>
@@ -5799,7 +5944,7 @@
           <a:srgbClr val="000000"/>
         </a:buClr>
         <a:buFont typeface="Arial"/>
-        <a:defRPr b="0" i="0" sz="1400" u="none" cap="none" strike="noStrike">
+        <a:defRPr sz="1400" b="0" i="0" u="none" strike="noStrike" cap="none">
           <a:solidFill>
             <a:srgbClr val="000000"/>
           </a:solidFill>
@@ -5809,7 +5954,7 @@
           <a:sym typeface="Arial"/>
         </a:defRPr>
       </a:lvl4pPr>
-      <a:lvl5pPr lvl="4" marR="0" rtl="0" algn="l">
+      <a:lvl5pPr marR="0" lvl="4" algn="l" rtl="0">
         <a:lnSpc>
           <a:spcPct val="100000"/>
         </a:lnSpc>
@@ -5823,7 +5968,7 @@
           <a:srgbClr val="000000"/>
         </a:buClr>
         <a:buFont typeface="Arial"/>
-        <a:defRPr b="0" i="0" sz="1400" u="none" cap="none" strike="noStrike">
+        <a:defRPr sz="1400" b="0" i="0" u="none" strike="noStrike" cap="none">
           <a:solidFill>
             <a:srgbClr val="000000"/>
           </a:solidFill>
@@ -5833,7 +5978,7 @@
           <a:sym typeface="Arial"/>
         </a:defRPr>
       </a:lvl5pPr>
-      <a:lvl6pPr lvl="5" marR="0" rtl="0" algn="l">
+      <a:lvl6pPr marR="0" lvl="5" algn="l" rtl="0">
         <a:lnSpc>
           <a:spcPct val="100000"/>
         </a:lnSpc>
@@ -5847,7 +5992,7 @@
           <a:srgbClr val="000000"/>
         </a:buClr>
         <a:buFont typeface="Arial"/>
-        <a:defRPr b="0" i="0" sz="1400" u="none" cap="none" strike="noStrike">
+        <a:defRPr sz="1400" b="0" i="0" u="none" strike="noStrike" cap="none">
           <a:solidFill>
             <a:srgbClr val="000000"/>
           </a:solidFill>
@@ -5857,7 +6002,7 @@
           <a:sym typeface="Arial"/>
         </a:defRPr>
       </a:lvl6pPr>
-      <a:lvl7pPr lvl="6" marR="0" rtl="0" algn="l">
+      <a:lvl7pPr marR="0" lvl="6" algn="l" rtl="0">
         <a:lnSpc>
           <a:spcPct val="100000"/>
         </a:lnSpc>
@@ -5871,7 +6016,7 @@
           <a:srgbClr val="000000"/>
         </a:buClr>
         <a:buFont typeface="Arial"/>
-        <a:defRPr b="0" i="0" sz="1400" u="none" cap="none" strike="noStrike">
+        <a:defRPr sz="1400" b="0" i="0" u="none" strike="noStrike" cap="none">
           <a:solidFill>
             <a:srgbClr val="000000"/>
           </a:solidFill>
@@ -5881,7 +6026,7 @@
           <a:sym typeface="Arial"/>
         </a:defRPr>
       </a:lvl7pPr>
-      <a:lvl8pPr lvl="7" marR="0" rtl="0" algn="l">
+      <a:lvl8pPr marR="0" lvl="7" algn="l" rtl="0">
         <a:lnSpc>
           <a:spcPct val="100000"/>
         </a:lnSpc>
@@ -5895,7 +6040,7 @@
           <a:srgbClr val="000000"/>
         </a:buClr>
         <a:buFont typeface="Arial"/>
-        <a:defRPr b="0" i="0" sz="1400" u="none" cap="none" strike="noStrike">
+        <a:defRPr sz="1400" b="0" i="0" u="none" strike="noStrike" cap="none">
           <a:solidFill>
             <a:srgbClr val="000000"/>
           </a:solidFill>
@@ -5905,7 +6050,7 @@
           <a:sym typeface="Arial"/>
         </a:defRPr>
       </a:lvl8pPr>
-      <a:lvl9pPr lvl="8" marR="0" rtl="0" algn="l">
+      <a:lvl9pPr marR="0" lvl="8" algn="l" rtl="0">
         <a:lnSpc>
           <a:spcPct val="100000"/>
         </a:lnSpc>
@@ -5919,7 +6064,7 @@
           <a:srgbClr val="000000"/>
         </a:buClr>
         <a:buFont typeface="Arial"/>
-        <a:defRPr b="0" i="0" sz="1400" u="none" cap="none" strike="noStrike">
+        <a:defRPr sz="1400" b="0" i="0" u="none" strike="noStrike" cap="none">
           <a:solidFill>
             <a:srgbClr val="000000"/>
           </a:solidFill>
@@ -5935,11 +6080,11 @@
 </file>
 
 <file path=ppt/slides/slide1.xml><?xml version="1.0" encoding="utf-8"?>
-<p:sld xmlns:a="http://schemas.openxmlformats.org/drawingml/2006/main" xmlns:r="http://schemas.openxmlformats.org/officeDocument/2006/relationships" xmlns:mc="http://schemas.openxmlformats.org/markup-compatibility/2006" xmlns:mv="urn:schemas-microsoft-com:mac:vml" xmlns:p="http://schemas.openxmlformats.org/presentationml/2006/main" xmlns:c="http://schemas.openxmlformats.org/drawingml/2006/chart" xmlns:dgm="http://schemas.openxmlformats.org/drawingml/2006/diagram" xmlns:o="urn:schemas-microsoft-com:office:office" xmlns:v="urn:schemas-microsoft-com:vml" xmlns:pvml="urn:schemas-microsoft-com:office:powerpoint" xmlns:com="http://schemas.openxmlformats.org/drawingml/2006/compatibility" xmlns:p14="http://schemas.microsoft.com/office/powerpoint/2010/main" xmlns:p15="http://schemas.microsoft.com/office/powerpoint/2012/main" xmlns:ahyp="http://schemas.microsoft.com/office/drawing/2018/hyperlinkcolor">
+<p:sld xmlns:a="http://schemas.openxmlformats.org/drawingml/2006/main" xmlns:r="http://schemas.openxmlformats.org/officeDocument/2006/relationships" xmlns:p="http://schemas.openxmlformats.org/presentationml/2006/main">
   <p:cSld>
     <p:spTree>
       <p:nvGrpSpPr>
-        <p:cNvPr id="53" name="Shape 53"/>
+        <p:cNvPr id="1" name="Shape 53"/>
         <p:cNvGrpSpPr/>
         <p:nvPr/>
       </p:nvGrpSpPr>
@@ -5954,7 +6099,9 @@
       <p:sp>
         <p:nvSpPr>
           <p:cNvPr id="54" name="Google Shape;54;p13"/>
-          <p:cNvSpPr txBox="1"/>
+          <p:cNvSpPr txBox="1">
+            <a:spLocks noGrp="1"/>
+          </p:cNvSpPr>
           <p:nvPr>
             <p:ph type="ctrTitle"/>
           </p:nvPr>
@@ -5969,12 +6116,12 @@
           </a:prstGeom>
         </p:spPr>
         <p:txBody>
-          <a:bodyPr anchorCtr="0" anchor="b" bIns="91425" lIns="91425" spcFirstLastPara="1" rIns="91425" wrap="square" tIns="91425">
+          <a:bodyPr spcFirstLastPara="1" wrap="square" lIns="91425" tIns="91425" rIns="91425" bIns="91425" anchor="b" anchorCtr="0">
             <a:normAutofit/>
           </a:bodyPr>
           <a:lstStyle/>
           <a:p>
-            <a:pPr indent="0" lvl="0" marL="0" rtl="0" algn="ctr">
+            <a:pPr marL="0" lvl="0" indent="0" algn="ctr" rtl="0">
               <a:spcBef>
                 <a:spcPts val="0"/>
               </a:spcBef>
@@ -5994,9 +6141,11 @@
       <p:sp>
         <p:nvSpPr>
           <p:cNvPr id="55" name="Google Shape;55;p13"/>
-          <p:cNvSpPr txBox="1"/>
+          <p:cNvSpPr txBox="1">
+            <a:spLocks noGrp="1"/>
+          </p:cNvSpPr>
           <p:nvPr>
-            <p:ph idx="1" type="subTitle"/>
+            <p:ph type="subTitle" idx="1"/>
           </p:nvPr>
         </p:nvSpPr>
         <p:spPr>
@@ -6009,12 +6158,12 @@
           </a:prstGeom>
         </p:spPr>
         <p:txBody>
-          <a:bodyPr anchorCtr="0" anchor="t" bIns="91425" lIns="91425" spcFirstLastPara="1" rIns="91425" wrap="square" tIns="91425">
+          <a:bodyPr spcFirstLastPara="1" wrap="square" lIns="91425" tIns="91425" rIns="91425" bIns="91425" anchor="t" anchorCtr="0">
             <a:normAutofit/>
           </a:bodyPr>
           <a:lstStyle/>
           <a:p>
-            <a:pPr indent="0" lvl="0" marL="0" rtl="0" algn="ctr">
+            <a:pPr marL="0" lvl="0" indent="0" algn="ctr" rtl="0">
               <a:spcBef>
                 <a:spcPts val="0"/>
               </a:spcBef>
@@ -6023,9 +6172,6 @@
               </a:spcAft>
               <a:buNone/>
             </a:pPr>
-            <a:r>
-              <a:t/>
-            </a:r>
             <a:endParaRPr/>
           </a:p>
         </p:txBody>
@@ -6039,11 +6185,11 @@
 </file>
 
 <file path=ppt/slides/slide2.xml><?xml version="1.0" encoding="utf-8"?>
-<p:sld xmlns:a="http://schemas.openxmlformats.org/drawingml/2006/main" xmlns:r="http://schemas.openxmlformats.org/officeDocument/2006/relationships" xmlns:mc="http://schemas.openxmlformats.org/markup-compatibility/2006" xmlns:mv="urn:schemas-microsoft-com:mac:vml" xmlns:p="http://schemas.openxmlformats.org/presentationml/2006/main" xmlns:c="http://schemas.openxmlformats.org/drawingml/2006/chart" xmlns:dgm="http://schemas.openxmlformats.org/drawingml/2006/diagram" xmlns:o="urn:schemas-microsoft-com:office:office" xmlns:v="urn:schemas-microsoft-com:vml" xmlns:pvml="urn:schemas-microsoft-com:office:powerpoint" xmlns:com="http://schemas.openxmlformats.org/drawingml/2006/compatibility" xmlns:p14="http://schemas.microsoft.com/office/powerpoint/2010/main" xmlns:p15="http://schemas.microsoft.com/office/powerpoint/2012/main" xmlns:ahyp="http://schemas.microsoft.com/office/drawing/2018/hyperlinkcolor">
+<p:sld xmlns:a="http://schemas.openxmlformats.org/drawingml/2006/main" xmlns:r="http://schemas.openxmlformats.org/officeDocument/2006/relationships" xmlns:p="http://schemas.openxmlformats.org/presentationml/2006/main">
   <p:cSld>
     <p:spTree>
       <p:nvGrpSpPr>
-        <p:cNvPr id="59" name="Shape 59"/>
+        <p:cNvPr id="1" name="Shape 59"/>
         <p:cNvGrpSpPr/>
         <p:nvPr/>
       </p:nvGrpSpPr>
@@ -6058,7 +6204,9 @@
       <p:sp>
         <p:nvSpPr>
           <p:cNvPr id="60" name="Google Shape;60;p14"/>
-          <p:cNvSpPr txBox="1"/>
+          <p:cNvSpPr txBox="1">
+            <a:spLocks noGrp="1"/>
+          </p:cNvSpPr>
           <p:nvPr>
             <p:ph type="title"/>
           </p:nvPr>
@@ -6073,12 +6221,12 @@
           </a:prstGeom>
         </p:spPr>
         <p:txBody>
-          <a:bodyPr anchorCtr="0" anchor="t" bIns="91425" lIns="91425" spcFirstLastPara="1" rIns="91425" wrap="square" tIns="91425">
+          <a:bodyPr spcFirstLastPara="1" wrap="square" lIns="91425" tIns="91425" rIns="91425" bIns="91425" anchor="t" anchorCtr="0">
             <a:normAutofit fontScale="90000"/>
           </a:bodyPr>
           <a:lstStyle/>
           <a:p>
-            <a:pPr indent="0" lvl="0" marL="0" rtl="0" algn="l">
+            <a:pPr marL="0" lvl="0" indent="0" algn="l" rtl="0">
               <a:spcBef>
                 <a:spcPts val="0"/>
               </a:spcBef>
@@ -6113,10 +6261,34 @@
                 <a:tableStyleId>{BE1ABA60-BB3A-4A54-AE7A-9B27A25A3AC4}</a:tableStyleId>
               </a:tblPr>
               <a:tblGrid>
-                <a:gridCol w="2083125"/>
-                <a:gridCol w="2083125"/>
-                <a:gridCol w="2083125"/>
-                <a:gridCol w="2083125"/>
+                <a:gridCol w="2083125">
+                  <a:extLst>
+                    <a:ext uri="{9D8B030D-6E8A-4147-A177-3AD203B41FA5}">
+                      <a16:colId xmlns:a16="http://schemas.microsoft.com/office/drawing/2014/main" val="20000"/>
+                    </a:ext>
+                  </a:extLst>
+                </a:gridCol>
+                <a:gridCol w="2083125">
+                  <a:extLst>
+                    <a:ext uri="{9D8B030D-6E8A-4147-A177-3AD203B41FA5}">
+                      <a16:colId xmlns:a16="http://schemas.microsoft.com/office/drawing/2014/main" val="20001"/>
+                    </a:ext>
+                  </a:extLst>
+                </a:gridCol>
+                <a:gridCol w="2083125">
+                  <a:extLst>
+                    <a:ext uri="{9D8B030D-6E8A-4147-A177-3AD203B41FA5}">
+                      <a16:colId xmlns:a16="http://schemas.microsoft.com/office/drawing/2014/main" val="20002"/>
+                    </a:ext>
+                  </a:extLst>
+                </a:gridCol>
+                <a:gridCol w="2083125">
+                  <a:extLst>
+                    <a:ext uri="{9D8B030D-6E8A-4147-A177-3AD203B41FA5}">
+                      <a16:colId xmlns:a16="http://schemas.microsoft.com/office/drawing/2014/main" val="20003"/>
+                    </a:ext>
+                  </a:extLst>
+                </a:gridCol>
               </a:tblGrid>
               <a:tr h="381000">
                 <a:tc>
@@ -6124,7 +6296,7 @@
                     <a:bodyPr/>
                     <a:lstStyle/>
                     <a:p>
-                      <a:pPr indent="0" lvl="0" marL="0" rtl="0" algn="l">
+                      <a:pPr marL="0" lvl="0" indent="0" algn="l" rtl="0">
                         <a:spcBef>
                           <a:spcPts val="0"/>
                         </a:spcBef>
@@ -6134,20 +6306,20 @@
                         <a:buNone/>
                       </a:pPr>
                       <a:r>
-                        <a:rPr b="1" lang="en"/>
+                        <a:rPr lang="en" b="1"/>
                         <a:t>Name</a:t>
                       </a:r>
                       <a:endParaRPr b="1"/>
                     </a:p>
                   </a:txBody>
-                  <a:tcPr marT="91425" marB="91425" marR="91425" marL="91425"/>
+                  <a:tcPr marL="91425" marR="91425" marT="91425" marB="91425"/>
                 </a:tc>
                 <a:tc>
                   <a:txBody>
                     <a:bodyPr/>
                     <a:lstStyle/>
                     <a:p>
-                      <a:pPr indent="0" lvl="0" marL="0" rtl="0" algn="l">
+                      <a:pPr marL="0" lvl="0" indent="0" algn="l" rtl="0">
                         <a:spcBef>
                           <a:spcPts val="0"/>
                         </a:spcBef>
@@ -6157,20 +6329,20 @@
                         <a:buNone/>
                       </a:pPr>
                       <a:r>
-                        <a:rPr b="1" lang="en"/>
+                        <a:rPr lang="en" b="1"/>
                         <a:t>Email</a:t>
                       </a:r>
                       <a:endParaRPr b="1"/>
                     </a:p>
                   </a:txBody>
-                  <a:tcPr marT="91425" marB="91425" marR="91425" marL="91425"/>
+                  <a:tcPr marL="91425" marR="91425" marT="91425" marB="91425"/>
                 </a:tc>
                 <a:tc>
                   <a:txBody>
                     <a:bodyPr/>
                     <a:lstStyle/>
                     <a:p>
-                      <a:pPr indent="0" lvl="0" marL="0" rtl="0" algn="l">
+                      <a:pPr marL="0" lvl="0" indent="0" algn="l" rtl="0">
                         <a:spcBef>
                           <a:spcPts val="0"/>
                         </a:spcBef>
@@ -6180,20 +6352,20 @@
                         <a:buNone/>
                       </a:pPr>
                       <a:r>
-                        <a:rPr b="1" lang="en"/>
+                        <a:rPr lang="en" b="1"/>
                         <a:t>GitHub Handle</a:t>
                       </a:r>
                       <a:endParaRPr b="1"/>
                     </a:p>
                   </a:txBody>
-                  <a:tcPr marT="91425" marB="91425" marR="91425" marL="91425"/>
+                  <a:tcPr marL="91425" marR="91425" marT="91425" marB="91425"/>
                 </a:tc>
                 <a:tc>
                   <a:txBody>
                     <a:bodyPr/>
                     <a:lstStyle/>
                     <a:p>
-                      <a:pPr indent="0" lvl="0" marL="0" rtl="0" algn="l">
+                      <a:pPr marL="0" lvl="0" indent="0" algn="l" rtl="0">
                         <a:spcBef>
                           <a:spcPts val="0"/>
                         </a:spcBef>
@@ -6203,14 +6375,19 @@
                         <a:buNone/>
                       </a:pPr>
                       <a:r>
-                        <a:rPr b="1" lang="en"/>
+                        <a:rPr lang="en" b="1"/>
                         <a:t>Social Handles</a:t>
                       </a:r>
                       <a:endParaRPr b="1"/>
                     </a:p>
                   </a:txBody>
-                  <a:tcPr marT="91425" marB="91425" marR="91425" marL="91425"/>
+                  <a:tcPr marL="91425" marR="91425" marT="91425" marB="91425"/>
                 </a:tc>
+                <a:extLst>
+                  <a:ext uri="{0D108BD9-81ED-4DB2-BD59-A6C34878D82A}">
+                    <a16:rowId xmlns:a16="http://schemas.microsoft.com/office/drawing/2014/main" val="10000"/>
+                  </a:ext>
+                </a:extLst>
               </a:tr>
               <a:tr h="381000">
                 <a:tc>
@@ -6218,7 +6395,7 @@
                     <a:bodyPr/>
                     <a:lstStyle/>
                     <a:p>
-                      <a:pPr indent="0" lvl="0" marL="0" rtl="0" algn="l">
+                      <a:pPr marL="0" lvl="0" indent="0" algn="l" rtl="0">
                         <a:spcBef>
                           <a:spcPts val="0"/>
                         </a:spcBef>
@@ -6227,20 +6404,17 @@
                         </a:spcAft>
                         <a:buNone/>
                       </a:pPr>
-                      <a:r>
-                        <a:t/>
-                      </a:r>
                       <a:endParaRPr/>
                     </a:p>
                   </a:txBody>
-                  <a:tcPr marT="91425" marB="91425" marR="91425" marL="91425"/>
+                  <a:tcPr marL="91425" marR="91425" marT="91425" marB="91425"/>
                 </a:tc>
                 <a:tc>
                   <a:txBody>
                     <a:bodyPr/>
                     <a:lstStyle/>
                     <a:p>
-                      <a:pPr indent="0" lvl="0" marL="0" rtl="0" algn="l">
+                      <a:pPr marL="0" lvl="0" indent="0" algn="l" rtl="0">
                         <a:spcBef>
                           <a:spcPts val="0"/>
                         </a:spcBef>
@@ -6249,20 +6423,17 @@
                         </a:spcAft>
                         <a:buNone/>
                       </a:pPr>
-                      <a:r>
-                        <a:t/>
-                      </a:r>
                       <a:endParaRPr/>
                     </a:p>
                   </a:txBody>
-                  <a:tcPr marT="91425" marB="91425" marR="91425" marL="91425"/>
+                  <a:tcPr marL="91425" marR="91425" marT="91425" marB="91425"/>
                 </a:tc>
                 <a:tc>
                   <a:txBody>
                     <a:bodyPr/>
                     <a:lstStyle/>
                     <a:p>
-                      <a:pPr indent="0" lvl="0" marL="0" rtl="0" algn="l">
+                      <a:pPr marL="0" lvl="0" indent="0" algn="l" rtl="0">
                         <a:spcBef>
                           <a:spcPts val="0"/>
                         </a:spcBef>
@@ -6271,20 +6442,17 @@
                         </a:spcAft>
                         <a:buNone/>
                       </a:pPr>
-                      <a:r>
-                        <a:t/>
-                      </a:r>
                       <a:endParaRPr/>
                     </a:p>
                   </a:txBody>
-                  <a:tcPr marT="91425" marB="91425" marR="91425" marL="91425"/>
+                  <a:tcPr marL="91425" marR="91425" marT="91425" marB="91425"/>
                 </a:tc>
                 <a:tc>
                   <a:txBody>
                     <a:bodyPr/>
                     <a:lstStyle/>
                     <a:p>
-                      <a:pPr indent="0" lvl="0" marL="0" rtl="0" algn="l">
+                      <a:pPr marL="0" lvl="0" indent="0" algn="l" rtl="0">
                         <a:spcBef>
                           <a:spcPts val="0"/>
                         </a:spcBef>
@@ -6300,7 +6468,7 @@
                       <a:endParaRPr/>
                     </a:p>
                     <a:p>
-                      <a:pPr indent="0" lvl="0" marL="0" rtl="0" algn="l">
+                      <a:pPr marL="0" lvl="0" indent="0" algn="l" rtl="0">
                         <a:spcBef>
                           <a:spcPts val="0"/>
                         </a:spcBef>
@@ -6316,8 +6484,13 @@
                       <a:endParaRPr/>
                     </a:p>
                   </a:txBody>
-                  <a:tcPr marT="91425" marB="91425" marR="91425" marL="91425"/>
+                  <a:tcPr marL="91425" marR="91425" marT="91425" marB="91425"/>
                 </a:tc>
+                <a:extLst>
+                  <a:ext uri="{0D108BD9-81ED-4DB2-BD59-A6C34878D82A}">
+                    <a16:rowId xmlns:a16="http://schemas.microsoft.com/office/drawing/2014/main" val="10001"/>
+                  </a:ext>
+                </a:extLst>
               </a:tr>
               <a:tr h="381000">
                 <a:tc>
@@ -6325,7 +6498,7 @@
                     <a:bodyPr/>
                     <a:lstStyle/>
                     <a:p>
-                      <a:pPr indent="0" lvl="0" marL="0" rtl="0" algn="l">
+                      <a:pPr marL="0" lvl="0" indent="0" algn="l" rtl="0">
                         <a:spcBef>
                           <a:spcPts val="0"/>
                         </a:spcBef>
@@ -6334,20 +6507,17 @@
                         </a:spcAft>
                         <a:buNone/>
                       </a:pPr>
-                      <a:r>
-                        <a:t/>
-                      </a:r>
                       <a:endParaRPr/>
                     </a:p>
                   </a:txBody>
-                  <a:tcPr marT="91425" marB="91425" marR="91425" marL="91425"/>
+                  <a:tcPr marL="91425" marR="91425" marT="91425" marB="91425"/>
                 </a:tc>
                 <a:tc>
                   <a:txBody>
                     <a:bodyPr/>
                     <a:lstStyle/>
                     <a:p>
-                      <a:pPr indent="0" lvl="0" marL="0" rtl="0" algn="l">
+                      <a:pPr marL="0" lvl="0" indent="0" algn="l" rtl="0">
                         <a:spcBef>
                           <a:spcPts val="0"/>
                         </a:spcBef>
@@ -6356,20 +6526,17 @@
                         </a:spcAft>
                         <a:buNone/>
                       </a:pPr>
-                      <a:r>
-                        <a:t/>
-                      </a:r>
                       <a:endParaRPr/>
                     </a:p>
                   </a:txBody>
-                  <a:tcPr marT="91425" marB="91425" marR="91425" marL="91425"/>
+                  <a:tcPr marL="91425" marR="91425" marT="91425" marB="91425"/>
                 </a:tc>
                 <a:tc>
                   <a:txBody>
                     <a:bodyPr/>
                     <a:lstStyle/>
                     <a:p>
-                      <a:pPr indent="0" lvl="0" marL="0" rtl="0" algn="l">
+                      <a:pPr marL="0" lvl="0" indent="0" algn="l" rtl="0">
                         <a:spcBef>
                           <a:spcPts val="0"/>
                         </a:spcBef>
@@ -6378,20 +6545,17 @@
                         </a:spcAft>
                         <a:buNone/>
                       </a:pPr>
-                      <a:r>
-                        <a:t/>
-                      </a:r>
                       <a:endParaRPr/>
                     </a:p>
                   </a:txBody>
-                  <a:tcPr marT="91425" marB="91425" marR="91425" marL="91425"/>
+                  <a:tcPr marL="91425" marR="91425" marT="91425" marB="91425"/>
                 </a:tc>
                 <a:tc>
                   <a:txBody>
                     <a:bodyPr/>
                     <a:lstStyle/>
                     <a:p>
-                      <a:pPr indent="0" lvl="0" marL="0" rtl="0" algn="l">
+                      <a:pPr marL="0" lvl="0" indent="0" algn="l" rtl="0">
                         <a:spcBef>
                           <a:spcPts val="0"/>
                         </a:spcBef>
@@ -6420,7 +6584,7 @@
                       </a:endParaRPr>
                     </a:p>
                     <a:p>
-                      <a:pPr indent="0" lvl="0" marL="0" rtl="0" algn="l">
+                      <a:pPr marL="0" lvl="0" indent="0" algn="l" rtl="0">
                         <a:spcBef>
                           <a:spcPts val="0"/>
                         </a:spcBef>
@@ -6445,8 +6609,13 @@
                       <a:endParaRPr/>
                     </a:p>
                   </a:txBody>
-                  <a:tcPr marT="91425" marB="91425" marR="91425" marL="91425"/>
+                  <a:tcPr marL="91425" marR="91425" marT="91425" marB="91425"/>
                 </a:tc>
+                <a:extLst>
+                  <a:ext uri="{0D108BD9-81ED-4DB2-BD59-A6C34878D82A}">
+                    <a16:rowId xmlns:a16="http://schemas.microsoft.com/office/drawing/2014/main" val="10002"/>
+                  </a:ext>
+                </a:extLst>
               </a:tr>
               <a:tr h="381000">
                 <a:tc>
@@ -6454,7 +6623,7 @@
                     <a:bodyPr/>
                     <a:lstStyle/>
                     <a:p>
-                      <a:pPr indent="0" lvl="0" marL="0" rtl="0" algn="l">
+                      <a:pPr marL="0" lvl="0" indent="0" algn="l" rtl="0">
                         <a:spcBef>
                           <a:spcPts val="0"/>
                         </a:spcBef>
@@ -6463,20 +6632,17 @@
                         </a:spcAft>
                         <a:buNone/>
                       </a:pPr>
-                      <a:r>
-                        <a:t/>
-                      </a:r>
                       <a:endParaRPr/>
                     </a:p>
                   </a:txBody>
-                  <a:tcPr marT="91425" marB="91425" marR="91425" marL="91425"/>
+                  <a:tcPr marL="91425" marR="91425" marT="91425" marB="91425"/>
                 </a:tc>
                 <a:tc>
                   <a:txBody>
                     <a:bodyPr/>
                     <a:lstStyle/>
                     <a:p>
-                      <a:pPr indent="0" lvl="0" marL="0" rtl="0" algn="l">
+                      <a:pPr marL="0" lvl="0" indent="0" algn="l" rtl="0">
                         <a:spcBef>
                           <a:spcPts val="0"/>
                         </a:spcBef>
@@ -6485,20 +6651,17 @@
                         </a:spcAft>
                         <a:buNone/>
                       </a:pPr>
-                      <a:r>
-                        <a:t/>
-                      </a:r>
                       <a:endParaRPr/>
                     </a:p>
                   </a:txBody>
-                  <a:tcPr marT="91425" marB="91425" marR="91425" marL="91425"/>
+                  <a:tcPr marL="91425" marR="91425" marT="91425" marB="91425"/>
                 </a:tc>
                 <a:tc>
                   <a:txBody>
                     <a:bodyPr/>
                     <a:lstStyle/>
                     <a:p>
-                      <a:pPr indent="0" lvl="0" marL="0" rtl="0" algn="l">
+                      <a:pPr marL="0" lvl="0" indent="0" algn="l" rtl="0">
                         <a:spcBef>
                           <a:spcPts val="0"/>
                         </a:spcBef>
@@ -6507,20 +6670,17 @@
                         </a:spcAft>
                         <a:buNone/>
                       </a:pPr>
-                      <a:r>
-                        <a:t/>
-                      </a:r>
                       <a:endParaRPr/>
                     </a:p>
                   </a:txBody>
-                  <a:tcPr marT="91425" marB="91425" marR="91425" marL="91425"/>
+                  <a:tcPr marL="91425" marR="91425" marT="91425" marB="91425"/>
                 </a:tc>
                 <a:tc>
                   <a:txBody>
                     <a:bodyPr/>
                     <a:lstStyle/>
                     <a:p>
-                      <a:pPr indent="0" lvl="0" marL="0" rtl="0" algn="l">
+                      <a:pPr marL="0" lvl="0" indent="0" algn="l" rtl="0">
                         <a:spcBef>
                           <a:spcPts val="0"/>
                         </a:spcBef>
@@ -6549,7 +6709,7 @@
                       </a:endParaRPr>
                     </a:p>
                     <a:p>
-                      <a:pPr indent="0" lvl="0" marL="0" rtl="0" algn="l">
+                      <a:pPr marL="0" lvl="0" indent="0" algn="l" rtl="0">
                         <a:spcBef>
                           <a:spcPts val="0"/>
                         </a:spcBef>
@@ -6574,8 +6734,13 @@
                       <a:endParaRPr/>
                     </a:p>
                   </a:txBody>
-                  <a:tcPr marT="91425" marB="91425" marR="91425" marL="91425"/>
+                  <a:tcPr marL="91425" marR="91425" marT="91425" marB="91425"/>
                 </a:tc>
+                <a:extLst>
+                  <a:ext uri="{0D108BD9-81ED-4DB2-BD59-A6C34878D82A}">
+                    <a16:rowId xmlns:a16="http://schemas.microsoft.com/office/drawing/2014/main" val="10003"/>
+                  </a:ext>
+                </a:extLst>
               </a:tr>
               <a:tr h="381000">
                 <a:tc>
@@ -6583,7 +6748,7 @@
                     <a:bodyPr/>
                     <a:lstStyle/>
                     <a:p>
-                      <a:pPr indent="0" lvl="0" marL="0" rtl="0" algn="l">
+                      <a:pPr marL="0" lvl="0" indent="0" algn="l" rtl="0">
                         <a:spcBef>
                           <a:spcPts val="0"/>
                         </a:spcBef>
@@ -6592,20 +6757,17 @@
                         </a:spcAft>
                         <a:buNone/>
                       </a:pPr>
-                      <a:r>
-                        <a:t/>
-                      </a:r>
                       <a:endParaRPr/>
                     </a:p>
                   </a:txBody>
-                  <a:tcPr marT="91425" marB="91425" marR="91425" marL="91425"/>
+                  <a:tcPr marL="91425" marR="91425" marT="91425" marB="91425"/>
                 </a:tc>
                 <a:tc>
                   <a:txBody>
                     <a:bodyPr/>
                     <a:lstStyle/>
                     <a:p>
-                      <a:pPr indent="0" lvl="0" marL="0" rtl="0" algn="l">
+                      <a:pPr marL="0" lvl="0" indent="0" algn="l" rtl="0">
                         <a:spcBef>
                           <a:spcPts val="0"/>
                         </a:spcBef>
@@ -6614,20 +6776,17 @@
                         </a:spcAft>
                         <a:buNone/>
                       </a:pPr>
-                      <a:r>
-                        <a:t/>
-                      </a:r>
                       <a:endParaRPr/>
                     </a:p>
                   </a:txBody>
-                  <a:tcPr marT="91425" marB="91425" marR="91425" marL="91425"/>
+                  <a:tcPr marL="91425" marR="91425" marT="91425" marB="91425"/>
                 </a:tc>
                 <a:tc>
                   <a:txBody>
                     <a:bodyPr/>
                     <a:lstStyle/>
                     <a:p>
-                      <a:pPr indent="0" lvl="0" marL="0" rtl="0" algn="l">
+                      <a:pPr marL="0" lvl="0" indent="0" algn="l" rtl="0">
                         <a:spcBef>
                           <a:spcPts val="0"/>
                         </a:spcBef>
@@ -6636,20 +6795,17 @@
                         </a:spcAft>
                         <a:buNone/>
                       </a:pPr>
-                      <a:r>
-                        <a:t/>
-                      </a:r>
                       <a:endParaRPr/>
                     </a:p>
                   </a:txBody>
-                  <a:tcPr marT="91425" marB="91425" marR="91425" marL="91425"/>
+                  <a:tcPr marL="91425" marR="91425" marT="91425" marB="91425"/>
                 </a:tc>
                 <a:tc>
                   <a:txBody>
                     <a:bodyPr/>
                     <a:lstStyle/>
                     <a:p>
-                      <a:pPr indent="0" lvl="0" marL="0" rtl="0" algn="l">
+                      <a:pPr marL="0" lvl="0" indent="0" algn="l" rtl="0">
                         <a:spcBef>
                           <a:spcPts val="0"/>
                         </a:spcBef>
@@ -6678,7 +6834,7 @@
                       </a:endParaRPr>
                     </a:p>
                     <a:p>
-                      <a:pPr indent="0" lvl="0" marL="0" rtl="0" algn="l">
+                      <a:pPr marL="0" lvl="0" indent="0" algn="l" rtl="0">
                         <a:spcBef>
                           <a:spcPts val="0"/>
                         </a:spcBef>
@@ -6703,8 +6859,13 @@
                       <a:endParaRPr/>
                     </a:p>
                   </a:txBody>
-                  <a:tcPr marT="91425" marB="91425" marR="91425" marL="91425"/>
+                  <a:tcPr marL="91425" marR="91425" marT="91425" marB="91425"/>
                 </a:tc>
+                <a:extLst>
+                  <a:ext uri="{0D108BD9-81ED-4DB2-BD59-A6C34878D82A}">
+                    <a16:rowId xmlns:a16="http://schemas.microsoft.com/office/drawing/2014/main" val="10004"/>
+                  </a:ext>
+                </a:extLst>
               </a:tr>
               <a:tr h="381000">
                 <a:tc>
@@ -6712,7 +6873,7 @@
                     <a:bodyPr/>
                     <a:lstStyle/>
                     <a:p>
-                      <a:pPr indent="0" lvl="0" marL="0" rtl="0" algn="l">
+                      <a:pPr marL="0" lvl="0" indent="0" algn="l" rtl="0">
                         <a:spcBef>
                           <a:spcPts val="0"/>
                         </a:spcBef>
@@ -6721,20 +6882,17 @@
                         </a:spcAft>
                         <a:buNone/>
                       </a:pPr>
-                      <a:r>
-                        <a:t/>
-                      </a:r>
                       <a:endParaRPr/>
                     </a:p>
                   </a:txBody>
-                  <a:tcPr marT="91425" marB="91425" marR="91425" marL="91425"/>
+                  <a:tcPr marL="91425" marR="91425" marT="91425" marB="91425"/>
                 </a:tc>
                 <a:tc>
                   <a:txBody>
                     <a:bodyPr/>
                     <a:lstStyle/>
                     <a:p>
-                      <a:pPr indent="0" lvl="0" marL="0" rtl="0" algn="l">
+                      <a:pPr marL="0" lvl="0" indent="0" algn="l" rtl="0">
                         <a:spcBef>
                           <a:spcPts val="0"/>
                         </a:spcBef>
@@ -6743,20 +6901,17 @@
                         </a:spcAft>
                         <a:buNone/>
                       </a:pPr>
-                      <a:r>
-                        <a:t/>
-                      </a:r>
                       <a:endParaRPr/>
                     </a:p>
                   </a:txBody>
-                  <a:tcPr marT="91425" marB="91425" marR="91425" marL="91425"/>
+                  <a:tcPr marL="91425" marR="91425" marT="91425" marB="91425"/>
                 </a:tc>
                 <a:tc>
                   <a:txBody>
                     <a:bodyPr/>
                     <a:lstStyle/>
                     <a:p>
-                      <a:pPr indent="0" lvl="0" marL="0" rtl="0" algn="l">
+                      <a:pPr marL="0" lvl="0" indent="0" algn="l" rtl="0">
                         <a:spcBef>
                           <a:spcPts val="0"/>
                         </a:spcBef>
@@ -6765,20 +6920,17 @@
                         </a:spcAft>
                         <a:buNone/>
                       </a:pPr>
-                      <a:r>
-                        <a:t/>
-                      </a:r>
                       <a:endParaRPr/>
                     </a:p>
                   </a:txBody>
-                  <a:tcPr marT="91425" marB="91425" marR="91425" marL="91425"/>
+                  <a:tcPr marL="91425" marR="91425" marT="91425" marB="91425"/>
                 </a:tc>
                 <a:tc>
                   <a:txBody>
                     <a:bodyPr/>
                     <a:lstStyle/>
                     <a:p>
-                      <a:pPr indent="0" lvl="0" marL="0" rtl="0" algn="l">
+                      <a:pPr marL="0" lvl="0" indent="0" algn="l" rtl="0">
                         <a:spcBef>
                           <a:spcPts val="0"/>
                         </a:spcBef>
@@ -6807,7 +6959,7 @@
                       </a:endParaRPr>
                     </a:p>
                     <a:p>
-                      <a:pPr indent="0" lvl="0" marL="0" rtl="0" algn="l">
+                      <a:pPr marL="0" lvl="0" indent="0" algn="l" rtl="0">
                         <a:spcBef>
                           <a:spcPts val="0"/>
                         </a:spcBef>
@@ -6832,8 +6984,13 @@
                       <a:endParaRPr/>
                     </a:p>
                   </a:txBody>
-                  <a:tcPr marT="91425" marB="91425" marR="91425" marL="91425"/>
+                  <a:tcPr marL="91425" marR="91425" marT="91425" marB="91425"/>
                 </a:tc>
+                <a:extLst>
+                  <a:ext uri="{0D108BD9-81ED-4DB2-BD59-A6C34878D82A}">
+                    <a16:rowId xmlns:a16="http://schemas.microsoft.com/office/drawing/2014/main" val="10005"/>
+                  </a:ext>
+                </a:extLst>
               </a:tr>
             </a:tbl>
           </a:graphicData>
@@ -6848,11 +7005,11 @@
 </file>
 
 <file path=ppt/slides/slide3.xml><?xml version="1.0" encoding="utf-8"?>
-<p:sld xmlns:a="http://schemas.openxmlformats.org/drawingml/2006/main" xmlns:r="http://schemas.openxmlformats.org/officeDocument/2006/relationships" xmlns:mc="http://schemas.openxmlformats.org/markup-compatibility/2006" xmlns:mv="urn:schemas-microsoft-com:mac:vml" xmlns:p="http://schemas.openxmlformats.org/presentationml/2006/main" xmlns:c="http://schemas.openxmlformats.org/drawingml/2006/chart" xmlns:dgm="http://schemas.openxmlformats.org/drawingml/2006/diagram" xmlns:o="urn:schemas-microsoft-com:office:office" xmlns:v="urn:schemas-microsoft-com:vml" xmlns:pvml="urn:schemas-microsoft-com:office:powerpoint" xmlns:com="http://schemas.openxmlformats.org/drawingml/2006/compatibility" xmlns:p14="http://schemas.microsoft.com/office/powerpoint/2010/main" xmlns:p15="http://schemas.microsoft.com/office/powerpoint/2012/main" xmlns:ahyp="http://schemas.microsoft.com/office/drawing/2018/hyperlinkcolor">
+<p:sld xmlns:a="http://schemas.openxmlformats.org/drawingml/2006/main" xmlns:r="http://schemas.openxmlformats.org/officeDocument/2006/relationships" xmlns:p="http://schemas.openxmlformats.org/presentationml/2006/main">
   <p:cSld>
     <p:spTree>
       <p:nvGrpSpPr>
-        <p:cNvPr id="65" name="Shape 65"/>
+        <p:cNvPr id="1" name="Shape 65"/>
         <p:cNvGrpSpPr/>
         <p:nvPr/>
       </p:nvGrpSpPr>
@@ -6867,7 +7024,9 @@
       <p:sp>
         <p:nvSpPr>
           <p:cNvPr id="66" name="Google Shape;66;p15"/>
-          <p:cNvSpPr txBox="1"/>
+          <p:cNvSpPr txBox="1">
+            <a:spLocks noGrp="1"/>
+          </p:cNvSpPr>
           <p:nvPr>
             <p:ph type="title"/>
           </p:nvPr>
@@ -6882,12 +7041,12 @@
           </a:prstGeom>
         </p:spPr>
         <p:txBody>
-          <a:bodyPr anchorCtr="0" anchor="t" bIns="91425" lIns="91425" spcFirstLastPara="1" rIns="91425" wrap="square" tIns="91425">
+          <a:bodyPr spcFirstLastPara="1" wrap="square" lIns="91425" tIns="91425" rIns="91425" bIns="91425" anchor="t" anchorCtr="0">
             <a:normAutofit fontScale="90000"/>
           </a:bodyPr>
           <a:lstStyle/>
           <a:p>
-            <a:pPr indent="0" lvl="0" marL="0" rtl="0" algn="l">
+            <a:pPr marL="0" lvl="0" indent="0" algn="l" rtl="0">
               <a:spcBef>
                 <a:spcPts val="0"/>
               </a:spcBef>
@@ -6907,9 +7066,11 @@
       <p:sp>
         <p:nvSpPr>
           <p:cNvPr id="67" name="Google Shape;67;p15"/>
-          <p:cNvSpPr txBox="1"/>
+          <p:cNvSpPr txBox="1">
+            <a:spLocks noGrp="1"/>
+          </p:cNvSpPr>
           <p:nvPr>
-            <p:ph idx="1" type="body"/>
+            <p:ph type="body" idx="1"/>
           </p:nvPr>
         </p:nvSpPr>
         <p:spPr>
@@ -6922,12 +7083,12 @@
           </a:prstGeom>
         </p:spPr>
         <p:txBody>
-          <a:bodyPr anchorCtr="0" anchor="t" bIns="91425" lIns="91425" spcFirstLastPara="1" rIns="91425" wrap="square" tIns="91425">
+          <a:bodyPr spcFirstLastPara="1" wrap="square" lIns="91425" tIns="91425" rIns="91425" bIns="91425" anchor="t" anchorCtr="0">
             <a:normAutofit/>
           </a:bodyPr>
           <a:lstStyle/>
           <a:p>
-            <a:pPr indent="0" lvl="0" marL="0" rtl="0" algn="l">
+            <a:pPr marL="0" lvl="0" indent="0" algn="l" rtl="0">
               <a:spcBef>
                 <a:spcPts val="0"/>
               </a:spcBef>
@@ -6937,10 +7098,32 @@
               <a:buNone/>
             </a:pPr>
             <a:r>
-              <a:rPr lang="en"/>
-              <a:t>[text, images, etc.]</a:t>
+              <a:rPr lang="en-US" dirty="0"/>
+              <a:t>Play, Rebuild, Repeat: A New </a:t>
             </a:r>
-            <a:endParaRPr/>
+            <a:r>
+              <a:rPr lang="en-US"/>
+              <a:t>LEGO Journey</a:t>
+            </a:r>
+          </a:p>
+          <a:p>
+            <a:pPr marL="0" lvl="0" indent="0" algn="l" rtl="0">
+              <a:spcBef>
+                <a:spcPts val="0"/>
+              </a:spcBef>
+              <a:spcAft>
+                <a:spcPts val="1200"/>
+              </a:spcAft>
+              <a:buNone/>
+            </a:pPr>
+            <a:r>
+              <a:rPr lang="en-US"/>
+              <a:t>Help </a:t>
+            </a:r>
+            <a:r>
+              <a:rPr lang="en-US" dirty="0"/>
+              <a:t>your kids discover endless adventures with their existing LEGO sets. Our AI-powered project detects similar parts across LEGO sets and crafts new, exciting building instructions for their old blocks!</a:t>
+            </a:r>
           </a:p>
         </p:txBody>
       </p:sp>
@@ -6953,11 +7136,11 @@
 </file>
 
 <file path=ppt/slides/slide4.xml><?xml version="1.0" encoding="utf-8"?>
-<p:sld xmlns:a="http://schemas.openxmlformats.org/drawingml/2006/main" xmlns:r="http://schemas.openxmlformats.org/officeDocument/2006/relationships" xmlns:mc="http://schemas.openxmlformats.org/markup-compatibility/2006" xmlns:mv="urn:schemas-microsoft-com:mac:vml" xmlns:p="http://schemas.openxmlformats.org/presentationml/2006/main" xmlns:c="http://schemas.openxmlformats.org/drawingml/2006/chart" xmlns:dgm="http://schemas.openxmlformats.org/drawingml/2006/diagram" xmlns:o="urn:schemas-microsoft-com:office:office" xmlns:v="urn:schemas-microsoft-com:vml" xmlns:pvml="urn:schemas-microsoft-com:office:powerpoint" xmlns:com="http://schemas.openxmlformats.org/drawingml/2006/compatibility" xmlns:p14="http://schemas.microsoft.com/office/powerpoint/2010/main" xmlns:p15="http://schemas.microsoft.com/office/powerpoint/2012/main" xmlns:ahyp="http://schemas.microsoft.com/office/drawing/2018/hyperlinkcolor">
+<p:sld xmlns:a="http://schemas.openxmlformats.org/drawingml/2006/main" xmlns:r="http://schemas.openxmlformats.org/officeDocument/2006/relationships" xmlns:p="http://schemas.openxmlformats.org/presentationml/2006/main">
   <p:cSld>
     <p:spTree>
       <p:nvGrpSpPr>
-        <p:cNvPr id="71" name="Shape 71"/>
+        <p:cNvPr id="1" name="Shape 71"/>
         <p:cNvGrpSpPr/>
         <p:nvPr/>
       </p:nvGrpSpPr>
@@ -6972,7 +7155,9 @@
       <p:sp>
         <p:nvSpPr>
           <p:cNvPr id="72" name="Google Shape;72;p16"/>
-          <p:cNvSpPr txBox="1"/>
+          <p:cNvSpPr txBox="1">
+            <a:spLocks noGrp="1"/>
+          </p:cNvSpPr>
           <p:nvPr>
             <p:ph type="title"/>
           </p:nvPr>
@@ -6987,12 +7172,12 @@
           </a:prstGeom>
         </p:spPr>
         <p:txBody>
-          <a:bodyPr anchorCtr="0" anchor="t" bIns="91425" lIns="91425" spcFirstLastPara="1" rIns="91425" wrap="square" tIns="91425">
+          <a:bodyPr spcFirstLastPara="1" wrap="square" lIns="91425" tIns="91425" rIns="91425" bIns="91425" anchor="t" anchorCtr="0">
             <a:normAutofit fontScale="90000"/>
           </a:bodyPr>
           <a:lstStyle/>
           <a:p>
-            <a:pPr indent="0" lvl="0" marL="0" rtl="0" algn="l">
+            <a:pPr marL="0" lvl="0" indent="0" algn="l" rtl="0">
               <a:spcBef>
                 <a:spcPts val="0"/>
               </a:spcBef>
@@ -7012,9 +7197,11 @@
       <p:sp>
         <p:nvSpPr>
           <p:cNvPr id="73" name="Google Shape;73;p16"/>
-          <p:cNvSpPr txBox="1"/>
+          <p:cNvSpPr txBox="1">
+            <a:spLocks noGrp="1"/>
+          </p:cNvSpPr>
           <p:nvPr>
-            <p:ph idx="1" type="body"/>
+            <p:ph type="body" idx="1"/>
           </p:nvPr>
         </p:nvSpPr>
         <p:spPr>
@@ -7027,12 +7214,12 @@
           </a:prstGeom>
         </p:spPr>
         <p:txBody>
-          <a:bodyPr anchorCtr="0" anchor="t" bIns="91425" lIns="91425" spcFirstLastPara="1" rIns="91425" wrap="square" tIns="91425">
+          <a:bodyPr spcFirstLastPara="1" wrap="square" lIns="91425" tIns="91425" rIns="91425" bIns="91425" anchor="t" anchorCtr="0">
             <a:normAutofit/>
           </a:bodyPr>
           <a:lstStyle/>
           <a:p>
-            <a:pPr indent="0" lvl="0" marL="0" rtl="0" algn="l">
+            <a:pPr marL="0" lvl="0" indent="0" algn="l" rtl="0">
               <a:spcBef>
                 <a:spcPts val="0"/>
               </a:spcBef>
@@ -7055,7 +7242,7 @@
             <a:endParaRPr/>
           </a:p>
           <a:p>
-            <a:pPr indent="0" lvl="0" marL="0" rtl="0" algn="l">
+            <a:pPr marL="0" lvl="0" indent="0" algn="l" rtl="0">
               <a:spcBef>
                 <a:spcPts val="1200"/>
               </a:spcBef>
@@ -7081,11 +7268,11 @@
 </file>
 
 <file path=ppt/slides/slide5.xml><?xml version="1.0" encoding="utf-8"?>
-<p:sld xmlns:a="http://schemas.openxmlformats.org/drawingml/2006/main" xmlns:r="http://schemas.openxmlformats.org/officeDocument/2006/relationships" xmlns:mc="http://schemas.openxmlformats.org/markup-compatibility/2006" xmlns:mv="urn:schemas-microsoft-com:mac:vml" xmlns:p="http://schemas.openxmlformats.org/presentationml/2006/main" xmlns:c="http://schemas.openxmlformats.org/drawingml/2006/chart" xmlns:dgm="http://schemas.openxmlformats.org/drawingml/2006/diagram" xmlns:o="urn:schemas-microsoft-com:office:office" xmlns:v="urn:schemas-microsoft-com:vml" xmlns:pvml="urn:schemas-microsoft-com:office:powerpoint" xmlns:com="http://schemas.openxmlformats.org/drawingml/2006/compatibility" xmlns:p14="http://schemas.microsoft.com/office/powerpoint/2010/main" xmlns:p15="http://schemas.microsoft.com/office/powerpoint/2012/main" xmlns:ahyp="http://schemas.microsoft.com/office/drawing/2018/hyperlinkcolor">
+<p:sld xmlns:a="http://schemas.openxmlformats.org/drawingml/2006/main" xmlns:r="http://schemas.openxmlformats.org/officeDocument/2006/relationships" xmlns:p="http://schemas.openxmlformats.org/presentationml/2006/main">
   <p:cSld>
     <p:spTree>
       <p:nvGrpSpPr>
-        <p:cNvPr id="77" name="Shape 77"/>
+        <p:cNvPr id="1" name="Shape 77"/>
         <p:cNvGrpSpPr/>
         <p:nvPr/>
       </p:nvGrpSpPr>
@@ -7100,7 +7287,9 @@
       <p:sp>
         <p:nvSpPr>
           <p:cNvPr id="78" name="Google Shape;78;p17"/>
-          <p:cNvSpPr txBox="1"/>
+          <p:cNvSpPr txBox="1">
+            <a:spLocks noGrp="1"/>
+          </p:cNvSpPr>
           <p:nvPr>
             <p:ph type="title"/>
           </p:nvPr>
@@ -7115,12 +7304,12 @@
           </a:prstGeom>
         </p:spPr>
         <p:txBody>
-          <a:bodyPr anchorCtr="0" anchor="t" bIns="91425" lIns="91425" spcFirstLastPara="1" rIns="91425" wrap="square" tIns="91425">
+          <a:bodyPr spcFirstLastPara="1" wrap="square" lIns="91425" tIns="91425" rIns="91425" bIns="91425" anchor="t" anchorCtr="0">
             <a:normAutofit fontScale="90000"/>
           </a:bodyPr>
           <a:lstStyle/>
           <a:p>
-            <a:pPr indent="0" lvl="0" marL="0" rtl="0" algn="l">
+            <a:pPr marL="0" lvl="0" indent="0" algn="l" rtl="0">
               <a:spcBef>
                 <a:spcPts val="0"/>
               </a:spcBef>
@@ -7140,9 +7329,11 @@
       <p:sp>
         <p:nvSpPr>
           <p:cNvPr id="79" name="Google Shape;79;p17"/>
-          <p:cNvSpPr txBox="1"/>
+          <p:cNvSpPr txBox="1">
+            <a:spLocks noGrp="1"/>
+          </p:cNvSpPr>
           <p:nvPr>
-            <p:ph idx="1" type="body"/>
+            <p:ph type="body" idx="1"/>
           </p:nvPr>
         </p:nvSpPr>
         <p:spPr>
@@ -7155,12 +7346,12 @@
           </a:prstGeom>
         </p:spPr>
         <p:txBody>
-          <a:bodyPr anchorCtr="0" anchor="t" bIns="91425" lIns="91425" spcFirstLastPara="1" rIns="91425" wrap="square" tIns="91425">
+          <a:bodyPr spcFirstLastPara="1" wrap="square" lIns="91425" tIns="91425" rIns="91425" bIns="91425" anchor="t" anchorCtr="0">
             <a:normAutofit/>
           </a:bodyPr>
           <a:lstStyle/>
           <a:p>
-            <a:pPr indent="0" lvl="0" marL="0" rtl="0" algn="l">
+            <a:pPr marL="0" lvl="0" indent="0" algn="l" rtl="0">
               <a:spcBef>
                 <a:spcPts val="0"/>
               </a:spcBef>
@@ -7186,11 +7377,11 @@
 </file>
 
 <file path=ppt/slides/slide6.xml><?xml version="1.0" encoding="utf-8"?>
-<p:sld xmlns:a="http://schemas.openxmlformats.org/drawingml/2006/main" xmlns:r="http://schemas.openxmlformats.org/officeDocument/2006/relationships" xmlns:mc="http://schemas.openxmlformats.org/markup-compatibility/2006" xmlns:mv="urn:schemas-microsoft-com:mac:vml" xmlns:p="http://schemas.openxmlformats.org/presentationml/2006/main" xmlns:c="http://schemas.openxmlformats.org/drawingml/2006/chart" xmlns:dgm="http://schemas.openxmlformats.org/drawingml/2006/diagram" xmlns:o="urn:schemas-microsoft-com:office:office" xmlns:v="urn:schemas-microsoft-com:vml" xmlns:pvml="urn:schemas-microsoft-com:office:powerpoint" xmlns:com="http://schemas.openxmlformats.org/drawingml/2006/compatibility" xmlns:p14="http://schemas.microsoft.com/office/powerpoint/2010/main" xmlns:p15="http://schemas.microsoft.com/office/powerpoint/2012/main" xmlns:ahyp="http://schemas.microsoft.com/office/drawing/2018/hyperlinkcolor">
+<p:sld xmlns:a="http://schemas.openxmlformats.org/drawingml/2006/main" xmlns:r="http://schemas.openxmlformats.org/officeDocument/2006/relationships" xmlns:p="http://schemas.openxmlformats.org/presentationml/2006/main">
   <p:cSld>
     <p:spTree>
       <p:nvGrpSpPr>
-        <p:cNvPr id="83" name="Shape 83"/>
+        <p:cNvPr id="1" name="Shape 83"/>
         <p:cNvGrpSpPr/>
         <p:nvPr/>
       </p:nvGrpSpPr>
@@ -7205,7 +7396,9 @@
       <p:sp>
         <p:nvSpPr>
           <p:cNvPr id="84" name="Google Shape;84;p18"/>
-          <p:cNvSpPr txBox="1"/>
+          <p:cNvSpPr txBox="1">
+            <a:spLocks noGrp="1"/>
+          </p:cNvSpPr>
           <p:nvPr>
             <p:ph type="title"/>
           </p:nvPr>
@@ -7220,12 +7413,12 @@
           </a:prstGeom>
         </p:spPr>
         <p:txBody>
-          <a:bodyPr anchorCtr="0" anchor="t" bIns="91425" lIns="91425" spcFirstLastPara="1" rIns="91425" wrap="square" tIns="91425">
+          <a:bodyPr spcFirstLastPara="1" wrap="square" lIns="91425" tIns="91425" rIns="91425" bIns="91425" anchor="t" anchorCtr="0">
             <a:normAutofit fontScale="90000"/>
           </a:bodyPr>
           <a:lstStyle/>
           <a:p>
-            <a:pPr indent="0" lvl="0" marL="0" rtl="0" algn="l">
+            <a:pPr marL="0" lvl="0" indent="0" algn="l" rtl="0">
               <a:spcBef>
                 <a:spcPts val="0"/>
               </a:spcBef>
@@ -7245,9 +7438,11 @@
       <p:sp>
         <p:nvSpPr>
           <p:cNvPr id="85" name="Google Shape;85;p18"/>
-          <p:cNvSpPr txBox="1"/>
+          <p:cNvSpPr txBox="1">
+            <a:spLocks noGrp="1"/>
+          </p:cNvSpPr>
           <p:nvPr>
-            <p:ph idx="1" type="body"/>
+            <p:ph type="body" idx="1"/>
           </p:nvPr>
         </p:nvSpPr>
         <p:spPr>
@@ -7260,12 +7455,12 @@
           </a:prstGeom>
         </p:spPr>
         <p:txBody>
-          <a:bodyPr anchorCtr="0" anchor="t" bIns="91425" lIns="91425" spcFirstLastPara="1" rIns="91425" wrap="square" tIns="91425">
+          <a:bodyPr spcFirstLastPara="1" wrap="square" lIns="91425" tIns="91425" rIns="91425" bIns="91425" anchor="t" anchorCtr="0">
             <a:normAutofit/>
           </a:bodyPr>
           <a:lstStyle/>
           <a:p>
-            <a:pPr indent="0" lvl="0" marL="0" rtl="0" algn="l">
+            <a:pPr marL="0" lvl="0" indent="0" algn="l" rtl="0">
               <a:spcBef>
                 <a:spcPts val="0"/>
               </a:spcBef>
@@ -7291,7 +7486,7 @@
 </file>
 
 <file path=ppt/theme/theme1.xml><?xml version="1.0" encoding="utf-8"?>
-<a:theme xmlns:a="http://schemas.openxmlformats.org/drawingml/2006/main" xmlns:r="http://schemas.openxmlformats.org/officeDocument/2006/relationships" name="Simple Light">
+<a:theme xmlns:a="http://schemas.openxmlformats.org/drawingml/2006/main" name="Simple Light">
   <a:themeElements>
     <a:clrScheme name="Simple Light">
       <a:dk1>
@@ -7566,11 +7761,13 @@
       </a:bgFillStyleLst>
     </a:fmtScheme>
   </a:themeElements>
+  <a:objectDefaults/>
+  <a:extraClrSchemeLst/>
 </a:theme>
 </file>
 
 <file path=ppt/theme/theme2.xml><?xml version="1.0" encoding="utf-8"?>
-<a:theme xmlns:a="http://schemas.openxmlformats.org/drawingml/2006/main" xmlns:r="http://schemas.openxmlformats.org/officeDocument/2006/relationships">
+<a:theme xmlns:a="http://schemas.openxmlformats.org/drawingml/2006/main">
   <a:themeElements>
     <a:clrScheme name="Default">
       <a:dk1>
@@ -7845,5 +8042,7 @@
       </a:bgFillStyleLst>
     </a:fmtScheme>
   </a:themeElements>
+  <a:objectDefaults/>
+  <a:extraClrSchemeLst/>
 </a:theme>
 </file>
</xml_diff>